<commit_message>
Pre gathering Code 추가 2015/07/07
</commit_message>
<xml_diff>
--- a/Knock Detection Reference Code Specification.pptx
+++ b/Knock Detection Reference Code Specification.pptx
@@ -5,10 +5,10 @@
     <p:sldMasterId id="2147483715" r:id="rId1"/>
   </p:sldMasterIdLst>
   <p:notesMasterIdLst>
-    <p:notesMasterId r:id="rId22"/>
+    <p:notesMasterId r:id="rId25"/>
   </p:notesMasterIdLst>
   <p:handoutMasterIdLst>
-    <p:handoutMasterId r:id="rId23"/>
+    <p:handoutMasterId r:id="rId26"/>
   </p:handoutMasterIdLst>
   <p:sldIdLst>
     <p:sldId id="256" r:id="rId2"/>
@@ -17,25 +17,28 @@
     <p:sldId id="260" r:id="rId5"/>
     <p:sldId id="261" r:id="rId6"/>
     <p:sldId id="262" r:id="rId7"/>
-    <p:sldId id="263" r:id="rId8"/>
-    <p:sldId id="264" r:id="rId9"/>
-    <p:sldId id="265" r:id="rId10"/>
-    <p:sldId id="266" r:id="rId11"/>
-    <p:sldId id="268" r:id="rId12"/>
-    <p:sldId id="269" r:id="rId13"/>
-    <p:sldId id="270" r:id="rId14"/>
-    <p:sldId id="267" r:id="rId15"/>
-    <p:sldId id="273" r:id="rId16"/>
-    <p:sldId id="274" r:id="rId17"/>
-    <p:sldId id="275" r:id="rId18"/>
-    <p:sldId id="271" r:id="rId19"/>
-    <p:sldId id="272" r:id="rId20"/>
-    <p:sldId id="258" r:id="rId21"/>
+    <p:sldId id="276" r:id="rId8"/>
+    <p:sldId id="263" r:id="rId9"/>
+    <p:sldId id="264" r:id="rId10"/>
+    <p:sldId id="265" r:id="rId11"/>
+    <p:sldId id="266" r:id="rId12"/>
+    <p:sldId id="268" r:id="rId13"/>
+    <p:sldId id="269" r:id="rId14"/>
+    <p:sldId id="270" r:id="rId15"/>
+    <p:sldId id="267" r:id="rId16"/>
+    <p:sldId id="273" r:id="rId17"/>
+    <p:sldId id="274" r:id="rId18"/>
+    <p:sldId id="275" r:id="rId19"/>
+    <p:sldId id="271" r:id="rId20"/>
+    <p:sldId id="272" r:id="rId21"/>
+    <p:sldId id="277" r:id="rId22"/>
+    <p:sldId id="278" r:id="rId23"/>
+    <p:sldId id="258" r:id="rId24"/>
   </p:sldIdLst>
   <p:sldSz cx="9144000" cy="6858000" type="screen4x3"/>
   <p:notesSz cx="7099300" cy="10234613"/>
   <p:custDataLst>
-    <p:tags r:id="rId24"/>
+    <p:tags r:id="rId27"/>
   </p:custDataLst>
   <p:defaultTextStyle>
     <a:defPPr>
@@ -6703,9 +6706,10 @@
           </a:p>
           <a:p>
             <a:r>
-              <a:rPr lang="en-US" dirty="0" smtClean="0"/>
-              <a:t>17.06.2015</a:t>
-            </a:r>
+              <a:rPr lang="en-US" smtClean="0"/>
+              <a:t>07.07.2015</a:t>
+            </a:r>
+            <a:endParaRPr lang="en-US" dirty="0" smtClean="0"/>
           </a:p>
         </p:txBody>
       </p:sp>
@@ -6756,11 +6760,11 @@
           <a:p>
             <a:r>
               <a:rPr lang="en-US" altLang="ko-KR" dirty="0"/>
-              <a:t>SW Detail design </a:t>
+              <a:t>SW D</a:t>
             </a:r>
             <a:r>
               <a:rPr lang="en-US" altLang="ko-KR" dirty="0" smtClean="0"/>
-              <a:t>concept-ISR</a:t>
+              <a:t>etail design concept-Ignore data</a:t>
             </a:r>
             <a:endParaRPr lang="en-US" dirty="0"/>
           </a:p>
@@ -6861,7 +6865,7 @@
         </p:blipFill>
         <p:spPr bwMode="auto">
           <a:xfrm>
-            <a:off x="1723094" y="2570421"/>
+            <a:off x="1723094" y="1268760"/>
             <a:ext cx="5697812" cy="2371242"/>
           </a:xfrm>
           <a:prstGeom prst="rect">
@@ -6879,16 +6883,55 @@
           </a:extLst>
         </p:spPr>
       </p:pic>
+      <p:sp>
+        <p:nvSpPr>
+          <p:cNvPr id="30" name="Oval 29"/>
+          <p:cNvSpPr/>
+          <p:nvPr/>
+        </p:nvSpPr>
+        <p:spPr bwMode="auto">
+          <a:xfrm>
+            <a:off x="3779912" y="2132856"/>
+            <a:ext cx="216024" cy="864096"/>
+          </a:xfrm>
+          <a:prstGeom prst="ellipse">
+            <a:avLst/>
+          </a:prstGeom>
+          <a:noFill/>
+          <a:ln w="9525">
+            <a:solidFill>
+              <a:srgbClr val="FF0000"/>
+            </a:solidFill>
+            <a:miter lim="800000"/>
+            <a:headEnd/>
+            <a:tailEnd/>
+          </a:ln>
+        </p:spPr>
+        <p:txBody>
+          <a:bodyPr wrap="square" lIns="72000" tIns="72000" rIns="72000" bIns="72000" rtlCol="0" anchor="ctr"/>
+          <a:lstStyle/>
+          <a:p>
+            <a:pPr algn="ctr" eaLnBrk="0" hangingPunct="0"/>
+            <a:endParaRPr lang="ko-KR" altLang="en-US" sz="1600" dirty="0" smtClean="0">
+              <a:latin typeface="+mn-lt"/>
+              <a:ea typeface="Verdana" pitchFamily="34" charset="0"/>
+              <a:cs typeface="Verdana" pitchFamily="34" charset="0"/>
+            </a:endParaRPr>
+          </a:p>
+        </p:txBody>
+      </p:sp>
       <p:cxnSp>
         <p:nvCxnSpPr>
-          <p:cNvPr id="11" name="Straight Arrow Connector 10"/>
-          <p:cNvCxnSpPr/>
+          <p:cNvPr id="32" name="Straight Arrow Connector 31"/>
+          <p:cNvCxnSpPr>
+            <a:endCxn id="30" idx="2"/>
+          </p:cNvCxnSpPr>
           <p:nvPr/>
         </p:nvCxnSpPr>
         <p:spPr>
           <a:xfrm flipV="1">
-            <a:off x="3898734" y="1988840"/>
-            <a:ext cx="817282" cy="941621"/>
+            <a:off x="3201901" y="2564904"/>
+            <a:ext cx="578011" cy="1224136"/>
           </a:xfrm>
           <a:prstGeom prst="straightConnector1">
             <a:avLst/>
@@ -6915,52 +6958,70 @@
           </a:fontRef>
         </p:style>
       </p:cxnSp>
-      <p:cxnSp>
-        <p:nvCxnSpPr>
-          <p:cNvPr id="12" name="Straight Arrow Connector 11"/>
-          <p:cNvCxnSpPr/>
+      <p:pic>
+        <p:nvPicPr>
+          <p:cNvPr id="8195" name="Picture 3"/>
+          <p:cNvPicPr>
+            <a:picLocks noChangeAspect="1" noChangeArrowheads="1"/>
+          </p:cNvPicPr>
           <p:nvPr/>
-        </p:nvCxnSpPr>
-        <p:spPr>
-          <a:xfrm flipH="1" flipV="1">
-            <a:off x="4860032" y="1988840"/>
-            <a:ext cx="936104" cy="941621"/>
-          </a:xfrm>
-          <a:prstGeom prst="straightConnector1">
+        </p:nvPicPr>
+        <p:blipFill>
+          <a:blip r:embed="rId3">
+            <a:extLst>
+              <a:ext uri="{28A0092B-C50C-407E-A947-70E740481C1C}">
+                <a14:useLocalDpi xmlns:a14="http://schemas.microsoft.com/office/drawing/2010/main" val="0"/>
+              </a:ext>
+            </a:extLst>
+          </a:blip>
+          <a:srcRect/>
+          <a:stretch>
+            <a:fillRect/>
+          </a:stretch>
+        </p:blipFill>
+        <p:spPr bwMode="auto">
+          <a:xfrm>
+            <a:off x="1476629" y="4077072"/>
+            <a:ext cx="4822589" cy="977914"/>
+          </a:xfrm>
+          <a:prstGeom prst="rect">
             <a:avLst/>
           </a:prstGeom>
-          <a:ln w="19050">
-            <a:solidFill>
-              <a:srgbClr val="FF0000"/>
-            </a:solidFill>
-            <a:tailEnd type="arrow"/>
+          <a:noFill/>
+          <a:ln>
+            <a:noFill/>
           </a:ln>
-        </p:spPr>
-        <p:style>
-          <a:lnRef idx="1">
-            <a:schemeClr val="accent1"/>
-          </a:lnRef>
-          <a:fillRef idx="0">
-            <a:schemeClr val="accent1"/>
-          </a:fillRef>
-          <a:effectRef idx="0">
-            <a:schemeClr val="accent1"/>
-          </a:effectRef>
-          <a:fontRef idx="minor">
-            <a:schemeClr val="tx1"/>
-          </a:fontRef>
-        </p:style>
-      </p:cxnSp>
-      <p:sp>
-        <p:nvSpPr>
-          <p:cNvPr id="15" name="TextBox 14"/>
+          <a:extLst>
+            <a:ext uri="{909E8E84-426E-40DD-AFC4-6F175D3DCCD1}">
+              <a14:hiddenFill xmlns:a14="http://schemas.microsoft.com/office/drawing/2010/main">
+                <a:solidFill>
+                  <a:schemeClr val="accent1"/>
+                </a:solidFill>
+              </a14:hiddenFill>
+            </a:ext>
+            <a:ext uri="{91240B29-F687-4F45-9708-019B960494DF}">
+              <a14:hiddenLine xmlns:a14="http://schemas.microsoft.com/office/drawing/2010/main" w="9525">
+                <a:solidFill>
+                  <a:schemeClr val="tx1"/>
+                </a:solidFill>
+                <a:miter lim="800000"/>
+                <a:headEnd/>
+                <a:tailEnd/>
+              </a14:hiddenLine>
+            </a:ext>
+          </a:extLst>
+        </p:spPr>
+      </p:pic>
+      <p:sp>
+        <p:nvSpPr>
+          <p:cNvPr id="38" name="TextBox 37"/>
           <p:cNvSpPr txBox="1"/>
           <p:nvPr/>
         </p:nvSpPr>
         <p:spPr bwMode="auto">
           <a:xfrm>
-            <a:off x="3275856" y="1850341"/>
-            <a:ext cx="3672408" cy="138499"/>
+            <a:off x="1689733" y="3789040"/>
+            <a:ext cx="3024336" cy="138499"/>
           </a:xfrm>
           <a:prstGeom prst="rect">
             <a:avLst/>
@@ -6994,223 +7055,25 @@
               <a:tabLst/>
             </a:pPr>
             <a:r>
-              <a:rPr lang="en-US" altLang="ko-KR" sz="900" kern="0" dirty="0" err="1">
+              <a:rPr lang="en-US" altLang="ko-KR" sz="900" kern="0" dirty="0" smtClean="0">
                 <a:latin typeface="Verdana" pitchFamily="34" charset="0"/>
                 <a:ea typeface="Verdana" pitchFamily="34" charset="0"/>
                 <a:cs typeface="Verdana" pitchFamily="34" charset="0"/>
               </a:rPr>
-              <a:t>Knocheck_Window_ISR</a:t>
-            </a:r>
-            <a:r>
-              <a:rPr lang="en-US" altLang="ko-KR" sz="900" kern="0" dirty="0">
-                <a:latin typeface="Verdana" pitchFamily="34" charset="0"/>
-                <a:ea typeface="Verdana" pitchFamily="34" charset="0"/>
-                <a:cs typeface="Verdana" pitchFamily="34" charset="0"/>
-              </a:rPr>
-              <a:t> is called, when window open or close</a:t>
-            </a:r>
-          </a:p>
-        </p:txBody>
-      </p:sp>
-      <p:cxnSp>
-        <p:nvCxnSpPr>
-          <p:cNvPr id="22" name="Straight Arrow Connector 21"/>
-          <p:cNvCxnSpPr/>
-          <p:nvPr/>
-        </p:nvCxnSpPr>
-        <p:spPr>
-          <a:xfrm>
-            <a:off x="4322713" y="3938573"/>
-            <a:ext cx="0" cy="1440160"/>
-          </a:xfrm>
-          <a:prstGeom prst="straightConnector1">
-            <a:avLst/>
-          </a:prstGeom>
-          <a:ln w="19050">
-            <a:solidFill>
-              <a:srgbClr val="FF0000"/>
-            </a:solidFill>
-            <a:tailEnd type="arrow"/>
-          </a:ln>
-        </p:spPr>
-        <p:style>
-          <a:lnRef idx="1">
-            <a:schemeClr val="accent1"/>
-          </a:lnRef>
-          <a:fillRef idx="0">
-            <a:schemeClr val="accent1"/>
-          </a:fillRef>
-          <a:effectRef idx="0">
-            <a:schemeClr val="accent1"/>
-          </a:effectRef>
-          <a:fontRef idx="minor">
-            <a:schemeClr val="tx1"/>
-          </a:fontRef>
-        </p:style>
-      </p:cxnSp>
-      <p:cxnSp>
-        <p:nvCxnSpPr>
-          <p:cNvPr id="28" name="Straight Arrow Connector 27"/>
-          <p:cNvCxnSpPr/>
-          <p:nvPr/>
-        </p:nvCxnSpPr>
-        <p:spPr>
-          <a:xfrm>
-            <a:off x="4764777" y="3938573"/>
-            <a:ext cx="0" cy="1440160"/>
-          </a:xfrm>
-          <a:prstGeom prst="straightConnector1">
-            <a:avLst/>
-          </a:prstGeom>
-          <a:ln w="19050">
-            <a:solidFill>
-              <a:srgbClr val="FF0000"/>
-            </a:solidFill>
-            <a:tailEnd type="arrow"/>
-          </a:ln>
-        </p:spPr>
-        <p:style>
-          <a:lnRef idx="1">
-            <a:schemeClr val="accent1"/>
-          </a:lnRef>
-          <a:fillRef idx="0">
-            <a:schemeClr val="accent1"/>
-          </a:fillRef>
-          <a:effectRef idx="0">
-            <a:schemeClr val="accent1"/>
-          </a:effectRef>
-          <a:fontRef idx="minor">
-            <a:schemeClr val="tx1"/>
-          </a:fontRef>
-        </p:style>
-      </p:cxnSp>
-      <p:cxnSp>
-        <p:nvCxnSpPr>
-          <p:cNvPr id="29" name="Straight Arrow Connector 28"/>
-          <p:cNvCxnSpPr/>
-          <p:nvPr/>
-        </p:nvCxnSpPr>
-        <p:spPr>
-          <a:xfrm>
-            <a:off x="5220072" y="3938573"/>
-            <a:ext cx="0" cy="1440160"/>
-          </a:xfrm>
-          <a:prstGeom prst="straightConnector1">
-            <a:avLst/>
-          </a:prstGeom>
-          <a:ln w="19050">
-            <a:solidFill>
-              <a:srgbClr val="FF0000"/>
-            </a:solidFill>
-            <a:tailEnd type="arrow"/>
-          </a:ln>
-        </p:spPr>
-        <p:style>
-          <a:lnRef idx="1">
-            <a:schemeClr val="accent1"/>
-          </a:lnRef>
-          <a:fillRef idx="0">
-            <a:schemeClr val="accent1"/>
-          </a:fillRef>
-          <a:effectRef idx="0">
-            <a:schemeClr val="accent1"/>
-          </a:effectRef>
-          <a:fontRef idx="minor">
-            <a:schemeClr val="tx1"/>
-          </a:fontRef>
-        </p:style>
-      </p:cxnSp>
-      <p:cxnSp>
-        <p:nvCxnSpPr>
-          <p:cNvPr id="31" name="Straight Arrow Connector 30"/>
-          <p:cNvCxnSpPr/>
-          <p:nvPr/>
-        </p:nvCxnSpPr>
-        <p:spPr>
-          <a:xfrm>
-            <a:off x="5652120" y="3938573"/>
-            <a:ext cx="0" cy="1440160"/>
-          </a:xfrm>
-          <a:prstGeom prst="straightConnector1">
-            <a:avLst/>
-          </a:prstGeom>
-          <a:ln w="19050">
-            <a:solidFill>
-              <a:srgbClr val="FF0000"/>
-            </a:solidFill>
-            <a:tailEnd type="arrow"/>
-          </a:ln>
-        </p:spPr>
-        <p:style>
-          <a:lnRef idx="1">
-            <a:schemeClr val="accent1"/>
-          </a:lnRef>
-          <a:fillRef idx="0">
-            <a:schemeClr val="accent1"/>
-          </a:fillRef>
-          <a:effectRef idx="0">
-            <a:schemeClr val="accent1"/>
-          </a:effectRef>
-          <a:fontRef idx="minor">
-            <a:schemeClr val="tx1"/>
-          </a:fontRef>
-        </p:style>
-      </p:cxnSp>
-      <p:sp>
-        <p:nvSpPr>
-          <p:cNvPr id="33" name="TextBox 32"/>
-          <p:cNvSpPr txBox="1"/>
-          <p:nvPr/>
-        </p:nvSpPr>
-        <p:spPr bwMode="auto">
-          <a:xfrm>
-            <a:off x="3203848" y="5450741"/>
-            <a:ext cx="3672408" cy="138499"/>
-          </a:xfrm>
-          <a:prstGeom prst="rect">
-            <a:avLst/>
-          </a:prstGeom>
-          <a:noFill/>
-          <a:ln w="9525">
-            <a:noFill/>
-            <a:miter lim="800000"/>
-            <a:headEnd/>
-            <a:tailEnd/>
-          </a:ln>
-          <a:effectLst/>
-        </p:spPr>
-        <p:txBody>
-          <a:bodyPr wrap="square" lIns="0" tIns="0" rIns="0" bIns="0" rtlCol="0" anchor="ctr" anchorCtr="0">
-            <a:spAutoFit/>
-          </a:bodyPr>
-          <a:lstStyle/>
-          <a:p>
-            <a:pPr eaLnBrk="0" fontAlgn="auto" hangingPunct="0">
-              <a:spcBef>
-                <a:spcPts val="0"/>
-              </a:spcBef>
-              <a:spcAft>
-                <a:spcPts val="300"/>
-              </a:spcAft>
-              <a:buClr>
-                <a:schemeClr val="accent1"/>
-              </a:buClr>
-            </a:pPr>
-            <a:r>
-              <a:rPr lang="en-US" altLang="ko-KR" sz="900" kern="0" dirty="0">
-                <a:latin typeface="Verdana" pitchFamily="34" charset="0"/>
-                <a:ea typeface="Verdana" pitchFamily="34" charset="0"/>
-                <a:cs typeface="Verdana" pitchFamily="34" charset="0"/>
-              </a:rPr>
-              <a:t>DMA_FULL_ISR is called, when buffer is full</a:t>
-            </a:r>
+              <a:t>Considering Group Delay, 10 data is ignored.</a:t>
+            </a:r>
+            <a:endParaRPr lang="en-US" altLang="ko-KR" sz="900" kern="0" dirty="0">
+              <a:latin typeface="Verdana" pitchFamily="34" charset="0"/>
+              <a:ea typeface="Verdana" pitchFamily="34" charset="0"/>
+              <a:cs typeface="Verdana" pitchFamily="34" charset="0"/>
+            </a:endParaRPr>
           </a:p>
         </p:txBody>
       </p:sp>
     </p:spTree>
     <p:extLst>
       <p:ext uri="{BB962C8B-B14F-4D97-AF65-F5344CB8AC3E}">
-        <p14:creationId xmlns:p14="http://schemas.microsoft.com/office/powerpoint/2010/main" val="2578027251"/>
+        <p14:creationId xmlns:p14="http://schemas.microsoft.com/office/powerpoint/2010/main" val="1348470548"/>
       </p:ext>
     </p:extLst>
   </p:cSld>
@@ -7253,8 +7116,12 @@
           <a:lstStyle/>
           <a:p>
             <a:r>
-              <a:rPr lang="en-US" dirty="0" smtClean="0"/>
-              <a:t>Dynamic view</a:t>
+              <a:rPr lang="en-US" altLang="ko-KR" dirty="0"/>
+              <a:t>SW Detail design </a:t>
+            </a:r>
+            <a:r>
+              <a:rPr lang="en-US" altLang="ko-KR" dirty="0" smtClean="0"/>
+              <a:t>concept-ISR</a:t>
             </a:r>
             <a:endParaRPr lang="en-US" dirty="0"/>
           </a:p>
@@ -7283,6 +7150,500 @@
               <a:rPr lang="en-US" smtClean="0"/>
               <a:pPr/>
               <a:t>11</a:t>
+            </a:fld>
+            <a:endParaRPr lang="en-US"/>
+          </a:p>
+        </p:txBody>
+      </p:sp>
+      <p:sp>
+        <p:nvSpPr>
+          <p:cNvPr id="4" name="Date Placeholder 3"/>
+          <p:cNvSpPr>
+            <a:spLocks noGrp="1"/>
+          </p:cNvSpPr>
+          <p:nvPr>
+            <p:ph type="dt" sz="half" idx="15"/>
+          </p:nvPr>
+        </p:nvSpPr>
+        <p:spPr/>
+        <p:txBody>
+          <a:bodyPr/>
+          <a:lstStyle/>
+          <a:p>
+            <a:r>
+              <a:rPr lang="en-US" smtClean="0"/>
+              <a:t>set date</a:t>
+            </a:r>
+            <a:endParaRPr lang="en-US"/>
+          </a:p>
+        </p:txBody>
+      </p:sp>
+      <p:sp>
+        <p:nvSpPr>
+          <p:cNvPr id="5" name="Footer Placeholder 4"/>
+          <p:cNvSpPr>
+            <a:spLocks noGrp="1"/>
+          </p:cNvSpPr>
+          <p:nvPr>
+            <p:ph type="ftr" sz="quarter" idx="16"/>
+          </p:nvPr>
+        </p:nvSpPr>
+        <p:spPr/>
+        <p:txBody>
+          <a:bodyPr/>
+          <a:lstStyle/>
+          <a:p>
+            <a:r>
+              <a:rPr lang="en-US" smtClean="0"/>
+              <a:t>Copyright © Infineon Technologies AG 2013. All rights reserved.</a:t>
+            </a:r>
+            <a:endParaRPr lang="en-US"/>
+          </a:p>
+        </p:txBody>
+      </p:sp>
+      <p:pic>
+        <p:nvPicPr>
+          <p:cNvPr id="8194" name="Picture 2" descr="D:\개인용\Knock_check15.jpg"/>
+          <p:cNvPicPr>
+            <a:picLocks noChangeAspect="1" noChangeArrowheads="1"/>
+          </p:cNvPicPr>
+          <p:nvPr/>
+        </p:nvPicPr>
+        <p:blipFill rotWithShape="1">
+          <a:blip r:embed="rId2">
+            <a:extLst>
+              <a:ext uri="{28A0092B-C50C-407E-A947-70E740481C1C}">
+                <a14:useLocalDpi xmlns:a14="http://schemas.microsoft.com/office/drawing/2010/main" val="0"/>
+              </a:ext>
+            </a:extLst>
+          </a:blip>
+          <a:srcRect t="12107" r="18503" b="33627"/>
+          <a:stretch/>
+        </p:blipFill>
+        <p:spPr bwMode="auto">
+          <a:xfrm>
+            <a:off x="1723094" y="2570421"/>
+            <a:ext cx="5697812" cy="2371242"/>
+          </a:xfrm>
+          <a:prstGeom prst="rect">
+            <a:avLst/>
+          </a:prstGeom>
+          <a:noFill/>
+          <a:extLst>
+            <a:ext uri="{909E8E84-426E-40DD-AFC4-6F175D3DCCD1}">
+              <a14:hiddenFill xmlns:a14="http://schemas.microsoft.com/office/drawing/2010/main">
+                <a:solidFill>
+                  <a:srgbClr val="FFFFFF"/>
+                </a:solidFill>
+              </a14:hiddenFill>
+            </a:ext>
+          </a:extLst>
+        </p:spPr>
+      </p:pic>
+      <p:cxnSp>
+        <p:nvCxnSpPr>
+          <p:cNvPr id="11" name="Straight Arrow Connector 10"/>
+          <p:cNvCxnSpPr/>
+          <p:nvPr/>
+        </p:nvCxnSpPr>
+        <p:spPr>
+          <a:xfrm flipV="1">
+            <a:off x="3898734" y="1988840"/>
+            <a:ext cx="817282" cy="941621"/>
+          </a:xfrm>
+          <a:prstGeom prst="straightConnector1">
+            <a:avLst/>
+          </a:prstGeom>
+          <a:ln w="19050">
+            <a:solidFill>
+              <a:srgbClr val="FF0000"/>
+            </a:solidFill>
+            <a:tailEnd type="arrow"/>
+          </a:ln>
+        </p:spPr>
+        <p:style>
+          <a:lnRef idx="1">
+            <a:schemeClr val="accent1"/>
+          </a:lnRef>
+          <a:fillRef idx="0">
+            <a:schemeClr val="accent1"/>
+          </a:fillRef>
+          <a:effectRef idx="0">
+            <a:schemeClr val="accent1"/>
+          </a:effectRef>
+          <a:fontRef idx="minor">
+            <a:schemeClr val="tx1"/>
+          </a:fontRef>
+        </p:style>
+      </p:cxnSp>
+      <p:cxnSp>
+        <p:nvCxnSpPr>
+          <p:cNvPr id="12" name="Straight Arrow Connector 11"/>
+          <p:cNvCxnSpPr/>
+          <p:nvPr/>
+        </p:nvCxnSpPr>
+        <p:spPr>
+          <a:xfrm flipH="1" flipV="1">
+            <a:off x="4860032" y="1988840"/>
+            <a:ext cx="936104" cy="941621"/>
+          </a:xfrm>
+          <a:prstGeom prst="straightConnector1">
+            <a:avLst/>
+          </a:prstGeom>
+          <a:ln w="19050">
+            <a:solidFill>
+              <a:srgbClr val="FF0000"/>
+            </a:solidFill>
+            <a:tailEnd type="arrow"/>
+          </a:ln>
+        </p:spPr>
+        <p:style>
+          <a:lnRef idx="1">
+            <a:schemeClr val="accent1"/>
+          </a:lnRef>
+          <a:fillRef idx="0">
+            <a:schemeClr val="accent1"/>
+          </a:fillRef>
+          <a:effectRef idx="0">
+            <a:schemeClr val="accent1"/>
+          </a:effectRef>
+          <a:fontRef idx="minor">
+            <a:schemeClr val="tx1"/>
+          </a:fontRef>
+        </p:style>
+      </p:cxnSp>
+      <p:sp>
+        <p:nvSpPr>
+          <p:cNvPr id="15" name="TextBox 14"/>
+          <p:cNvSpPr txBox="1"/>
+          <p:nvPr/>
+        </p:nvSpPr>
+        <p:spPr bwMode="auto">
+          <a:xfrm>
+            <a:off x="3275856" y="1850341"/>
+            <a:ext cx="3672408" cy="138499"/>
+          </a:xfrm>
+          <a:prstGeom prst="rect">
+            <a:avLst/>
+          </a:prstGeom>
+          <a:noFill/>
+          <a:ln w="9525">
+            <a:noFill/>
+            <a:miter lim="800000"/>
+            <a:headEnd/>
+            <a:tailEnd/>
+          </a:ln>
+          <a:effectLst/>
+        </p:spPr>
+        <p:txBody>
+          <a:bodyPr wrap="square" lIns="0" tIns="0" rIns="0" bIns="0" rtlCol="0" anchor="ctr" anchorCtr="0">
+            <a:spAutoFit/>
+          </a:bodyPr>
+          <a:lstStyle/>
+          <a:p>
+            <a:pPr marR="0" defTabSz="914400" eaLnBrk="0" fontAlgn="auto" latinLnBrk="0" hangingPunct="0">
+              <a:spcBef>
+                <a:spcPts val="0"/>
+              </a:spcBef>
+              <a:spcAft>
+                <a:spcPts val="300"/>
+              </a:spcAft>
+              <a:buClr>
+                <a:schemeClr val="accent1"/>
+              </a:buClr>
+              <a:buSzTx/>
+              <a:tabLst/>
+            </a:pPr>
+            <a:r>
+              <a:rPr lang="en-US" altLang="ko-KR" sz="900" kern="0" dirty="0" err="1">
+                <a:latin typeface="Verdana" pitchFamily="34" charset="0"/>
+                <a:ea typeface="Verdana" pitchFamily="34" charset="0"/>
+                <a:cs typeface="Verdana" pitchFamily="34" charset="0"/>
+              </a:rPr>
+              <a:t>Knocheck_Window_ISR</a:t>
+            </a:r>
+            <a:r>
+              <a:rPr lang="en-US" altLang="ko-KR" sz="900" kern="0" dirty="0">
+                <a:latin typeface="Verdana" pitchFamily="34" charset="0"/>
+                <a:ea typeface="Verdana" pitchFamily="34" charset="0"/>
+                <a:cs typeface="Verdana" pitchFamily="34" charset="0"/>
+              </a:rPr>
+              <a:t> is called, when window open or close</a:t>
+            </a:r>
+          </a:p>
+        </p:txBody>
+      </p:sp>
+      <p:cxnSp>
+        <p:nvCxnSpPr>
+          <p:cNvPr id="22" name="Straight Arrow Connector 21"/>
+          <p:cNvCxnSpPr/>
+          <p:nvPr/>
+        </p:nvCxnSpPr>
+        <p:spPr>
+          <a:xfrm>
+            <a:off x="4322713" y="3938573"/>
+            <a:ext cx="0" cy="1440160"/>
+          </a:xfrm>
+          <a:prstGeom prst="straightConnector1">
+            <a:avLst/>
+          </a:prstGeom>
+          <a:ln w="19050">
+            <a:solidFill>
+              <a:srgbClr val="FF0000"/>
+            </a:solidFill>
+            <a:tailEnd type="arrow"/>
+          </a:ln>
+        </p:spPr>
+        <p:style>
+          <a:lnRef idx="1">
+            <a:schemeClr val="accent1"/>
+          </a:lnRef>
+          <a:fillRef idx="0">
+            <a:schemeClr val="accent1"/>
+          </a:fillRef>
+          <a:effectRef idx="0">
+            <a:schemeClr val="accent1"/>
+          </a:effectRef>
+          <a:fontRef idx="minor">
+            <a:schemeClr val="tx1"/>
+          </a:fontRef>
+        </p:style>
+      </p:cxnSp>
+      <p:cxnSp>
+        <p:nvCxnSpPr>
+          <p:cNvPr id="28" name="Straight Arrow Connector 27"/>
+          <p:cNvCxnSpPr/>
+          <p:nvPr/>
+        </p:nvCxnSpPr>
+        <p:spPr>
+          <a:xfrm>
+            <a:off x="4764777" y="3938573"/>
+            <a:ext cx="0" cy="1440160"/>
+          </a:xfrm>
+          <a:prstGeom prst="straightConnector1">
+            <a:avLst/>
+          </a:prstGeom>
+          <a:ln w="19050">
+            <a:solidFill>
+              <a:srgbClr val="FF0000"/>
+            </a:solidFill>
+            <a:tailEnd type="arrow"/>
+          </a:ln>
+        </p:spPr>
+        <p:style>
+          <a:lnRef idx="1">
+            <a:schemeClr val="accent1"/>
+          </a:lnRef>
+          <a:fillRef idx="0">
+            <a:schemeClr val="accent1"/>
+          </a:fillRef>
+          <a:effectRef idx="0">
+            <a:schemeClr val="accent1"/>
+          </a:effectRef>
+          <a:fontRef idx="minor">
+            <a:schemeClr val="tx1"/>
+          </a:fontRef>
+        </p:style>
+      </p:cxnSp>
+      <p:cxnSp>
+        <p:nvCxnSpPr>
+          <p:cNvPr id="29" name="Straight Arrow Connector 28"/>
+          <p:cNvCxnSpPr/>
+          <p:nvPr/>
+        </p:nvCxnSpPr>
+        <p:spPr>
+          <a:xfrm>
+            <a:off x="5220072" y="3938573"/>
+            <a:ext cx="0" cy="1440160"/>
+          </a:xfrm>
+          <a:prstGeom prst="straightConnector1">
+            <a:avLst/>
+          </a:prstGeom>
+          <a:ln w="19050">
+            <a:solidFill>
+              <a:srgbClr val="FF0000"/>
+            </a:solidFill>
+            <a:tailEnd type="arrow"/>
+          </a:ln>
+        </p:spPr>
+        <p:style>
+          <a:lnRef idx="1">
+            <a:schemeClr val="accent1"/>
+          </a:lnRef>
+          <a:fillRef idx="0">
+            <a:schemeClr val="accent1"/>
+          </a:fillRef>
+          <a:effectRef idx="0">
+            <a:schemeClr val="accent1"/>
+          </a:effectRef>
+          <a:fontRef idx="minor">
+            <a:schemeClr val="tx1"/>
+          </a:fontRef>
+        </p:style>
+      </p:cxnSp>
+      <p:cxnSp>
+        <p:nvCxnSpPr>
+          <p:cNvPr id="31" name="Straight Arrow Connector 30"/>
+          <p:cNvCxnSpPr/>
+          <p:nvPr/>
+        </p:nvCxnSpPr>
+        <p:spPr>
+          <a:xfrm>
+            <a:off x="5652120" y="3938573"/>
+            <a:ext cx="0" cy="1440160"/>
+          </a:xfrm>
+          <a:prstGeom prst="straightConnector1">
+            <a:avLst/>
+          </a:prstGeom>
+          <a:ln w="19050">
+            <a:solidFill>
+              <a:srgbClr val="FF0000"/>
+            </a:solidFill>
+            <a:tailEnd type="arrow"/>
+          </a:ln>
+        </p:spPr>
+        <p:style>
+          <a:lnRef idx="1">
+            <a:schemeClr val="accent1"/>
+          </a:lnRef>
+          <a:fillRef idx="0">
+            <a:schemeClr val="accent1"/>
+          </a:fillRef>
+          <a:effectRef idx="0">
+            <a:schemeClr val="accent1"/>
+          </a:effectRef>
+          <a:fontRef idx="minor">
+            <a:schemeClr val="tx1"/>
+          </a:fontRef>
+        </p:style>
+      </p:cxnSp>
+      <p:sp>
+        <p:nvSpPr>
+          <p:cNvPr id="33" name="TextBox 32"/>
+          <p:cNvSpPr txBox="1"/>
+          <p:nvPr/>
+        </p:nvSpPr>
+        <p:spPr bwMode="auto">
+          <a:xfrm>
+            <a:off x="3203848" y="5450741"/>
+            <a:ext cx="3672408" cy="138499"/>
+          </a:xfrm>
+          <a:prstGeom prst="rect">
+            <a:avLst/>
+          </a:prstGeom>
+          <a:noFill/>
+          <a:ln w="9525">
+            <a:noFill/>
+            <a:miter lim="800000"/>
+            <a:headEnd/>
+            <a:tailEnd/>
+          </a:ln>
+          <a:effectLst/>
+        </p:spPr>
+        <p:txBody>
+          <a:bodyPr wrap="square" lIns="0" tIns="0" rIns="0" bIns="0" rtlCol="0" anchor="ctr" anchorCtr="0">
+            <a:spAutoFit/>
+          </a:bodyPr>
+          <a:lstStyle/>
+          <a:p>
+            <a:pPr eaLnBrk="0" fontAlgn="auto" hangingPunct="0">
+              <a:spcBef>
+                <a:spcPts val="0"/>
+              </a:spcBef>
+              <a:spcAft>
+                <a:spcPts val="300"/>
+              </a:spcAft>
+              <a:buClr>
+                <a:schemeClr val="accent1"/>
+              </a:buClr>
+            </a:pPr>
+            <a:r>
+              <a:rPr lang="en-US" altLang="ko-KR" sz="900" kern="0" dirty="0">
+                <a:latin typeface="Verdana" pitchFamily="34" charset="0"/>
+                <a:ea typeface="Verdana" pitchFamily="34" charset="0"/>
+                <a:cs typeface="Verdana" pitchFamily="34" charset="0"/>
+              </a:rPr>
+              <a:t>DMA_FULL_ISR is called, when buffer is full</a:t>
+            </a:r>
+          </a:p>
+        </p:txBody>
+      </p:sp>
+    </p:spTree>
+    <p:extLst>
+      <p:ext uri="{BB962C8B-B14F-4D97-AF65-F5344CB8AC3E}">
+        <p14:creationId xmlns:p14="http://schemas.microsoft.com/office/powerpoint/2010/main" val="2578027251"/>
+      </p:ext>
+    </p:extLst>
+  </p:cSld>
+  <p:clrMapOvr>
+    <a:masterClrMapping/>
+  </p:clrMapOvr>
+</p:sld>
+</file>
+
+<file path=ppt/slides/slide12.xml><?xml version="1.0" encoding="utf-8"?>
+<p:sld xmlns:a="http://schemas.openxmlformats.org/drawingml/2006/main" xmlns:r="http://schemas.openxmlformats.org/officeDocument/2006/relationships" xmlns:p="http://schemas.openxmlformats.org/presentationml/2006/main">
+  <p:cSld>
+    <p:spTree>
+      <p:nvGrpSpPr>
+        <p:cNvPr id="1" name=""/>
+        <p:cNvGrpSpPr/>
+        <p:nvPr/>
+      </p:nvGrpSpPr>
+      <p:grpSpPr>
+        <a:xfrm>
+          <a:off x="0" y="0"/>
+          <a:ext cx="0" cy="0"/>
+          <a:chOff x="0" y="0"/>
+          <a:chExt cx="0" cy="0"/>
+        </a:xfrm>
+      </p:grpSpPr>
+      <p:sp>
+        <p:nvSpPr>
+          <p:cNvPr id="6" name="Title 5"/>
+          <p:cNvSpPr>
+            <a:spLocks noGrp="1"/>
+          </p:cNvSpPr>
+          <p:nvPr>
+            <p:ph type="title"/>
+          </p:nvPr>
+        </p:nvSpPr>
+        <p:spPr/>
+        <p:txBody>
+          <a:bodyPr/>
+          <a:lstStyle/>
+          <a:p>
+            <a:r>
+              <a:rPr lang="en-US" dirty="0" smtClean="0"/>
+              <a:t>Dynamic view</a:t>
+            </a:r>
+            <a:endParaRPr lang="en-US" dirty="0"/>
+          </a:p>
+        </p:txBody>
+      </p:sp>
+      <p:sp>
+        <p:nvSpPr>
+          <p:cNvPr id="3" name="Slide Number Placeholder 2"/>
+          <p:cNvSpPr>
+            <a:spLocks noGrp="1"/>
+          </p:cNvSpPr>
+          <p:nvPr>
+            <p:ph type="sldNum" sz="quarter" idx="14"/>
+          </p:nvPr>
+        </p:nvSpPr>
+        <p:spPr/>
+        <p:txBody>
+          <a:bodyPr/>
+          <a:lstStyle/>
+          <a:p>
+            <a:r>
+              <a:rPr lang="en-US" smtClean="0"/>
+              <a:t>Page </a:t>
+            </a:r>
+            <a:fld id="{C770E174-C44B-418F-89A4-426EF6EE2C67}" type="slidenum">
+              <a:rPr lang="en-US" smtClean="0"/>
+              <a:pPr/>
+              <a:t>12</a:t>
             </a:fld>
             <a:endParaRPr lang="en-US"/>
           </a:p>
@@ -7401,7 +7762,7 @@
 </p:sld>
 </file>
 
-<file path=ppt/slides/slide12.xml><?xml version="1.0" encoding="utf-8"?>
+<file path=ppt/slides/slide13.xml><?xml version="1.0" encoding="utf-8"?>
 <p:sld xmlns:a="http://schemas.openxmlformats.org/drawingml/2006/main" xmlns:r="http://schemas.openxmlformats.org/officeDocument/2006/relationships" xmlns:p="http://schemas.openxmlformats.org/presentationml/2006/main">
   <p:cSld>
     <p:spTree>
@@ -7463,7 +7824,7 @@
             <a:fld id="{C770E174-C44B-418F-89A4-426EF6EE2C67}" type="slidenum">
               <a:rPr lang="en-US" smtClean="0"/>
               <a:pPr/>
-              <a:t>12</a:t>
+              <a:t>13</a:t>
             </a:fld>
             <a:endParaRPr lang="en-US"/>
           </a:p>
@@ -7582,7 +7943,7 @@
 </p:sld>
 </file>
 
-<file path=ppt/slides/slide13.xml><?xml version="1.0" encoding="utf-8"?>
+<file path=ppt/slides/slide14.xml><?xml version="1.0" encoding="utf-8"?>
 <p:sld xmlns:a="http://schemas.openxmlformats.org/drawingml/2006/main" xmlns:r="http://schemas.openxmlformats.org/officeDocument/2006/relationships" xmlns:p="http://schemas.openxmlformats.org/presentationml/2006/main">
   <p:cSld>
     <p:spTree>
@@ -7644,7 +8005,7 @@
             <a:fld id="{C770E174-C44B-418F-89A4-426EF6EE2C67}" type="slidenum">
               <a:rPr lang="en-US" smtClean="0"/>
               <a:pPr/>
-              <a:t>13</a:t>
+              <a:t>14</a:t>
             </a:fld>
             <a:endParaRPr lang="en-US"/>
           </a:p>
@@ -7763,7 +8124,7 @@
 </p:sld>
 </file>
 
-<file path=ppt/slides/slide14.xml><?xml version="1.0" encoding="utf-8"?>
+<file path=ppt/slides/slide15.xml><?xml version="1.0" encoding="utf-8"?>
 <p:sld xmlns:a="http://schemas.openxmlformats.org/drawingml/2006/main" xmlns:r="http://schemas.openxmlformats.org/officeDocument/2006/relationships" xmlns:p="http://schemas.openxmlformats.org/presentationml/2006/main">
   <p:cSld>
     <p:spTree>
@@ -7825,7 +8186,7 @@
             <a:fld id="{C770E174-C44B-418F-89A4-426EF6EE2C67}" type="slidenum">
               <a:rPr lang="en-US" smtClean="0"/>
               <a:pPr/>
-              <a:t>14</a:t>
+              <a:t>15</a:t>
             </a:fld>
             <a:endParaRPr lang="en-US"/>
           </a:p>
@@ -8522,297 +8883,6 @@
     <p:extLst>
       <p:ext uri="{BB962C8B-B14F-4D97-AF65-F5344CB8AC3E}">
         <p14:creationId xmlns:p14="http://schemas.microsoft.com/office/powerpoint/2010/main" val="979372837"/>
-      </p:ext>
-    </p:extLst>
-  </p:cSld>
-  <p:clrMapOvr>
-    <a:masterClrMapping/>
-  </p:clrMapOvr>
-</p:sld>
-</file>
-
-<file path=ppt/slides/slide15.xml><?xml version="1.0" encoding="utf-8"?>
-<p:sld xmlns:a="http://schemas.openxmlformats.org/drawingml/2006/main" xmlns:r="http://schemas.openxmlformats.org/officeDocument/2006/relationships" xmlns:p="http://schemas.openxmlformats.org/presentationml/2006/main">
-  <p:cSld>
-    <p:spTree>
-      <p:nvGrpSpPr>
-        <p:cNvPr id="1" name=""/>
-        <p:cNvGrpSpPr/>
-        <p:nvPr/>
-      </p:nvGrpSpPr>
-      <p:grpSpPr>
-        <a:xfrm>
-          <a:off x="0" y="0"/>
-          <a:ext cx="0" cy="0"/>
-          <a:chOff x="0" y="0"/>
-          <a:chExt cx="0" cy="0"/>
-        </a:xfrm>
-      </p:grpSpPr>
-      <p:sp>
-        <p:nvSpPr>
-          <p:cNvPr id="6" name="Title 5"/>
-          <p:cNvSpPr>
-            <a:spLocks noGrp="1"/>
-          </p:cNvSpPr>
-          <p:nvPr>
-            <p:ph type="title"/>
-          </p:nvPr>
-        </p:nvSpPr>
-        <p:spPr/>
-        <p:txBody>
-          <a:bodyPr/>
-          <a:lstStyle/>
-          <a:p>
-            <a:r>
-              <a:rPr lang="en-US" dirty="0" smtClean="0"/>
-              <a:t>Test Result-Window length change</a:t>
-            </a:r>
-            <a:endParaRPr lang="en-US" dirty="0"/>
-          </a:p>
-        </p:txBody>
-      </p:sp>
-      <p:sp>
-        <p:nvSpPr>
-          <p:cNvPr id="3" name="Slide Number Placeholder 2"/>
-          <p:cNvSpPr>
-            <a:spLocks noGrp="1"/>
-          </p:cNvSpPr>
-          <p:nvPr>
-            <p:ph type="sldNum" sz="quarter" idx="14"/>
-          </p:nvPr>
-        </p:nvSpPr>
-        <p:spPr/>
-        <p:txBody>
-          <a:bodyPr/>
-          <a:lstStyle/>
-          <a:p>
-            <a:r>
-              <a:rPr lang="en-US" smtClean="0"/>
-              <a:t>Page </a:t>
-            </a:r>
-            <a:fld id="{C770E174-C44B-418F-89A4-426EF6EE2C67}" type="slidenum">
-              <a:rPr lang="en-US" smtClean="0"/>
-              <a:pPr/>
-              <a:t>15</a:t>
-            </a:fld>
-            <a:endParaRPr lang="en-US"/>
-          </a:p>
-        </p:txBody>
-      </p:sp>
-      <p:sp>
-        <p:nvSpPr>
-          <p:cNvPr id="4" name="Date Placeholder 3"/>
-          <p:cNvSpPr>
-            <a:spLocks noGrp="1"/>
-          </p:cNvSpPr>
-          <p:nvPr>
-            <p:ph type="dt" sz="half" idx="15"/>
-          </p:nvPr>
-        </p:nvSpPr>
-        <p:spPr/>
-        <p:txBody>
-          <a:bodyPr/>
-          <a:lstStyle/>
-          <a:p>
-            <a:r>
-              <a:rPr lang="en-US" smtClean="0"/>
-              <a:t>set date</a:t>
-            </a:r>
-            <a:endParaRPr lang="en-US"/>
-          </a:p>
-        </p:txBody>
-      </p:sp>
-      <p:sp>
-        <p:nvSpPr>
-          <p:cNvPr id="5" name="Footer Placeholder 4"/>
-          <p:cNvSpPr>
-            <a:spLocks noGrp="1"/>
-          </p:cNvSpPr>
-          <p:nvPr>
-            <p:ph type="ftr" sz="quarter" idx="16"/>
-          </p:nvPr>
-        </p:nvSpPr>
-        <p:spPr/>
-        <p:txBody>
-          <a:bodyPr/>
-          <a:lstStyle/>
-          <a:p>
-            <a:r>
-              <a:rPr lang="en-US" smtClean="0"/>
-              <a:t>Copyright © Infineon Technologies AG 2013. All rights reserved.</a:t>
-            </a:r>
-            <a:endParaRPr lang="en-US"/>
-          </a:p>
-        </p:txBody>
-      </p:sp>
-      <p:pic>
-        <p:nvPicPr>
-          <p:cNvPr id="15362" name="Picture 2" descr="D:\개인용\Knock_check18.jpg"/>
-          <p:cNvPicPr>
-            <a:picLocks noChangeAspect="1" noChangeArrowheads="1"/>
-          </p:cNvPicPr>
-          <p:nvPr/>
-        </p:nvPicPr>
-        <p:blipFill>
-          <a:blip r:embed="rId2" cstate="print">
-            <a:extLst>
-              <a:ext uri="{28A0092B-C50C-407E-A947-70E740481C1C}">
-                <a14:useLocalDpi xmlns:a14="http://schemas.microsoft.com/office/drawing/2010/main" val="0"/>
-              </a:ext>
-            </a:extLst>
-          </a:blip>
-          <a:srcRect/>
-          <a:stretch>
-            <a:fillRect/>
-          </a:stretch>
-        </p:blipFill>
-        <p:spPr bwMode="auto">
-          <a:xfrm>
-            <a:off x="917871" y="1772816"/>
-            <a:ext cx="3341171" cy="2088232"/>
-          </a:xfrm>
-          <a:prstGeom prst="rect">
-            <a:avLst/>
-          </a:prstGeom>
-          <a:noFill/>
-          <a:extLst>
-            <a:ext uri="{909E8E84-426E-40DD-AFC4-6F175D3DCCD1}">
-              <a14:hiddenFill xmlns:a14="http://schemas.microsoft.com/office/drawing/2010/main">
-                <a:solidFill>
-                  <a:srgbClr val="FFFFFF"/>
-                </a:solidFill>
-              </a14:hiddenFill>
-            </a:ext>
-          </a:extLst>
-        </p:spPr>
-      </p:pic>
-      <p:pic>
-        <p:nvPicPr>
-          <p:cNvPr id="15363" name="Picture 3" descr="D:\개인용\Knock_check19.jpg"/>
-          <p:cNvPicPr>
-            <a:picLocks noChangeAspect="1" noChangeArrowheads="1"/>
-          </p:cNvPicPr>
-          <p:nvPr/>
-        </p:nvPicPr>
-        <p:blipFill>
-          <a:blip r:embed="rId3" cstate="print">
-            <a:extLst>
-              <a:ext uri="{28A0092B-C50C-407E-A947-70E740481C1C}">
-                <a14:useLocalDpi xmlns:a14="http://schemas.microsoft.com/office/drawing/2010/main" val="0"/>
-              </a:ext>
-            </a:extLst>
-          </a:blip>
-          <a:srcRect/>
-          <a:stretch>
-            <a:fillRect/>
-          </a:stretch>
-        </p:blipFill>
-        <p:spPr bwMode="auto">
-          <a:xfrm>
-            <a:off x="4302107" y="1749202"/>
-            <a:ext cx="3494166" cy="2183854"/>
-          </a:xfrm>
-          <a:prstGeom prst="rect">
-            <a:avLst/>
-          </a:prstGeom>
-          <a:noFill/>
-          <a:extLst>
-            <a:ext uri="{909E8E84-426E-40DD-AFC4-6F175D3DCCD1}">
-              <a14:hiddenFill xmlns:a14="http://schemas.microsoft.com/office/drawing/2010/main">
-                <a:solidFill>
-                  <a:srgbClr val="FFFFFF"/>
-                </a:solidFill>
-              </a14:hiddenFill>
-            </a:ext>
-          </a:extLst>
-        </p:spPr>
-      </p:pic>
-      <p:pic>
-        <p:nvPicPr>
-          <p:cNvPr id="8" name="Picture 2" descr="D:\개인용\Knock_check18.jpg"/>
-          <p:cNvPicPr>
-            <a:picLocks noChangeAspect="1" noChangeArrowheads="1"/>
-          </p:cNvPicPr>
-          <p:nvPr/>
-        </p:nvPicPr>
-        <p:blipFill>
-          <a:blip r:embed="rId2" cstate="print">
-            <a:extLst>
-              <a:ext uri="{28A0092B-C50C-407E-A947-70E740481C1C}">
-                <a14:useLocalDpi xmlns:a14="http://schemas.microsoft.com/office/drawing/2010/main" val="0"/>
-              </a:ext>
-            </a:extLst>
-          </a:blip>
-          <a:srcRect/>
-          <a:stretch>
-            <a:fillRect/>
-          </a:stretch>
-        </p:blipFill>
-        <p:spPr bwMode="auto">
-          <a:xfrm>
-            <a:off x="909679" y="1797013"/>
-            <a:ext cx="3341171" cy="2088232"/>
-          </a:xfrm>
-          <a:prstGeom prst="rect">
-            <a:avLst/>
-          </a:prstGeom>
-          <a:noFill/>
-          <a:extLst>
-            <a:ext uri="{909E8E84-426E-40DD-AFC4-6F175D3DCCD1}">
-              <a14:hiddenFill xmlns:a14="http://schemas.microsoft.com/office/drawing/2010/main">
-                <a:solidFill>
-                  <a:srgbClr val="FFFFFF"/>
-                </a:solidFill>
-              </a14:hiddenFill>
-            </a:ext>
-          </a:extLst>
-        </p:spPr>
-      </p:pic>
-      <p:pic>
-        <p:nvPicPr>
-          <p:cNvPr id="9" name="Picture 12" descr="red pass.jpg (289×175)"/>
-          <p:cNvPicPr>
-            <a:picLocks noChangeAspect="1" noChangeArrowheads="1"/>
-          </p:cNvPicPr>
-          <p:nvPr/>
-        </p:nvPicPr>
-        <p:blipFill>
-          <a:blip r:embed="rId4">
-            <a:extLst>
-              <a:ext uri="{28A0092B-C50C-407E-A947-70E740481C1C}">
-                <a14:useLocalDpi xmlns:a14="http://schemas.microsoft.com/office/drawing/2010/main" val="0"/>
-              </a:ext>
-            </a:extLst>
-          </a:blip>
-          <a:srcRect/>
-          <a:stretch>
-            <a:fillRect/>
-          </a:stretch>
-        </p:blipFill>
-        <p:spPr bwMode="auto">
-          <a:xfrm>
-            <a:off x="7116667" y="924712"/>
-            <a:ext cx="1788192" cy="1082815"/>
-          </a:xfrm>
-          <a:prstGeom prst="rect">
-            <a:avLst/>
-          </a:prstGeom>
-          <a:noFill/>
-          <a:extLst>
-            <a:ext uri="{909E8E84-426E-40DD-AFC4-6F175D3DCCD1}">
-              <a14:hiddenFill xmlns:a14="http://schemas.microsoft.com/office/drawing/2010/main">
-                <a:solidFill>
-                  <a:srgbClr val="FFFFFF"/>
-                </a:solidFill>
-              </a14:hiddenFill>
-            </a:ext>
-          </a:extLst>
-        </p:spPr>
-      </p:pic>
-    </p:spTree>
-    <p:extLst>
-      <p:ext uri="{BB962C8B-B14F-4D97-AF65-F5344CB8AC3E}">
-        <p14:creationId xmlns:p14="http://schemas.microsoft.com/office/powerpoint/2010/main" val="2311286736"/>
       </p:ext>
     </p:extLst>
   </p:cSld>
@@ -8855,12 +8925,8 @@
           <a:lstStyle/>
           <a:p>
             <a:r>
-              <a:rPr lang="en-US" altLang="ko-KR" dirty="0"/>
-              <a:t>Test </a:t>
-            </a:r>
-            <a:r>
-              <a:rPr lang="en-US" altLang="ko-KR" dirty="0" smtClean="0"/>
-              <a:t>Result-Module Enable</a:t>
+              <a:rPr lang="en-US" dirty="0" smtClean="0"/>
+              <a:t>Test Result-Window length change</a:t>
             </a:r>
             <a:endParaRPr lang="en-US" dirty="0"/>
           </a:p>
@@ -8942,7 +9008,7 @@
       </p:sp>
       <p:pic>
         <p:nvPicPr>
-          <p:cNvPr id="7" name="Picture 2" descr="D:\개인용\Knock_check18.jpg"/>
+          <p:cNvPr id="15362" name="Picture 2" descr="D:\개인용\Knock_check18.jpg"/>
           <p:cNvPicPr>
             <a:picLocks noChangeAspect="1" noChangeArrowheads="1"/>
           </p:cNvPicPr>
@@ -8963,8 +9029,8 @@
         </p:blipFill>
         <p:spPr bwMode="auto">
           <a:xfrm>
-            <a:off x="179512" y="1340768"/>
-            <a:ext cx="3746258" cy="2341411"/>
+            <a:off x="917871" y="1772816"/>
+            <a:ext cx="3341171" cy="2088232"/>
           </a:xfrm>
           <a:prstGeom prst="rect">
             <a:avLst/>
@@ -8983,7 +9049,7 @@
       </p:pic>
       <p:pic>
         <p:nvPicPr>
-          <p:cNvPr id="16386" name="Picture 2" descr="D:\개인용\Knock_check23.jpg"/>
+          <p:cNvPr id="15363" name="Picture 3" descr="D:\개인용\Knock_check19.jpg"/>
           <p:cNvPicPr>
             <a:picLocks noChangeAspect="1" noChangeArrowheads="1"/>
           </p:cNvPicPr>
@@ -9004,8 +9070,8 @@
         </p:blipFill>
         <p:spPr bwMode="auto">
           <a:xfrm>
-            <a:off x="4311027" y="1341473"/>
-            <a:ext cx="3743999" cy="2340000"/>
+            <a:off x="4302107" y="1749202"/>
+            <a:ext cx="3494166" cy="2183854"/>
           </a:xfrm>
           <a:prstGeom prst="rect">
             <a:avLst/>
@@ -9024,14 +9090,14 @@
       </p:pic>
       <p:pic>
         <p:nvPicPr>
-          <p:cNvPr id="16387" name="Picture 3" descr="D:\개인용\Knock_check24.jpg"/>
+          <p:cNvPr id="8" name="Picture 2" descr="D:\개인용\Knock_check18.jpg"/>
           <p:cNvPicPr>
             <a:picLocks noChangeAspect="1" noChangeArrowheads="1"/>
           </p:cNvPicPr>
           <p:nvPr/>
         </p:nvPicPr>
         <p:blipFill>
-          <a:blip r:embed="rId4" cstate="print">
+          <a:blip r:embed="rId2" cstate="print">
             <a:extLst>
               <a:ext uri="{28A0092B-C50C-407E-A947-70E740481C1C}">
                 <a14:useLocalDpi xmlns:a14="http://schemas.microsoft.com/office/drawing/2010/main" val="0"/>
@@ -9045,8 +9111,8 @@
         </p:blipFill>
         <p:spPr bwMode="auto">
           <a:xfrm>
-            <a:off x="4311026" y="3830759"/>
-            <a:ext cx="3744000" cy="2340000"/>
+            <a:off x="909679" y="1797013"/>
+            <a:ext cx="3341171" cy="2088232"/>
           </a:xfrm>
           <a:prstGeom prst="rect">
             <a:avLst/>
@@ -9065,14 +9131,14 @@
       </p:pic>
       <p:pic>
         <p:nvPicPr>
-          <p:cNvPr id="10" name="Picture 12" descr="red pass.jpg (289×175)"/>
+          <p:cNvPr id="9" name="Picture 12" descr="red pass.jpg (289×175)"/>
           <p:cNvPicPr>
             <a:picLocks noChangeAspect="1" noChangeArrowheads="1"/>
           </p:cNvPicPr>
           <p:nvPr/>
         </p:nvPicPr>
         <p:blipFill>
-          <a:blip r:embed="rId5">
+          <a:blip r:embed="rId4">
             <a:extLst>
               <a:ext uri="{28A0092B-C50C-407E-A947-70E740481C1C}">
                 <a14:useLocalDpi xmlns:a14="http://schemas.microsoft.com/office/drawing/2010/main" val="0"/>
@@ -9107,7 +9173,7 @@
     </p:spTree>
     <p:extLst>
       <p:ext uri="{BB962C8B-B14F-4D97-AF65-F5344CB8AC3E}">
-        <p14:creationId xmlns:p14="http://schemas.microsoft.com/office/powerpoint/2010/main" val="4143825099"/>
+        <p14:creationId xmlns:p14="http://schemas.microsoft.com/office/powerpoint/2010/main" val="2311286736"/>
       </p:ext>
     </p:extLst>
   </p:cSld>
@@ -9155,7 +9221,7 @@
             </a:r>
             <a:r>
               <a:rPr lang="en-US" altLang="ko-KR" dirty="0" smtClean="0"/>
-              <a:t>Result-DSADC measurement</a:t>
+              <a:t>Result-Module Enable</a:t>
             </a:r>
             <a:endParaRPr lang="en-US" dirty="0"/>
           </a:p>
@@ -9184,6 +9250,301 @@
               <a:rPr lang="en-US" smtClean="0"/>
               <a:pPr/>
               <a:t>17</a:t>
+            </a:fld>
+            <a:endParaRPr lang="en-US"/>
+          </a:p>
+        </p:txBody>
+      </p:sp>
+      <p:sp>
+        <p:nvSpPr>
+          <p:cNvPr id="4" name="Date Placeholder 3"/>
+          <p:cNvSpPr>
+            <a:spLocks noGrp="1"/>
+          </p:cNvSpPr>
+          <p:nvPr>
+            <p:ph type="dt" sz="half" idx="15"/>
+          </p:nvPr>
+        </p:nvSpPr>
+        <p:spPr/>
+        <p:txBody>
+          <a:bodyPr/>
+          <a:lstStyle/>
+          <a:p>
+            <a:r>
+              <a:rPr lang="en-US" smtClean="0"/>
+              <a:t>set date</a:t>
+            </a:r>
+            <a:endParaRPr lang="en-US"/>
+          </a:p>
+        </p:txBody>
+      </p:sp>
+      <p:sp>
+        <p:nvSpPr>
+          <p:cNvPr id="5" name="Footer Placeholder 4"/>
+          <p:cNvSpPr>
+            <a:spLocks noGrp="1"/>
+          </p:cNvSpPr>
+          <p:nvPr>
+            <p:ph type="ftr" sz="quarter" idx="16"/>
+          </p:nvPr>
+        </p:nvSpPr>
+        <p:spPr/>
+        <p:txBody>
+          <a:bodyPr/>
+          <a:lstStyle/>
+          <a:p>
+            <a:r>
+              <a:rPr lang="en-US" smtClean="0"/>
+              <a:t>Copyright © Infineon Technologies AG 2013. All rights reserved.</a:t>
+            </a:r>
+            <a:endParaRPr lang="en-US"/>
+          </a:p>
+        </p:txBody>
+      </p:sp>
+      <p:pic>
+        <p:nvPicPr>
+          <p:cNvPr id="7" name="Picture 2" descr="D:\개인용\Knock_check18.jpg"/>
+          <p:cNvPicPr>
+            <a:picLocks noChangeAspect="1" noChangeArrowheads="1"/>
+          </p:cNvPicPr>
+          <p:nvPr/>
+        </p:nvPicPr>
+        <p:blipFill>
+          <a:blip r:embed="rId2" cstate="print">
+            <a:extLst>
+              <a:ext uri="{28A0092B-C50C-407E-A947-70E740481C1C}">
+                <a14:useLocalDpi xmlns:a14="http://schemas.microsoft.com/office/drawing/2010/main" val="0"/>
+              </a:ext>
+            </a:extLst>
+          </a:blip>
+          <a:srcRect/>
+          <a:stretch>
+            <a:fillRect/>
+          </a:stretch>
+        </p:blipFill>
+        <p:spPr bwMode="auto">
+          <a:xfrm>
+            <a:off x="179512" y="1340768"/>
+            <a:ext cx="3746258" cy="2341411"/>
+          </a:xfrm>
+          <a:prstGeom prst="rect">
+            <a:avLst/>
+          </a:prstGeom>
+          <a:noFill/>
+          <a:extLst>
+            <a:ext uri="{909E8E84-426E-40DD-AFC4-6F175D3DCCD1}">
+              <a14:hiddenFill xmlns:a14="http://schemas.microsoft.com/office/drawing/2010/main">
+                <a:solidFill>
+                  <a:srgbClr val="FFFFFF"/>
+                </a:solidFill>
+              </a14:hiddenFill>
+            </a:ext>
+          </a:extLst>
+        </p:spPr>
+      </p:pic>
+      <p:pic>
+        <p:nvPicPr>
+          <p:cNvPr id="16386" name="Picture 2" descr="D:\개인용\Knock_check23.jpg"/>
+          <p:cNvPicPr>
+            <a:picLocks noChangeAspect="1" noChangeArrowheads="1"/>
+          </p:cNvPicPr>
+          <p:nvPr/>
+        </p:nvPicPr>
+        <p:blipFill>
+          <a:blip r:embed="rId3" cstate="print">
+            <a:extLst>
+              <a:ext uri="{28A0092B-C50C-407E-A947-70E740481C1C}">
+                <a14:useLocalDpi xmlns:a14="http://schemas.microsoft.com/office/drawing/2010/main" val="0"/>
+              </a:ext>
+            </a:extLst>
+          </a:blip>
+          <a:srcRect/>
+          <a:stretch>
+            <a:fillRect/>
+          </a:stretch>
+        </p:blipFill>
+        <p:spPr bwMode="auto">
+          <a:xfrm>
+            <a:off x="4311027" y="1341473"/>
+            <a:ext cx="3743999" cy="2340000"/>
+          </a:xfrm>
+          <a:prstGeom prst="rect">
+            <a:avLst/>
+          </a:prstGeom>
+          <a:noFill/>
+          <a:extLst>
+            <a:ext uri="{909E8E84-426E-40DD-AFC4-6F175D3DCCD1}">
+              <a14:hiddenFill xmlns:a14="http://schemas.microsoft.com/office/drawing/2010/main">
+                <a:solidFill>
+                  <a:srgbClr val="FFFFFF"/>
+                </a:solidFill>
+              </a14:hiddenFill>
+            </a:ext>
+          </a:extLst>
+        </p:spPr>
+      </p:pic>
+      <p:pic>
+        <p:nvPicPr>
+          <p:cNvPr id="16387" name="Picture 3" descr="D:\개인용\Knock_check24.jpg"/>
+          <p:cNvPicPr>
+            <a:picLocks noChangeAspect="1" noChangeArrowheads="1"/>
+          </p:cNvPicPr>
+          <p:nvPr/>
+        </p:nvPicPr>
+        <p:blipFill>
+          <a:blip r:embed="rId4" cstate="print">
+            <a:extLst>
+              <a:ext uri="{28A0092B-C50C-407E-A947-70E740481C1C}">
+                <a14:useLocalDpi xmlns:a14="http://schemas.microsoft.com/office/drawing/2010/main" val="0"/>
+              </a:ext>
+            </a:extLst>
+          </a:blip>
+          <a:srcRect/>
+          <a:stretch>
+            <a:fillRect/>
+          </a:stretch>
+        </p:blipFill>
+        <p:spPr bwMode="auto">
+          <a:xfrm>
+            <a:off x="4311026" y="3830759"/>
+            <a:ext cx="3744000" cy="2340000"/>
+          </a:xfrm>
+          <a:prstGeom prst="rect">
+            <a:avLst/>
+          </a:prstGeom>
+          <a:noFill/>
+          <a:extLst>
+            <a:ext uri="{909E8E84-426E-40DD-AFC4-6F175D3DCCD1}">
+              <a14:hiddenFill xmlns:a14="http://schemas.microsoft.com/office/drawing/2010/main">
+                <a:solidFill>
+                  <a:srgbClr val="FFFFFF"/>
+                </a:solidFill>
+              </a14:hiddenFill>
+            </a:ext>
+          </a:extLst>
+        </p:spPr>
+      </p:pic>
+      <p:pic>
+        <p:nvPicPr>
+          <p:cNvPr id="10" name="Picture 12" descr="red pass.jpg (289×175)"/>
+          <p:cNvPicPr>
+            <a:picLocks noChangeAspect="1" noChangeArrowheads="1"/>
+          </p:cNvPicPr>
+          <p:nvPr/>
+        </p:nvPicPr>
+        <p:blipFill>
+          <a:blip r:embed="rId5">
+            <a:extLst>
+              <a:ext uri="{28A0092B-C50C-407E-A947-70E740481C1C}">
+                <a14:useLocalDpi xmlns:a14="http://schemas.microsoft.com/office/drawing/2010/main" val="0"/>
+              </a:ext>
+            </a:extLst>
+          </a:blip>
+          <a:srcRect/>
+          <a:stretch>
+            <a:fillRect/>
+          </a:stretch>
+        </p:blipFill>
+        <p:spPr bwMode="auto">
+          <a:xfrm>
+            <a:off x="7116667" y="924712"/>
+            <a:ext cx="1788192" cy="1082815"/>
+          </a:xfrm>
+          <a:prstGeom prst="rect">
+            <a:avLst/>
+          </a:prstGeom>
+          <a:noFill/>
+          <a:extLst>
+            <a:ext uri="{909E8E84-426E-40DD-AFC4-6F175D3DCCD1}">
+              <a14:hiddenFill xmlns:a14="http://schemas.microsoft.com/office/drawing/2010/main">
+                <a:solidFill>
+                  <a:srgbClr val="FFFFFF"/>
+                </a:solidFill>
+              </a14:hiddenFill>
+            </a:ext>
+          </a:extLst>
+        </p:spPr>
+      </p:pic>
+    </p:spTree>
+    <p:extLst>
+      <p:ext uri="{BB962C8B-B14F-4D97-AF65-F5344CB8AC3E}">
+        <p14:creationId xmlns:p14="http://schemas.microsoft.com/office/powerpoint/2010/main" val="4143825099"/>
+      </p:ext>
+    </p:extLst>
+  </p:cSld>
+  <p:clrMapOvr>
+    <a:masterClrMapping/>
+  </p:clrMapOvr>
+</p:sld>
+</file>
+
+<file path=ppt/slides/slide18.xml><?xml version="1.0" encoding="utf-8"?>
+<p:sld xmlns:a="http://schemas.openxmlformats.org/drawingml/2006/main" xmlns:r="http://schemas.openxmlformats.org/officeDocument/2006/relationships" xmlns:p="http://schemas.openxmlformats.org/presentationml/2006/main">
+  <p:cSld>
+    <p:spTree>
+      <p:nvGrpSpPr>
+        <p:cNvPr id="1" name=""/>
+        <p:cNvGrpSpPr/>
+        <p:nvPr/>
+      </p:nvGrpSpPr>
+      <p:grpSpPr>
+        <a:xfrm>
+          <a:off x="0" y="0"/>
+          <a:ext cx="0" cy="0"/>
+          <a:chOff x="0" y="0"/>
+          <a:chExt cx="0" cy="0"/>
+        </a:xfrm>
+      </p:grpSpPr>
+      <p:sp>
+        <p:nvSpPr>
+          <p:cNvPr id="6" name="Title 5"/>
+          <p:cNvSpPr>
+            <a:spLocks noGrp="1"/>
+          </p:cNvSpPr>
+          <p:nvPr>
+            <p:ph type="title"/>
+          </p:nvPr>
+        </p:nvSpPr>
+        <p:spPr/>
+        <p:txBody>
+          <a:bodyPr/>
+          <a:lstStyle/>
+          <a:p>
+            <a:r>
+              <a:rPr lang="en-US" altLang="ko-KR" dirty="0"/>
+              <a:t>Test </a:t>
+            </a:r>
+            <a:r>
+              <a:rPr lang="en-US" altLang="ko-KR" dirty="0" smtClean="0"/>
+              <a:t>Result-DSADC measurement</a:t>
+            </a:r>
+            <a:endParaRPr lang="en-US" dirty="0"/>
+          </a:p>
+        </p:txBody>
+      </p:sp>
+      <p:sp>
+        <p:nvSpPr>
+          <p:cNvPr id="3" name="Slide Number Placeholder 2"/>
+          <p:cNvSpPr>
+            <a:spLocks noGrp="1"/>
+          </p:cNvSpPr>
+          <p:nvPr>
+            <p:ph type="sldNum" sz="quarter" idx="14"/>
+          </p:nvPr>
+        </p:nvSpPr>
+        <p:spPr/>
+        <p:txBody>
+          <a:bodyPr/>
+          <a:lstStyle/>
+          <a:p>
+            <a:r>
+              <a:rPr lang="en-US" smtClean="0"/>
+              <a:t>Page </a:t>
+            </a:r>
+            <a:fld id="{C770E174-C44B-418F-89A4-426EF6EE2C67}" type="slidenum">
+              <a:rPr lang="en-US" smtClean="0"/>
+              <a:pPr/>
+              <a:t>18</a:t>
             </a:fld>
             <a:endParaRPr lang="en-US"/>
           </a:p>
@@ -9671,7 +10032,7 @@
 </p:sld>
 </file>
 
-<file path=ppt/slides/slide18.xml><?xml version="1.0" encoding="utf-8"?>
+<file path=ppt/slides/slide19.xml><?xml version="1.0" encoding="utf-8"?>
 <p:sld xmlns:a="http://schemas.openxmlformats.org/drawingml/2006/main" xmlns:r="http://schemas.openxmlformats.org/officeDocument/2006/relationships" xmlns:p="http://schemas.openxmlformats.org/presentationml/2006/main">
   <p:cSld>
     <p:spTree>
@@ -9737,7 +10098,7 @@
             <a:fld id="{C770E174-C44B-418F-89A4-426EF6EE2C67}" type="slidenum">
               <a:rPr lang="en-US" smtClean="0"/>
               <a:pPr/>
-              <a:t>18</a:t>
+              <a:t>19</a:t>
             </a:fld>
             <a:endParaRPr lang="en-US"/>
           </a:p>
@@ -10211,286 +10572,6 @@
     <p:extLst>
       <p:ext uri="{BB962C8B-B14F-4D97-AF65-F5344CB8AC3E}">
         <p14:creationId xmlns:p14="http://schemas.microsoft.com/office/powerpoint/2010/main" val="2933741144"/>
-      </p:ext>
-    </p:extLst>
-  </p:cSld>
-  <p:clrMapOvr>
-    <a:masterClrMapping/>
-  </p:clrMapOvr>
-</p:sld>
-</file>
-
-<file path=ppt/slides/slide19.xml><?xml version="1.0" encoding="utf-8"?>
-<p:sld xmlns:a="http://schemas.openxmlformats.org/drawingml/2006/main" xmlns:r="http://schemas.openxmlformats.org/officeDocument/2006/relationships" xmlns:p="http://schemas.openxmlformats.org/presentationml/2006/main">
-  <p:cSld>
-    <p:spTree>
-      <p:nvGrpSpPr>
-        <p:cNvPr id="1" name=""/>
-        <p:cNvGrpSpPr/>
-        <p:nvPr/>
-      </p:nvGrpSpPr>
-      <p:grpSpPr>
-        <a:xfrm>
-          <a:off x="0" y="0"/>
-          <a:ext cx="0" cy="0"/>
-          <a:chOff x="0" y="0"/>
-          <a:chExt cx="0" cy="0"/>
-        </a:xfrm>
-      </p:grpSpPr>
-      <p:sp>
-        <p:nvSpPr>
-          <p:cNvPr id="6" name="Title 5"/>
-          <p:cNvSpPr>
-            <a:spLocks noGrp="1"/>
-          </p:cNvSpPr>
-          <p:nvPr>
-            <p:ph type="title"/>
-          </p:nvPr>
-        </p:nvSpPr>
-        <p:spPr/>
-        <p:txBody>
-          <a:bodyPr/>
-          <a:lstStyle/>
-          <a:p>
-            <a:r>
-              <a:rPr lang="en-US" altLang="ko-KR" dirty="0"/>
-              <a:t>Test </a:t>
-            </a:r>
-            <a:r>
-              <a:rPr lang="en-US" altLang="ko-KR" dirty="0" smtClean="0"/>
-              <a:t>Result-Signal processing</a:t>
-            </a:r>
-            <a:endParaRPr lang="en-US" dirty="0"/>
-          </a:p>
-        </p:txBody>
-      </p:sp>
-      <p:sp>
-        <p:nvSpPr>
-          <p:cNvPr id="3" name="Slide Number Placeholder 2"/>
-          <p:cNvSpPr>
-            <a:spLocks noGrp="1"/>
-          </p:cNvSpPr>
-          <p:nvPr>
-            <p:ph type="sldNum" sz="quarter" idx="14"/>
-          </p:nvPr>
-        </p:nvSpPr>
-        <p:spPr/>
-        <p:txBody>
-          <a:bodyPr/>
-          <a:lstStyle/>
-          <a:p>
-            <a:r>
-              <a:rPr lang="en-US" smtClean="0"/>
-              <a:t>Page </a:t>
-            </a:r>
-            <a:fld id="{C770E174-C44B-418F-89A4-426EF6EE2C67}" type="slidenum">
-              <a:rPr lang="en-US" smtClean="0"/>
-              <a:pPr/>
-              <a:t>19</a:t>
-            </a:fld>
-            <a:endParaRPr lang="en-US"/>
-          </a:p>
-        </p:txBody>
-      </p:sp>
-      <p:sp>
-        <p:nvSpPr>
-          <p:cNvPr id="4" name="Date Placeholder 3"/>
-          <p:cNvSpPr>
-            <a:spLocks noGrp="1"/>
-          </p:cNvSpPr>
-          <p:nvPr>
-            <p:ph type="dt" sz="half" idx="15"/>
-          </p:nvPr>
-        </p:nvSpPr>
-        <p:spPr/>
-        <p:txBody>
-          <a:bodyPr/>
-          <a:lstStyle/>
-          <a:p>
-            <a:r>
-              <a:rPr lang="en-US" smtClean="0"/>
-              <a:t>set date</a:t>
-            </a:r>
-            <a:endParaRPr lang="en-US"/>
-          </a:p>
-        </p:txBody>
-      </p:sp>
-      <p:sp>
-        <p:nvSpPr>
-          <p:cNvPr id="5" name="Footer Placeholder 4"/>
-          <p:cNvSpPr>
-            <a:spLocks noGrp="1"/>
-          </p:cNvSpPr>
-          <p:nvPr>
-            <p:ph type="ftr" sz="quarter" idx="16"/>
-          </p:nvPr>
-        </p:nvSpPr>
-        <p:spPr/>
-        <p:txBody>
-          <a:bodyPr/>
-          <a:lstStyle/>
-          <a:p>
-            <a:r>
-              <a:rPr lang="en-US" smtClean="0"/>
-              <a:t>Copyright © Infineon Technologies AG 2013. All rights reserved.</a:t>
-            </a:r>
-            <a:endParaRPr lang="en-US"/>
-          </a:p>
-        </p:txBody>
-      </p:sp>
-      <p:pic>
-        <p:nvPicPr>
-          <p:cNvPr id="14338" name="Picture 2"/>
-          <p:cNvPicPr>
-            <a:picLocks noChangeAspect="1" noChangeArrowheads="1"/>
-          </p:cNvPicPr>
-          <p:nvPr/>
-        </p:nvPicPr>
-        <p:blipFill>
-          <a:blip r:embed="rId2">
-            <a:extLst>
-              <a:ext uri="{28A0092B-C50C-407E-A947-70E740481C1C}">
-                <a14:useLocalDpi xmlns:a14="http://schemas.microsoft.com/office/drawing/2010/main" val="0"/>
-              </a:ext>
-            </a:extLst>
-          </a:blip>
-          <a:srcRect/>
-          <a:stretch>
-            <a:fillRect/>
-          </a:stretch>
-        </p:blipFill>
-        <p:spPr bwMode="auto">
-          <a:xfrm>
-            <a:off x="395536" y="1600365"/>
-            <a:ext cx="4143375" cy="3838575"/>
-          </a:xfrm>
-          <a:prstGeom prst="rect">
-            <a:avLst/>
-          </a:prstGeom>
-          <a:noFill/>
-          <a:ln>
-            <a:noFill/>
-          </a:ln>
-          <a:extLst>
-            <a:ext uri="{909E8E84-426E-40DD-AFC4-6F175D3DCCD1}">
-              <a14:hiddenFill xmlns:a14="http://schemas.microsoft.com/office/drawing/2010/main">
-                <a:solidFill>
-                  <a:schemeClr val="accent1"/>
-                </a:solidFill>
-              </a14:hiddenFill>
-            </a:ext>
-            <a:ext uri="{91240B29-F687-4F45-9708-019B960494DF}">
-              <a14:hiddenLine xmlns:a14="http://schemas.microsoft.com/office/drawing/2010/main" w="9525">
-                <a:solidFill>
-                  <a:schemeClr val="tx1"/>
-                </a:solidFill>
-                <a:miter lim="800000"/>
-                <a:headEnd/>
-                <a:tailEnd/>
-              </a14:hiddenLine>
-            </a:ext>
-          </a:extLst>
-        </p:spPr>
-      </p:pic>
-      <p:pic>
-        <p:nvPicPr>
-          <p:cNvPr id="14339" name="Picture 3"/>
-          <p:cNvPicPr>
-            <a:picLocks noChangeAspect="1" noChangeArrowheads="1"/>
-          </p:cNvPicPr>
-          <p:nvPr/>
-        </p:nvPicPr>
-        <p:blipFill>
-          <a:blip r:embed="rId3">
-            <a:extLst>
-              <a:ext uri="{28A0092B-C50C-407E-A947-70E740481C1C}">
-                <a14:useLocalDpi xmlns:a14="http://schemas.microsoft.com/office/drawing/2010/main" val="0"/>
-              </a:ext>
-            </a:extLst>
-          </a:blip>
-          <a:srcRect/>
-          <a:stretch>
-            <a:fillRect/>
-          </a:stretch>
-        </p:blipFill>
-        <p:spPr bwMode="auto">
-          <a:xfrm>
-            <a:off x="5004048" y="1639340"/>
-            <a:ext cx="2171700" cy="685800"/>
-          </a:xfrm>
-          <a:prstGeom prst="rect">
-            <a:avLst/>
-          </a:prstGeom>
-          <a:noFill/>
-          <a:ln>
-            <a:noFill/>
-          </a:ln>
-          <a:extLst>
-            <a:ext uri="{909E8E84-426E-40DD-AFC4-6F175D3DCCD1}">
-              <a14:hiddenFill xmlns:a14="http://schemas.microsoft.com/office/drawing/2010/main">
-                <a:solidFill>
-                  <a:schemeClr val="accent1"/>
-                </a:solidFill>
-              </a14:hiddenFill>
-            </a:ext>
-            <a:ext uri="{91240B29-F687-4F45-9708-019B960494DF}">
-              <a14:hiddenLine xmlns:a14="http://schemas.microsoft.com/office/drawing/2010/main" w="9525">
-                <a:solidFill>
-                  <a:schemeClr val="tx1"/>
-                </a:solidFill>
-                <a:miter lim="800000"/>
-                <a:headEnd/>
-                <a:tailEnd/>
-              </a14:hiddenLine>
-            </a:ext>
-          </a:extLst>
-        </p:spPr>
-      </p:pic>
-      <p:pic>
-        <p:nvPicPr>
-          <p:cNvPr id="9" name="Picture 12" descr="red pass.jpg (289×175)"/>
-          <p:cNvPicPr>
-            <a:picLocks noChangeAspect="1" noChangeArrowheads="1"/>
-          </p:cNvPicPr>
-          <p:nvPr/>
-        </p:nvPicPr>
-        <p:blipFill>
-          <a:blip r:embed="rId4">
-            <a:extLst>
-              <a:ext uri="{28A0092B-C50C-407E-A947-70E740481C1C}">
-                <a14:useLocalDpi xmlns:a14="http://schemas.microsoft.com/office/drawing/2010/main" val="0"/>
-              </a:ext>
-            </a:extLst>
-          </a:blip>
-          <a:srcRect/>
-          <a:stretch>
-            <a:fillRect/>
-          </a:stretch>
-        </p:blipFill>
-        <p:spPr bwMode="auto">
-          <a:xfrm>
-            <a:off x="7116667" y="924712"/>
-            <a:ext cx="1788192" cy="1082815"/>
-          </a:xfrm>
-          <a:prstGeom prst="rect">
-            <a:avLst/>
-          </a:prstGeom>
-          <a:noFill/>
-          <a:extLst>
-            <a:ext uri="{909E8E84-426E-40DD-AFC4-6F175D3DCCD1}">
-              <a14:hiddenFill xmlns:a14="http://schemas.microsoft.com/office/drawing/2010/main">
-                <a:solidFill>
-                  <a:srgbClr val="FFFFFF"/>
-                </a:solidFill>
-              </a14:hiddenFill>
-            </a:ext>
-          </a:extLst>
-        </p:spPr>
-      </p:pic>
-    </p:spTree>
-    <p:extLst>
-      <p:ext uri="{BB962C8B-B14F-4D97-AF65-F5344CB8AC3E}">
-        <p14:creationId xmlns:p14="http://schemas.microsoft.com/office/powerpoint/2010/main" val="3968282112"/>
       </p:ext>
     </p:extLst>
   </p:cSld>
@@ -11340,12 +11421,39 @@
       </p:grpSpPr>
       <p:sp>
         <p:nvSpPr>
+          <p:cNvPr id="6" name="Title 5"/>
+          <p:cNvSpPr>
+            <a:spLocks noGrp="1"/>
+          </p:cNvSpPr>
+          <p:nvPr>
+            <p:ph type="title"/>
+          </p:nvPr>
+        </p:nvSpPr>
+        <p:spPr/>
+        <p:txBody>
+          <a:bodyPr/>
+          <a:lstStyle/>
+          <a:p>
+            <a:r>
+              <a:rPr lang="en-US" altLang="ko-KR" dirty="0"/>
+              <a:t>Test </a:t>
+            </a:r>
+            <a:r>
+              <a:rPr lang="en-US" altLang="ko-KR" dirty="0" smtClean="0"/>
+              <a:t>Result-Signal processing</a:t>
+            </a:r>
+            <a:endParaRPr lang="en-US" dirty="0"/>
+          </a:p>
+        </p:txBody>
+      </p:sp>
+      <p:sp>
+        <p:nvSpPr>
           <p:cNvPr id="3" name="Slide Number Placeholder 2"/>
           <p:cNvSpPr>
             <a:spLocks noGrp="1"/>
           </p:cNvSpPr>
           <p:nvPr>
-            <p:ph type="sldNum" sz="quarter" idx="10"/>
+            <p:ph type="sldNum" sz="quarter" idx="14"/>
           </p:nvPr>
         </p:nvSpPr>
         <p:spPr/>
@@ -11361,6 +11469,875 @@
               <a:rPr lang="en-US" smtClean="0"/>
               <a:pPr/>
               <a:t>20</a:t>
+            </a:fld>
+            <a:endParaRPr lang="en-US"/>
+          </a:p>
+        </p:txBody>
+      </p:sp>
+      <p:sp>
+        <p:nvSpPr>
+          <p:cNvPr id="4" name="Date Placeholder 3"/>
+          <p:cNvSpPr>
+            <a:spLocks noGrp="1"/>
+          </p:cNvSpPr>
+          <p:nvPr>
+            <p:ph type="dt" sz="half" idx="15"/>
+          </p:nvPr>
+        </p:nvSpPr>
+        <p:spPr/>
+        <p:txBody>
+          <a:bodyPr/>
+          <a:lstStyle/>
+          <a:p>
+            <a:r>
+              <a:rPr lang="en-US" smtClean="0"/>
+              <a:t>set date</a:t>
+            </a:r>
+            <a:endParaRPr lang="en-US"/>
+          </a:p>
+        </p:txBody>
+      </p:sp>
+      <p:sp>
+        <p:nvSpPr>
+          <p:cNvPr id="5" name="Footer Placeholder 4"/>
+          <p:cNvSpPr>
+            <a:spLocks noGrp="1"/>
+          </p:cNvSpPr>
+          <p:nvPr>
+            <p:ph type="ftr" sz="quarter" idx="16"/>
+          </p:nvPr>
+        </p:nvSpPr>
+        <p:spPr/>
+        <p:txBody>
+          <a:bodyPr/>
+          <a:lstStyle/>
+          <a:p>
+            <a:r>
+              <a:rPr lang="en-US" smtClean="0"/>
+              <a:t>Copyright © Infineon Technologies AG 2013. All rights reserved.</a:t>
+            </a:r>
+            <a:endParaRPr lang="en-US"/>
+          </a:p>
+        </p:txBody>
+      </p:sp>
+      <p:pic>
+        <p:nvPicPr>
+          <p:cNvPr id="14338" name="Picture 2"/>
+          <p:cNvPicPr>
+            <a:picLocks noChangeAspect="1" noChangeArrowheads="1"/>
+          </p:cNvPicPr>
+          <p:nvPr/>
+        </p:nvPicPr>
+        <p:blipFill>
+          <a:blip r:embed="rId2">
+            <a:extLst>
+              <a:ext uri="{28A0092B-C50C-407E-A947-70E740481C1C}">
+                <a14:useLocalDpi xmlns:a14="http://schemas.microsoft.com/office/drawing/2010/main" val="0"/>
+              </a:ext>
+            </a:extLst>
+          </a:blip>
+          <a:srcRect/>
+          <a:stretch>
+            <a:fillRect/>
+          </a:stretch>
+        </p:blipFill>
+        <p:spPr bwMode="auto">
+          <a:xfrm>
+            <a:off x="395536" y="1600365"/>
+            <a:ext cx="4143375" cy="3838575"/>
+          </a:xfrm>
+          <a:prstGeom prst="rect">
+            <a:avLst/>
+          </a:prstGeom>
+          <a:noFill/>
+          <a:ln>
+            <a:noFill/>
+          </a:ln>
+          <a:extLst>
+            <a:ext uri="{909E8E84-426E-40DD-AFC4-6F175D3DCCD1}">
+              <a14:hiddenFill xmlns:a14="http://schemas.microsoft.com/office/drawing/2010/main">
+                <a:solidFill>
+                  <a:schemeClr val="accent1"/>
+                </a:solidFill>
+              </a14:hiddenFill>
+            </a:ext>
+            <a:ext uri="{91240B29-F687-4F45-9708-019B960494DF}">
+              <a14:hiddenLine xmlns:a14="http://schemas.microsoft.com/office/drawing/2010/main" w="9525">
+                <a:solidFill>
+                  <a:schemeClr val="tx1"/>
+                </a:solidFill>
+                <a:miter lim="800000"/>
+                <a:headEnd/>
+                <a:tailEnd/>
+              </a14:hiddenLine>
+            </a:ext>
+          </a:extLst>
+        </p:spPr>
+      </p:pic>
+      <p:pic>
+        <p:nvPicPr>
+          <p:cNvPr id="14339" name="Picture 3"/>
+          <p:cNvPicPr>
+            <a:picLocks noChangeAspect="1" noChangeArrowheads="1"/>
+          </p:cNvPicPr>
+          <p:nvPr/>
+        </p:nvPicPr>
+        <p:blipFill>
+          <a:blip r:embed="rId3">
+            <a:extLst>
+              <a:ext uri="{28A0092B-C50C-407E-A947-70E740481C1C}">
+                <a14:useLocalDpi xmlns:a14="http://schemas.microsoft.com/office/drawing/2010/main" val="0"/>
+              </a:ext>
+            </a:extLst>
+          </a:blip>
+          <a:srcRect/>
+          <a:stretch>
+            <a:fillRect/>
+          </a:stretch>
+        </p:blipFill>
+        <p:spPr bwMode="auto">
+          <a:xfrm>
+            <a:off x="5004048" y="1639340"/>
+            <a:ext cx="2171700" cy="685800"/>
+          </a:xfrm>
+          <a:prstGeom prst="rect">
+            <a:avLst/>
+          </a:prstGeom>
+          <a:noFill/>
+          <a:ln>
+            <a:noFill/>
+          </a:ln>
+          <a:extLst>
+            <a:ext uri="{909E8E84-426E-40DD-AFC4-6F175D3DCCD1}">
+              <a14:hiddenFill xmlns:a14="http://schemas.microsoft.com/office/drawing/2010/main">
+                <a:solidFill>
+                  <a:schemeClr val="accent1"/>
+                </a:solidFill>
+              </a14:hiddenFill>
+            </a:ext>
+            <a:ext uri="{91240B29-F687-4F45-9708-019B960494DF}">
+              <a14:hiddenLine xmlns:a14="http://schemas.microsoft.com/office/drawing/2010/main" w="9525">
+                <a:solidFill>
+                  <a:schemeClr val="tx1"/>
+                </a:solidFill>
+                <a:miter lim="800000"/>
+                <a:headEnd/>
+                <a:tailEnd/>
+              </a14:hiddenLine>
+            </a:ext>
+          </a:extLst>
+        </p:spPr>
+      </p:pic>
+      <p:pic>
+        <p:nvPicPr>
+          <p:cNvPr id="9" name="Picture 12" descr="red pass.jpg (289×175)"/>
+          <p:cNvPicPr>
+            <a:picLocks noChangeAspect="1" noChangeArrowheads="1"/>
+          </p:cNvPicPr>
+          <p:nvPr/>
+        </p:nvPicPr>
+        <p:blipFill>
+          <a:blip r:embed="rId4">
+            <a:extLst>
+              <a:ext uri="{28A0092B-C50C-407E-A947-70E740481C1C}">
+                <a14:useLocalDpi xmlns:a14="http://schemas.microsoft.com/office/drawing/2010/main" val="0"/>
+              </a:ext>
+            </a:extLst>
+          </a:blip>
+          <a:srcRect/>
+          <a:stretch>
+            <a:fillRect/>
+          </a:stretch>
+        </p:blipFill>
+        <p:spPr bwMode="auto">
+          <a:xfrm>
+            <a:off x="7116667" y="924712"/>
+            <a:ext cx="1788192" cy="1082815"/>
+          </a:xfrm>
+          <a:prstGeom prst="rect">
+            <a:avLst/>
+          </a:prstGeom>
+          <a:noFill/>
+          <a:extLst>
+            <a:ext uri="{909E8E84-426E-40DD-AFC4-6F175D3DCCD1}">
+              <a14:hiddenFill xmlns:a14="http://schemas.microsoft.com/office/drawing/2010/main">
+                <a:solidFill>
+                  <a:srgbClr val="FFFFFF"/>
+                </a:solidFill>
+              </a14:hiddenFill>
+            </a:ext>
+          </a:extLst>
+        </p:spPr>
+      </p:pic>
+    </p:spTree>
+    <p:extLst>
+      <p:ext uri="{BB962C8B-B14F-4D97-AF65-F5344CB8AC3E}">
+        <p14:creationId xmlns:p14="http://schemas.microsoft.com/office/powerpoint/2010/main" val="3968282112"/>
+      </p:ext>
+    </p:extLst>
+  </p:cSld>
+  <p:clrMapOvr>
+    <a:masterClrMapping/>
+  </p:clrMapOvr>
+</p:sld>
+</file>
+
+<file path=ppt/slides/slide21.xml><?xml version="1.0" encoding="utf-8"?>
+<p:sld xmlns:a="http://schemas.openxmlformats.org/drawingml/2006/main" xmlns:r="http://schemas.openxmlformats.org/officeDocument/2006/relationships" xmlns:p="http://schemas.openxmlformats.org/presentationml/2006/main">
+  <p:cSld>
+    <p:spTree>
+      <p:nvGrpSpPr>
+        <p:cNvPr id="1" name=""/>
+        <p:cNvGrpSpPr/>
+        <p:nvPr/>
+      </p:nvGrpSpPr>
+      <p:grpSpPr>
+        <a:xfrm>
+          <a:off x="0" y="0"/>
+          <a:ext cx="0" cy="0"/>
+          <a:chOff x="0" y="0"/>
+          <a:chExt cx="0" cy="0"/>
+        </a:xfrm>
+      </p:grpSpPr>
+      <p:sp>
+        <p:nvSpPr>
+          <p:cNvPr id="6" name="Title 5"/>
+          <p:cNvSpPr>
+            <a:spLocks noGrp="1"/>
+          </p:cNvSpPr>
+          <p:nvPr>
+            <p:ph type="title"/>
+          </p:nvPr>
+        </p:nvSpPr>
+        <p:spPr/>
+        <p:txBody>
+          <a:bodyPr/>
+          <a:lstStyle/>
+          <a:p>
+            <a:r>
+              <a:rPr lang="en-US" altLang="ko-KR" dirty="0"/>
+              <a:t>Test </a:t>
+            </a:r>
+            <a:r>
+              <a:rPr lang="en-US" altLang="ko-KR" dirty="0" smtClean="0"/>
+              <a:t>Result-Not integrate data</a:t>
+            </a:r>
+            <a:endParaRPr lang="en-US" dirty="0"/>
+          </a:p>
+        </p:txBody>
+      </p:sp>
+      <p:sp>
+        <p:nvSpPr>
+          <p:cNvPr id="3" name="Slide Number Placeholder 2"/>
+          <p:cNvSpPr>
+            <a:spLocks noGrp="1"/>
+          </p:cNvSpPr>
+          <p:nvPr>
+            <p:ph type="sldNum" sz="quarter" idx="14"/>
+          </p:nvPr>
+        </p:nvSpPr>
+        <p:spPr/>
+        <p:txBody>
+          <a:bodyPr/>
+          <a:lstStyle/>
+          <a:p>
+            <a:r>
+              <a:rPr lang="en-US" smtClean="0"/>
+              <a:t>Page </a:t>
+            </a:r>
+            <a:fld id="{C770E174-C44B-418F-89A4-426EF6EE2C67}" type="slidenum">
+              <a:rPr lang="en-US" smtClean="0"/>
+              <a:pPr/>
+              <a:t>21</a:t>
+            </a:fld>
+            <a:endParaRPr lang="en-US"/>
+          </a:p>
+        </p:txBody>
+      </p:sp>
+      <p:sp>
+        <p:nvSpPr>
+          <p:cNvPr id="4" name="Date Placeholder 3"/>
+          <p:cNvSpPr>
+            <a:spLocks noGrp="1"/>
+          </p:cNvSpPr>
+          <p:nvPr>
+            <p:ph type="dt" sz="half" idx="15"/>
+          </p:nvPr>
+        </p:nvSpPr>
+        <p:spPr/>
+        <p:txBody>
+          <a:bodyPr/>
+          <a:lstStyle/>
+          <a:p>
+            <a:r>
+              <a:rPr lang="en-US" smtClean="0"/>
+              <a:t>set date</a:t>
+            </a:r>
+            <a:endParaRPr lang="en-US"/>
+          </a:p>
+        </p:txBody>
+      </p:sp>
+      <p:sp>
+        <p:nvSpPr>
+          <p:cNvPr id="5" name="Footer Placeholder 4"/>
+          <p:cNvSpPr>
+            <a:spLocks noGrp="1"/>
+          </p:cNvSpPr>
+          <p:nvPr>
+            <p:ph type="ftr" sz="quarter" idx="16"/>
+          </p:nvPr>
+        </p:nvSpPr>
+        <p:spPr/>
+        <p:txBody>
+          <a:bodyPr/>
+          <a:lstStyle/>
+          <a:p>
+            <a:r>
+              <a:rPr lang="en-US" smtClean="0"/>
+              <a:t>Copyright © Infineon Technologies AG 2013. All rights reserved.</a:t>
+            </a:r>
+            <a:endParaRPr lang="en-US"/>
+          </a:p>
+        </p:txBody>
+      </p:sp>
+      <p:pic>
+        <p:nvPicPr>
+          <p:cNvPr id="1026" name="Picture 2" descr="D:\test6.jpg"/>
+          <p:cNvPicPr>
+            <a:picLocks noChangeAspect="1" noChangeArrowheads="1"/>
+          </p:cNvPicPr>
+          <p:nvPr/>
+        </p:nvPicPr>
+        <p:blipFill>
+          <a:blip r:embed="rId2">
+            <a:extLst>
+              <a:ext uri="{28A0092B-C50C-407E-A947-70E740481C1C}">
+                <a14:useLocalDpi xmlns:a14="http://schemas.microsoft.com/office/drawing/2010/main" val="0"/>
+              </a:ext>
+            </a:extLst>
+          </a:blip>
+          <a:srcRect/>
+          <a:stretch>
+            <a:fillRect/>
+          </a:stretch>
+        </p:blipFill>
+        <p:spPr bwMode="auto">
+          <a:xfrm>
+            <a:off x="467544" y="1052736"/>
+            <a:ext cx="6422809" cy="3748311"/>
+          </a:xfrm>
+          <a:prstGeom prst="rect">
+            <a:avLst/>
+          </a:prstGeom>
+          <a:noFill/>
+          <a:extLst>
+            <a:ext uri="{909E8E84-426E-40DD-AFC4-6F175D3DCCD1}">
+              <a14:hiddenFill xmlns:a14="http://schemas.microsoft.com/office/drawing/2010/main">
+                <a:solidFill>
+                  <a:srgbClr val="FFFFFF"/>
+                </a:solidFill>
+              </a14:hiddenFill>
+            </a:ext>
+          </a:extLst>
+        </p:spPr>
+      </p:pic>
+      <p:sp>
+        <p:nvSpPr>
+          <p:cNvPr id="10" name="TextBox 9"/>
+          <p:cNvSpPr txBox="1"/>
+          <p:nvPr/>
+        </p:nvSpPr>
+        <p:spPr bwMode="auto">
+          <a:xfrm>
+            <a:off x="467544" y="5013176"/>
+            <a:ext cx="4896544" cy="138499"/>
+          </a:xfrm>
+          <a:prstGeom prst="rect">
+            <a:avLst/>
+          </a:prstGeom>
+          <a:noFill/>
+          <a:ln w="9525">
+            <a:noFill/>
+            <a:miter lim="800000"/>
+            <a:headEnd/>
+            <a:tailEnd/>
+          </a:ln>
+          <a:effectLst/>
+        </p:spPr>
+        <p:txBody>
+          <a:bodyPr wrap="square" lIns="0" tIns="0" rIns="0" bIns="0" rtlCol="0" anchor="ctr" anchorCtr="0">
+            <a:spAutoFit/>
+          </a:bodyPr>
+          <a:lstStyle/>
+          <a:p>
+            <a:pPr marR="0" defTabSz="914400" eaLnBrk="0" fontAlgn="auto" latinLnBrk="0" hangingPunct="0">
+              <a:spcBef>
+                <a:spcPts val="0"/>
+              </a:spcBef>
+              <a:spcAft>
+                <a:spcPts val="300"/>
+              </a:spcAft>
+              <a:buClr>
+                <a:schemeClr val="accent1"/>
+              </a:buClr>
+              <a:buSzTx/>
+              <a:tabLst/>
+            </a:pPr>
+            <a:r>
+              <a:rPr lang="en-US" altLang="ko-KR" sz="900" kern="0" dirty="0" smtClean="0">
+                <a:latin typeface="Verdana" pitchFamily="34" charset="0"/>
+                <a:ea typeface="Verdana" pitchFamily="34" charset="0"/>
+                <a:cs typeface="Verdana" pitchFamily="34" charset="0"/>
+              </a:rPr>
+              <a:t>Receive the 128 data, but these data not participate to  integration calculation.</a:t>
+            </a:r>
+            <a:endParaRPr lang="en-US" altLang="ko-KR" sz="900" kern="0" dirty="0">
+              <a:latin typeface="Verdana" pitchFamily="34" charset="0"/>
+              <a:ea typeface="Verdana" pitchFamily="34" charset="0"/>
+              <a:cs typeface="Verdana" pitchFamily="34" charset="0"/>
+            </a:endParaRPr>
+          </a:p>
+        </p:txBody>
+      </p:sp>
+    </p:spTree>
+    <p:extLst>
+      <p:ext uri="{BB962C8B-B14F-4D97-AF65-F5344CB8AC3E}">
+        <p14:creationId xmlns:p14="http://schemas.microsoft.com/office/powerpoint/2010/main" val="983674212"/>
+      </p:ext>
+    </p:extLst>
+  </p:cSld>
+  <p:clrMapOvr>
+    <a:masterClrMapping/>
+  </p:clrMapOvr>
+</p:sld>
+</file>
+
+<file path=ppt/slides/slide22.xml><?xml version="1.0" encoding="utf-8"?>
+<p:sld xmlns:a="http://schemas.openxmlformats.org/drawingml/2006/main" xmlns:r="http://schemas.openxmlformats.org/officeDocument/2006/relationships" xmlns:p="http://schemas.openxmlformats.org/presentationml/2006/main">
+  <p:cSld>
+    <p:spTree>
+      <p:nvGrpSpPr>
+        <p:cNvPr id="1" name=""/>
+        <p:cNvGrpSpPr/>
+        <p:nvPr/>
+      </p:nvGrpSpPr>
+      <p:grpSpPr>
+        <a:xfrm>
+          <a:off x="0" y="0"/>
+          <a:ext cx="0" cy="0"/>
+          <a:chOff x="0" y="0"/>
+          <a:chExt cx="0" cy="0"/>
+        </a:xfrm>
+      </p:grpSpPr>
+      <p:sp>
+        <p:nvSpPr>
+          <p:cNvPr id="6" name="Title 5"/>
+          <p:cNvSpPr>
+            <a:spLocks noGrp="1"/>
+          </p:cNvSpPr>
+          <p:nvPr>
+            <p:ph type="title"/>
+          </p:nvPr>
+        </p:nvSpPr>
+        <p:spPr/>
+        <p:txBody>
+          <a:bodyPr/>
+          <a:lstStyle/>
+          <a:p>
+            <a:r>
+              <a:rPr lang="en-US" altLang="ko-KR" dirty="0"/>
+              <a:t>Test Result-Not integrate data</a:t>
+            </a:r>
+            <a:endParaRPr lang="en-US" dirty="0"/>
+          </a:p>
+        </p:txBody>
+      </p:sp>
+      <p:sp>
+        <p:nvSpPr>
+          <p:cNvPr id="3" name="Slide Number Placeholder 2"/>
+          <p:cNvSpPr>
+            <a:spLocks noGrp="1"/>
+          </p:cNvSpPr>
+          <p:nvPr>
+            <p:ph type="sldNum" sz="quarter" idx="14"/>
+          </p:nvPr>
+        </p:nvSpPr>
+        <p:spPr/>
+        <p:txBody>
+          <a:bodyPr/>
+          <a:lstStyle/>
+          <a:p>
+            <a:r>
+              <a:rPr lang="en-US" smtClean="0"/>
+              <a:t>Page </a:t>
+            </a:r>
+            <a:fld id="{C770E174-C44B-418F-89A4-426EF6EE2C67}" type="slidenum">
+              <a:rPr lang="en-US" smtClean="0"/>
+              <a:pPr/>
+              <a:t>22</a:t>
+            </a:fld>
+            <a:endParaRPr lang="en-US"/>
+          </a:p>
+        </p:txBody>
+      </p:sp>
+      <p:sp>
+        <p:nvSpPr>
+          <p:cNvPr id="4" name="Date Placeholder 3"/>
+          <p:cNvSpPr>
+            <a:spLocks noGrp="1"/>
+          </p:cNvSpPr>
+          <p:nvPr>
+            <p:ph type="dt" sz="half" idx="15"/>
+          </p:nvPr>
+        </p:nvSpPr>
+        <p:spPr/>
+        <p:txBody>
+          <a:bodyPr/>
+          <a:lstStyle/>
+          <a:p>
+            <a:r>
+              <a:rPr lang="en-US" smtClean="0"/>
+              <a:t>set date</a:t>
+            </a:r>
+            <a:endParaRPr lang="en-US"/>
+          </a:p>
+        </p:txBody>
+      </p:sp>
+      <p:sp>
+        <p:nvSpPr>
+          <p:cNvPr id="5" name="Footer Placeholder 4"/>
+          <p:cNvSpPr>
+            <a:spLocks noGrp="1"/>
+          </p:cNvSpPr>
+          <p:nvPr>
+            <p:ph type="ftr" sz="quarter" idx="16"/>
+          </p:nvPr>
+        </p:nvSpPr>
+        <p:spPr/>
+        <p:txBody>
+          <a:bodyPr/>
+          <a:lstStyle/>
+          <a:p>
+            <a:r>
+              <a:rPr lang="en-US" smtClean="0"/>
+              <a:t>Copyright © Infineon Technologies AG 2013. All rights reserved.</a:t>
+            </a:r>
+            <a:endParaRPr lang="en-US"/>
+          </a:p>
+        </p:txBody>
+      </p:sp>
+      <p:pic>
+        <p:nvPicPr>
+          <p:cNvPr id="9" name="Picture 12" descr="red pass.jpg (289×175)"/>
+          <p:cNvPicPr>
+            <a:picLocks noChangeAspect="1" noChangeArrowheads="1"/>
+          </p:cNvPicPr>
+          <p:nvPr/>
+        </p:nvPicPr>
+        <p:blipFill>
+          <a:blip r:embed="rId2">
+            <a:extLst>
+              <a:ext uri="{28A0092B-C50C-407E-A947-70E740481C1C}">
+                <a14:useLocalDpi xmlns:a14="http://schemas.microsoft.com/office/drawing/2010/main" val="0"/>
+              </a:ext>
+            </a:extLst>
+          </a:blip>
+          <a:srcRect/>
+          <a:stretch>
+            <a:fillRect/>
+          </a:stretch>
+        </p:blipFill>
+        <p:spPr bwMode="auto">
+          <a:xfrm>
+            <a:off x="7116667" y="924712"/>
+            <a:ext cx="1788192" cy="1082815"/>
+          </a:xfrm>
+          <a:prstGeom prst="rect">
+            <a:avLst/>
+          </a:prstGeom>
+          <a:noFill/>
+          <a:extLst>
+            <a:ext uri="{909E8E84-426E-40DD-AFC4-6F175D3DCCD1}">
+              <a14:hiddenFill xmlns:a14="http://schemas.microsoft.com/office/drawing/2010/main">
+                <a:solidFill>
+                  <a:srgbClr val="FFFFFF"/>
+                </a:solidFill>
+              </a14:hiddenFill>
+            </a:ext>
+          </a:extLst>
+        </p:spPr>
+      </p:pic>
+      <p:pic>
+        <p:nvPicPr>
+          <p:cNvPr id="2050" name="Picture 2"/>
+          <p:cNvPicPr>
+            <a:picLocks noChangeAspect="1" noChangeArrowheads="1"/>
+          </p:cNvPicPr>
+          <p:nvPr/>
+        </p:nvPicPr>
+        <p:blipFill rotWithShape="1">
+          <a:blip r:embed="rId3">
+            <a:extLst>
+              <a:ext uri="{28A0092B-C50C-407E-A947-70E740481C1C}">
+                <a14:useLocalDpi xmlns:a14="http://schemas.microsoft.com/office/drawing/2010/main" val="0"/>
+              </a:ext>
+            </a:extLst>
+          </a:blip>
+          <a:srcRect r="35198"/>
+          <a:stretch/>
+        </p:blipFill>
+        <p:spPr bwMode="auto">
+          <a:xfrm>
+            <a:off x="119243" y="1124744"/>
+            <a:ext cx="5397637" cy="1501130"/>
+          </a:xfrm>
+          <a:prstGeom prst="rect">
+            <a:avLst/>
+          </a:prstGeom>
+          <a:noFill/>
+          <a:ln>
+            <a:noFill/>
+          </a:ln>
+          <a:extLst>
+            <a:ext uri="{909E8E84-426E-40DD-AFC4-6F175D3DCCD1}">
+              <a14:hiddenFill xmlns:a14="http://schemas.microsoft.com/office/drawing/2010/main">
+                <a:solidFill>
+                  <a:schemeClr val="accent1"/>
+                </a:solidFill>
+              </a14:hiddenFill>
+            </a:ext>
+            <a:ext uri="{91240B29-F687-4F45-9708-019B960494DF}">
+              <a14:hiddenLine xmlns:a14="http://schemas.microsoft.com/office/drawing/2010/main" w="9525">
+                <a:solidFill>
+                  <a:schemeClr val="tx1"/>
+                </a:solidFill>
+                <a:miter lim="800000"/>
+                <a:headEnd/>
+                <a:tailEnd/>
+              </a14:hiddenLine>
+            </a:ext>
+          </a:extLst>
+        </p:spPr>
+      </p:pic>
+      <p:pic>
+        <p:nvPicPr>
+          <p:cNvPr id="2051" name="Picture 3"/>
+          <p:cNvPicPr>
+            <a:picLocks noChangeAspect="1" noChangeArrowheads="1"/>
+          </p:cNvPicPr>
+          <p:nvPr/>
+        </p:nvPicPr>
+        <p:blipFill>
+          <a:blip r:embed="rId4">
+            <a:extLst>
+              <a:ext uri="{28A0092B-C50C-407E-A947-70E740481C1C}">
+                <a14:useLocalDpi xmlns:a14="http://schemas.microsoft.com/office/drawing/2010/main" val="0"/>
+              </a:ext>
+            </a:extLst>
+          </a:blip>
+          <a:srcRect/>
+          <a:stretch>
+            <a:fillRect/>
+          </a:stretch>
+        </p:blipFill>
+        <p:spPr bwMode="auto">
+          <a:xfrm>
+            <a:off x="179512" y="2656359"/>
+            <a:ext cx="8280920" cy="771525"/>
+          </a:xfrm>
+          <a:prstGeom prst="rect">
+            <a:avLst/>
+          </a:prstGeom>
+          <a:noFill/>
+          <a:ln>
+            <a:noFill/>
+          </a:ln>
+          <a:extLst>
+            <a:ext uri="{909E8E84-426E-40DD-AFC4-6F175D3DCCD1}">
+              <a14:hiddenFill xmlns:a14="http://schemas.microsoft.com/office/drawing/2010/main">
+                <a:solidFill>
+                  <a:schemeClr val="accent1"/>
+                </a:solidFill>
+              </a14:hiddenFill>
+            </a:ext>
+            <a:ext uri="{91240B29-F687-4F45-9708-019B960494DF}">
+              <a14:hiddenLine xmlns:a14="http://schemas.microsoft.com/office/drawing/2010/main" w="9525">
+                <a:solidFill>
+                  <a:schemeClr val="tx1"/>
+                </a:solidFill>
+                <a:miter lim="800000"/>
+                <a:headEnd/>
+                <a:tailEnd/>
+              </a14:hiddenLine>
+            </a:ext>
+          </a:extLst>
+        </p:spPr>
+      </p:pic>
+      <p:pic>
+        <p:nvPicPr>
+          <p:cNvPr id="2052" name="Picture 4"/>
+          <p:cNvPicPr>
+            <a:picLocks noChangeAspect="1" noChangeArrowheads="1"/>
+          </p:cNvPicPr>
+          <p:nvPr/>
+        </p:nvPicPr>
+        <p:blipFill>
+          <a:blip r:embed="rId5">
+            <a:extLst>
+              <a:ext uri="{28A0092B-C50C-407E-A947-70E740481C1C}">
+                <a14:useLocalDpi xmlns:a14="http://schemas.microsoft.com/office/drawing/2010/main" val="0"/>
+              </a:ext>
+            </a:extLst>
+          </a:blip>
+          <a:srcRect/>
+          <a:stretch>
+            <a:fillRect/>
+          </a:stretch>
+        </p:blipFill>
+        <p:spPr bwMode="auto">
+          <a:xfrm>
+            <a:off x="184096" y="3525396"/>
+            <a:ext cx="6724650" cy="1562100"/>
+          </a:xfrm>
+          <a:prstGeom prst="rect">
+            <a:avLst/>
+          </a:prstGeom>
+          <a:noFill/>
+          <a:ln>
+            <a:noFill/>
+          </a:ln>
+          <a:extLst>
+            <a:ext uri="{909E8E84-426E-40DD-AFC4-6F175D3DCCD1}">
+              <a14:hiddenFill xmlns:a14="http://schemas.microsoft.com/office/drawing/2010/main">
+                <a:solidFill>
+                  <a:schemeClr val="accent1"/>
+                </a:solidFill>
+              </a14:hiddenFill>
+            </a:ext>
+            <a:ext uri="{91240B29-F687-4F45-9708-019B960494DF}">
+              <a14:hiddenLine xmlns:a14="http://schemas.microsoft.com/office/drawing/2010/main" w="9525">
+                <a:solidFill>
+                  <a:schemeClr val="tx1"/>
+                </a:solidFill>
+                <a:miter lim="800000"/>
+                <a:headEnd/>
+                <a:tailEnd/>
+              </a14:hiddenLine>
+            </a:ext>
+          </a:extLst>
+        </p:spPr>
+      </p:pic>
+      <p:sp>
+        <p:nvSpPr>
+          <p:cNvPr id="12" name="TextBox 11"/>
+          <p:cNvSpPr txBox="1"/>
+          <p:nvPr/>
+        </p:nvSpPr>
+        <p:spPr bwMode="auto">
+          <a:xfrm>
+            <a:off x="179512" y="5229200"/>
+            <a:ext cx="4896544" cy="138499"/>
+          </a:xfrm>
+          <a:prstGeom prst="rect">
+            <a:avLst/>
+          </a:prstGeom>
+          <a:noFill/>
+          <a:ln w="9525">
+            <a:noFill/>
+            <a:miter lim="800000"/>
+            <a:headEnd/>
+            <a:tailEnd/>
+          </a:ln>
+          <a:effectLst/>
+        </p:spPr>
+        <p:txBody>
+          <a:bodyPr wrap="square" lIns="0" tIns="0" rIns="0" bIns="0" rtlCol="0" anchor="ctr" anchorCtr="0">
+            <a:spAutoFit/>
+          </a:bodyPr>
+          <a:lstStyle/>
+          <a:p>
+            <a:pPr marR="0" defTabSz="914400" eaLnBrk="0" fontAlgn="auto" latinLnBrk="0" hangingPunct="0">
+              <a:spcBef>
+                <a:spcPts val="0"/>
+              </a:spcBef>
+              <a:spcAft>
+                <a:spcPts val="300"/>
+              </a:spcAft>
+              <a:buClr>
+                <a:schemeClr val="accent1"/>
+              </a:buClr>
+              <a:buSzTx/>
+              <a:tabLst/>
+            </a:pPr>
+            <a:r>
+              <a:rPr lang="en-US" altLang="ko-KR" sz="900" kern="0" dirty="0" smtClean="0">
+                <a:latin typeface="Verdana" pitchFamily="34" charset="0"/>
+                <a:ea typeface="Verdana" pitchFamily="34" charset="0"/>
+                <a:cs typeface="Verdana" pitchFamily="34" charset="0"/>
+              </a:rPr>
+              <a:t>Data input check test pass</a:t>
+            </a:r>
+            <a:endParaRPr lang="en-US" altLang="ko-KR" sz="900" kern="0" dirty="0">
+              <a:latin typeface="Verdana" pitchFamily="34" charset="0"/>
+              <a:ea typeface="Verdana" pitchFamily="34" charset="0"/>
+              <a:cs typeface="Verdana" pitchFamily="34" charset="0"/>
+            </a:endParaRPr>
+          </a:p>
+        </p:txBody>
+      </p:sp>
+    </p:spTree>
+    <p:extLst>
+      <p:ext uri="{BB962C8B-B14F-4D97-AF65-F5344CB8AC3E}">
+        <p14:creationId xmlns:p14="http://schemas.microsoft.com/office/powerpoint/2010/main" val="2652190090"/>
+      </p:ext>
+    </p:extLst>
+  </p:cSld>
+  <p:clrMapOvr>
+    <a:masterClrMapping/>
+  </p:clrMapOvr>
+</p:sld>
+</file>
+
+<file path=ppt/slides/slide23.xml><?xml version="1.0" encoding="utf-8"?>
+<p:sld xmlns:a="http://schemas.openxmlformats.org/drawingml/2006/main" xmlns:r="http://schemas.openxmlformats.org/officeDocument/2006/relationships" xmlns:p="http://schemas.openxmlformats.org/presentationml/2006/main">
+  <p:cSld>
+    <p:spTree>
+      <p:nvGrpSpPr>
+        <p:cNvPr id="1" name=""/>
+        <p:cNvGrpSpPr/>
+        <p:nvPr/>
+      </p:nvGrpSpPr>
+      <p:grpSpPr>
+        <a:xfrm>
+          <a:off x="0" y="0"/>
+          <a:ext cx="0" cy="0"/>
+          <a:chOff x="0" y="0"/>
+          <a:chExt cx="0" cy="0"/>
+        </a:xfrm>
+      </p:grpSpPr>
+      <p:sp>
+        <p:nvSpPr>
+          <p:cNvPr id="3" name="Slide Number Placeholder 2"/>
+          <p:cNvSpPr>
+            <a:spLocks noGrp="1"/>
+          </p:cNvSpPr>
+          <p:nvPr>
+            <p:ph type="sldNum" sz="quarter" idx="10"/>
+          </p:nvPr>
+        </p:nvSpPr>
+        <p:spPr/>
+        <p:txBody>
+          <a:bodyPr/>
+          <a:lstStyle/>
+          <a:p>
+            <a:r>
+              <a:rPr lang="en-US" smtClean="0"/>
+              <a:t>Page </a:t>
+            </a:r>
+            <a:fld id="{C770E174-C44B-418F-89A4-426EF6EE2C67}" type="slidenum">
+              <a:rPr lang="en-US" smtClean="0"/>
+              <a:pPr/>
+              <a:t>23</a:t>
             </a:fld>
             <a:endParaRPr lang="en-US"/>
           </a:p>
@@ -14140,6 +15117,114 @@
           <a:chExt cx="0" cy="0"/>
         </a:xfrm>
       </p:grpSpPr>
+      <p:pic>
+        <p:nvPicPr>
+          <p:cNvPr id="1026" name="Picture 2"/>
+          <p:cNvPicPr>
+            <a:picLocks noChangeAspect="1" noChangeArrowheads="1"/>
+          </p:cNvPicPr>
+          <p:nvPr/>
+        </p:nvPicPr>
+        <p:blipFill>
+          <a:blip r:embed="rId2">
+            <a:extLst>
+              <a:ext uri="{28A0092B-C50C-407E-A947-70E740481C1C}">
+                <a14:useLocalDpi xmlns:a14="http://schemas.microsoft.com/office/drawing/2010/main" val="0"/>
+              </a:ext>
+            </a:extLst>
+          </a:blip>
+          <a:srcRect/>
+          <a:stretch>
+            <a:fillRect/>
+          </a:stretch>
+        </p:blipFill>
+        <p:spPr bwMode="auto">
+          <a:xfrm>
+            <a:off x="337371" y="4628778"/>
+            <a:ext cx="4413250" cy="749300"/>
+          </a:xfrm>
+          <a:prstGeom prst="rect">
+            <a:avLst/>
+          </a:prstGeom>
+          <a:noFill/>
+          <a:ln>
+            <a:noFill/>
+          </a:ln>
+          <a:extLst>
+            <a:ext uri="{909E8E84-426E-40DD-AFC4-6F175D3DCCD1}">
+              <a14:hiddenFill xmlns:a14="http://schemas.microsoft.com/office/drawing/2010/main">
+                <a:solidFill>
+                  <a:schemeClr val="accent1"/>
+                </a:solidFill>
+              </a14:hiddenFill>
+            </a:ext>
+            <a:ext uri="{91240B29-F687-4F45-9708-019B960494DF}">
+              <a14:hiddenLine xmlns:a14="http://schemas.microsoft.com/office/drawing/2010/main" w="9525">
+                <a:solidFill>
+                  <a:schemeClr val="tx1"/>
+                </a:solidFill>
+                <a:miter lim="800000"/>
+                <a:headEnd/>
+                <a:tailEnd/>
+              </a14:hiddenLine>
+            </a:ext>
+          </a:extLst>
+        </p:spPr>
+      </p:pic>
+      <p:pic>
+        <p:nvPicPr>
+          <p:cNvPr id="1027" name="Picture 3"/>
+          <p:cNvPicPr>
+            <a:picLocks noChangeAspect="1" noChangeArrowheads="1"/>
+          </p:cNvPicPr>
+          <p:nvPr/>
+        </p:nvPicPr>
+        <p:blipFill>
+          <a:blip r:embed="rId3">
+            <a:extLst>
+              <a:ext uri="{28A0092B-C50C-407E-A947-70E740481C1C}">
+                <a14:useLocalDpi xmlns:a14="http://schemas.microsoft.com/office/drawing/2010/main" val="0"/>
+              </a:ext>
+            </a:extLst>
+          </a:blip>
+          <a:srcRect/>
+          <a:stretch>
+            <a:fillRect/>
+          </a:stretch>
+        </p:blipFill>
+        <p:spPr bwMode="auto">
+          <a:xfrm>
+            <a:off x="281808" y="2780928"/>
+            <a:ext cx="4524375" cy="1847850"/>
+          </a:xfrm>
+          <a:prstGeom prst="rect">
+            <a:avLst/>
+          </a:prstGeom>
+          <a:noFill/>
+          <a:ln>
+            <a:noFill/>
+          </a:ln>
+          <a:extLst>
+            <a:ext uri="{909E8E84-426E-40DD-AFC4-6F175D3DCCD1}">
+              <a14:hiddenFill xmlns:a14="http://schemas.microsoft.com/office/drawing/2010/main">
+                <a:solidFill>
+                  <a:schemeClr val="accent1"/>
+                </a:solidFill>
+              </a14:hiddenFill>
+            </a:ext>
+            <a:ext uri="{91240B29-F687-4F45-9708-019B960494DF}">
+              <a14:hiddenLine xmlns:a14="http://schemas.microsoft.com/office/drawing/2010/main" w="9525">
+                <a:solidFill>
+                  <a:schemeClr val="tx1"/>
+                </a:solidFill>
+                <a:miter lim="800000"/>
+                <a:headEnd/>
+                <a:tailEnd/>
+              </a14:hiddenLine>
+            </a:ext>
+          </a:extLst>
+        </p:spPr>
+      </p:pic>
       <p:sp>
         <p:nvSpPr>
           <p:cNvPr id="6" name="Title 5"/>
@@ -14161,7 +15246,7 @@
             </a:r>
             <a:r>
               <a:rPr lang="en-US" altLang="ko-KR" dirty="0" smtClean="0"/>
-              <a:t>concept-Data transfer </a:t>
+              <a:t>concept-Double buffering</a:t>
             </a:r>
             <a:endParaRPr lang="en-US" dirty="0"/>
           </a:p>
@@ -14190,6 +15275,1075 @@
               <a:rPr lang="en-US" smtClean="0"/>
               <a:pPr/>
               <a:t>7</a:t>
+            </a:fld>
+            <a:endParaRPr lang="en-US"/>
+          </a:p>
+        </p:txBody>
+      </p:sp>
+      <p:sp>
+        <p:nvSpPr>
+          <p:cNvPr id="4" name="Date Placeholder 3"/>
+          <p:cNvSpPr>
+            <a:spLocks noGrp="1"/>
+          </p:cNvSpPr>
+          <p:nvPr>
+            <p:ph type="dt" sz="half" idx="15"/>
+          </p:nvPr>
+        </p:nvSpPr>
+        <p:spPr/>
+        <p:txBody>
+          <a:bodyPr/>
+          <a:lstStyle/>
+          <a:p>
+            <a:r>
+              <a:rPr lang="en-US" smtClean="0"/>
+              <a:t>set date</a:t>
+            </a:r>
+            <a:endParaRPr lang="en-US"/>
+          </a:p>
+        </p:txBody>
+      </p:sp>
+      <p:sp>
+        <p:nvSpPr>
+          <p:cNvPr id="5" name="Footer Placeholder 4"/>
+          <p:cNvSpPr>
+            <a:spLocks noGrp="1"/>
+          </p:cNvSpPr>
+          <p:nvPr>
+            <p:ph type="ftr" sz="quarter" idx="16"/>
+          </p:nvPr>
+        </p:nvSpPr>
+        <p:spPr/>
+        <p:txBody>
+          <a:bodyPr/>
+          <a:lstStyle/>
+          <a:p>
+            <a:r>
+              <a:rPr lang="en-US" smtClean="0"/>
+              <a:t>Copyright © Infineon Technologies AG 2013. All rights reserved.</a:t>
+            </a:r>
+            <a:endParaRPr lang="en-US"/>
+          </a:p>
+        </p:txBody>
+      </p:sp>
+      <p:sp>
+        <p:nvSpPr>
+          <p:cNvPr id="17" name="TextBox 16"/>
+          <p:cNvSpPr txBox="1"/>
+          <p:nvPr/>
+        </p:nvSpPr>
+        <p:spPr bwMode="auto">
+          <a:xfrm>
+            <a:off x="337371" y="5757364"/>
+            <a:ext cx="8424935" cy="492443"/>
+          </a:xfrm>
+          <a:prstGeom prst="rect">
+            <a:avLst/>
+          </a:prstGeom>
+          <a:noFill/>
+          <a:ln w="9525">
+            <a:noFill/>
+            <a:miter lim="800000"/>
+            <a:headEnd/>
+            <a:tailEnd/>
+          </a:ln>
+          <a:effectLst/>
+        </p:spPr>
+        <p:txBody>
+          <a:bodyPr wrap="square" lIns="0" tIns="0" rIns="0" bIns="0" rtlCol="0" anchor="ctr" anchorCtr="0">
+            <a:spAutoFit/>
+          </a:bodyPr>
+          <a:lstStyle/>
+          <a:p>
+            <a:pPr marR="0" defTabSz="914400" eaLnBrk="0" fontAlgn="auto" latinLnBrk="0" hangingPunct="0">
+              <a:spcBef>
+                <a:spcPts val="0"/>
+              </a:spcBef>
+              <a:spcAft>
+                <a:spcPts val="300"/>
+              </a:spcAft>
+              <a:buClr>
+                <a:schemeClr val="accent1"/>
+              </a:buClr>
+              <a:buSzTx/>
+              <a:tabLst/>
+            </a:pPr>
+            <a:r>
+              <a:rPr lang="en-US" altLang="ko-KR" sz="900" kern="0" dirty="0" smtClean="0">
+                <a:latin typeface="Verdana" pitchFamily="34" charset="0"/>
+                <a:ea typeface="Verdana" pitchFamily="34" charset="0"/>
+                <a:cs typeface="Verdana" pitchFamily="34" charset="0"/>
+              </a:rPr>
+              <a:t>Using DMA, Generated DATA at DSADC  is moved to destination.</a:t>
+            </a:r>
+          </a:p>
+          <a:p>
+            <a:pPr marR="0" defTabSz="914400" eaLnBrk="0" fontAlgn="auto" latinLnBrk="0" hangingPunct="0">
+              <a:spcBef>
+                <a:spcPts val="0"/>
+              </a:spcBef>
+              <a:spcAft>
+                <a:spcPts val="300"/>
+              </a:spcAft>
+              <a:buClr>
+                <a:schemeClr val="accent1"/>
+              </a:buClr>
+              <a:buSzTx/>
+              <a:tabLst/>
+            </a:pPr>
+            <a:r>
+              <a:rPr lang="en-US" altLang="ko-KR" sz="900" kern="0" dirty="0" smtClean="0">
+                <a:latin typeface="Verdana" pitchFamily="34" charset="0"/>
+                <a:ea typeface="Verdana" pitchFamily="34" charset="0"/>
+                <a:cs typeface="Verdana" pitchFamily="34" charset="0"/>
+              </a:rPr>
+              <a:t>At here , DMA use Double buffering functionality.</a:t>
+            </a:r>
+          </a:p>
+          <a:p>
+            <a:pPr marR="0" defTabSz="914400" eaLnBrk="0" fontAlgn="auto" latinLnBrk="0" hangingPunct="0">
+              <a:spcBef>
+                <a:spcPts val="0"/>
+              </a:spcBef>
+              <a:spcAft>
+                <a:spcPts val="300"/>
+              </a:spcAft>
+              <a:buClr>
+                <a:schemeClr val="accent1"/>
+              </a:buClr>
+              <a:buSzTx/>
+              <a:tabLst/>
+            </a:pPr>
+            <a:r>
+              <a:rPr lang="en-US" altLang="ko-KR" sz="900" kern="0" dirty="0" smtClean="0">
+                <a:latin typeface="Verdana" pitchFamily="34" charset="0"/>
+                <a:ea typeface="Verdana" pitchFamily="34" charset="0"/>
+                <a:cs typeface="Verdana" pitchFamily="34" charset="0"/>
+              </a:rPr>
+              <a:t>DMA destination is automatically switched from one to the other when data is filled fully.</a:t>
+            </a:r>
+          </a:p>
+        </p:txBody>
+      </p:sp>
+      <p:pic>
+        <p:nvPicPr>
+          <p:cNvPr id="5124" name="Picture 4" descr="D:\개인용\Knock_check14.jpg"/>
+          <p:cNvPicPr>
+            <a:picLocks noChangeAspect="1" noChangeArrowheads="1"/>
+          </p:cNvPicPr>
+          <p:nvPr/>
+        </p:nvPicPr>
+        <p:blipFill rotWithShape="1">
+          <a:blip r:embed="rId4">
+            <a:extLst>
+              <a:ext uri="{28A0092B-C50C-407E-A947-70E740481C1C}">
+                <a14:useLocalDpi xmlns:a14="http://schemas.microsoft.com/office/drawing/2010/main" val="0"/>
+              </a:ext>
+            </a:extLst>
+          </a:blip>
+          <a:srcRect l="28898" t="19643" r="39576" b="33661"/>
+          <a:stretch/>
+        </p:blipFill>
+        <p:spPr bwMode="auto">
+          <a:xfrm>
+            <a:off x="3350577" y="1539170"/>
+            <a:ext cx="1866774" cy="1728192"/>
+          </a:xfrm>
+          <a:prstGeom prst="rect">
+            <a:avLst/>
+          </a:prstGeom>
+          <a:noFill/>
+          <a:extLst>
+            <a:ext uri="{909E8E84-426E-40DD-AFC4-6F175D3DCCD1}">
+              <a14:hiddenFill xmlns:a14="http://schemas.microsoft.com/office/drawing/2010/main">
+                <a:solidFill>
+                  <a:srgbClr val="FFFFFF"/>
+                </a:solidFill>
+              </a14:hiddenFill>
+            </a:ext>
+          </a:extLst>
+        </p:spPr>
+      </p:pic>
+      <p:sp>
+        <p:nvSpPr>
+          <p:cNvPr id="10" name="Oval 9"/>
+          <p:cNvSpPr/>
+          <p:nvPr/>
+        </p:nvSpPr>
+        <p:spPr bwMode="auto">
+          <a:xfrm>
+            <a:off x="3782625" y="2115234"/>
+            <a:ext cx="126014" cy="504056"/>
+          </a:xfrm>
+          <a:prstGeom prst="ellipse">
+            <a:avLst/>
+          </a:prstGeom>
+          <a:noFill/>
+          <a:ln w="9525">
+            <a:solidFill>
+              <a:srgbClr val="FF0000"/>
+            </a:solidFill>
+            <a:miter lim="800000"/>
+            <a:headEnd/>
+            <a:tailEnd/>
+          </a:ln>
+        </p:spPr>
+        <p:txBody>
+          <a:bodyPr wrap="square" lIns="72000" tIns="72000" rIns="72000" bIns="72000" rtlCol="0" anchor="ctr"/>
+          <a:lstStyle/>
+          <a:p>
+            <a:pPr algn="ctr" eaLnBrk="0" hangingPunct="0"/>
+            <a:endParaRPr lang="ko-KR" altLang="en-US" sz="1600" dirty="0" smtClean="0">
+              <a:latin typeface="+mn-lt"/>
+              <a:ea typeface="Verdana" pitchFamily="34" charset="0"/>
+              <a:cs typeface="Verdana" pitchFamily="34" charset="0"/>
+            </a:endParaRPr>
+          </a:p>
+        </p:txBody>
+      </p:sp>
+      <p:cxnSp>
+        <p:nvCxnSpPr>
+          <p:cNvPr id="14" name="Straight Arrow Connector 13"/>
+          <p:cNvCxnSpPr/>
+          <p:nvPr/>
+        </p:nvCxnSpPr>
+        <p:spPr>
+          <a:xfrm flipH="1">
+            <a:off x="3856829" y="1673721"/>
+            <a:ext cx="2246004" cy="476031"/>
+          </a:xfrm>
+          <a:prstGeom prst="straightConnector1">
+            <a:avLst/>
+          </a:prstGeom>
+          <a:ln w="19050">
+            <a:solidFill>
+              <a:srgbClr val="FF0000"/>
+            </a:solidFill>
+            <a:tailEnd type="arrow"/>
+          </a:ln>
+        </p:spPr>
+        <p:style>
+          <a:lnRef idx="1">
+            <a:schemeClr val="accent1"/>
+          </a:lnRef>
+          <a:fillRef idx="0">
+            <a:schemeClr val="accent1"/>
+          </a:fillRef>
+          <a:effectRef idx="0">
+            <a:schemeClr val="accent1"/>
+          </a:effectRef>
+          <a:fontRef idx="minor">
+            <a:schemeClr val="tx1"/>
+          </a:fontRef>
+        </p:style>
+      </p:cxnSp>
+      <p:sp>
+        <p:nvSpPr>
+          <p:cNvPr id="22" name="Oval 21"/>
+          <p:cNvSpPr/>
+          <p:nvPr/>
+        </p:nvSpPr>
+        <p:spPr bwMode="auto">
+          <a:xfrm>
+            <a:off x="4160667" y="2115234"/>
+            <a:ext cx="126014" cy="504056"/>
+          </a:xfrm>
+          <a:prstGeom prst="ellipse">
+            <a:avLst/>
+          </a:prstGeom>
+          <a:noFill/>
+          <a:ln w="9525">
+            <a:solidFill>
+              <a:srgbClr val="FF0000"/>
+            </a:solidFill>
+            <a:miter lim="800000"/>
+            <a:headEnd/>
+            <a:tailEnd/>
+          </a:ln>
+        </p:spPr>
+        <p:txBody>
+          <a:bodyPr wrap="square" lIns="72000" tIns="72000" rIns="72000" bIns="72000" rtlCol="0" anchor="ctr"/>
+          <a:lstStyle/>
+          <a:p>
+            <a:pPr algn="ctr" eaLnBrk="0" hangingPunct="0"/>
+            <a:endParaRPr lang="ko-KR" altLang="en-US" sz="1600" dirty="0" smtClean="0">
+              <a:latin typeface="+mn-lt"/>
+              <a:ea typeface="Verdana" pitchFamily="34" charset="0"/>
+              <a:cs typeface="Verdana" pitchFamily="34" charset="0"/>
+            </a:endParaRPr>
+          </a:p>
+        </p:txBody>
+      </p:sp>
+      <p:sp>
+        <p:nvSpPr>
+          <p:cNvPr id="23" name="Oval 22"/>
+          <p:cNvSpPr/>
+          <p:nvPr/>
+        </p:nvSpPr>
+        <p:spPr bwMode="auto">
+          <a:xfrm>
+            <a:off x="4520707" y="2115234"/>
+            <a:ext cx="126014" cy="504056"/>
+          </a:xfrm>
+          <a:prstGeom prst="ellipse">
+            <a:avLst/>
+          </a:prstGeom>
+          <a:noFill/>
+          <a:ln w="9525">
+            <a:solidFill>
+              <a:srgbClr val="FF0000"/>
+            </a:solidFill>
+            <a:miter lim="800000"/>
+            <a:headEnd/>
+            <a:tailEnd/>
+          </a:ln>
+        </p:spPr>
+        <p:txBody>
+          <a:bodyPr wrap="square" lIns="72000" tIns="72000" rIns="72000" bIns="72000" rtlCol="0" anchor="ctr"/>
+          <a:lstStyle/>
+          <a:p>
+            <a:pPr algn="ctr" eaLnBrk="0" hangingPunct="0"/>
+            <a:endParaRPr lang="ko-KR" altLang="en-US" sz="1600" dirty="0" smtClean="0">
+              <a:latin typeface="+mn-lt"/>
+              <a:ea typeface="Verdana" pitchFamily="34" charset="0"/>
+              <a:cs typeface="Verdana" pitchFamily="34" charset="0"/>
+            </a:endParaRPr>
+          </a:p>
+        </p:txBody>
+      </p:sp>
+      <p:sp>
+        <p:nvSpPr>
+          <p:cNvPr id="24" name="Oval 23"/>
+          <p:cNvSpPr/>
+          <p:nvPr/>
+        </p:nvSpPr>
+        <p:spPr bwMode="auto">
+          <a:xfrm>
+            <a:off x="4880747" y="2115234"/>
+            <a:ext cx="126014" cy="504056"/>
+          </a:xfrm>
+          <a:prstGeom prst="ellipse">
+            <a:avLst/>
+          </a:prstGeom>
+          <a:noFill/>
+          <a:ln w="9525">
+            <a:solidFill>
+              <a:srgbClr val="FF0000"/>
+            </a:solidFill>
+            <a:miter lim="800000"/>
+            <a:headEnd/>
+            <a:tailEnd/>
+          </a:ln>
+        </p:spPr>
+        <p:txBody>
+          <a:bodyPr wrap="square" lIns="72000" tIns="72000" rIns="72000" bIns="72000" rtlCol="0" anchor="ctr"/>
+          <a:lstStyle/>
+          <a:p>
+            <a:pPr algn="ctr" eaLnBrk="0" hangingPunct="0"/>
+            <a:endParaRPr lang="ko-KR" altLang="en-US" sz="1600" dirty="0" smtClean="0">
+              <a:latin typeface="+mn-lt"/>
+              <a:ea typeface="Verdana" pitchFamily="34" charset="0"/>
+              <a:cs typeface="Verdana" pitchFamily="34" charset="0"/>
+            </a:endParaRPr>
+          </a:p>
+        </p:txBody>
+      </p:sp>
+      <p:cxnSp>
+        <p:nvCxnSpPr>
+          <p:cNvPr id="25" name="Straight Arrow Connector 24"/>
+          <p:cNvCxnSpPr/>
+          <p:nvPr/>
+        </p:nvCxnSpPr>
+        <p:spPr>
+          <a:xfrm flipH="1">
+            <a:off x="4240355" y="1673721"/>
+            <a:ext cx="1862478" cy="468052"/>
+          </a:xfrm>
+          <a:prstGeom prst="straightConnector1">
+            <a:avLst/>
+          </a:prstGeom>
+          <a:ln w="19050">
+            <a:solidFill>
+              <a:srgbClr val="FF0000"/>
+            </a:solidFill>
+            <a:tailEnd type="arrow"/>
+          </a:ln>
+        </p:spPr>
+        <p:style>
+          <a:lnRef idx="1">
+            <a:schemeClr val="accent1"/>
+          </a:lnRef>
+          <a:fillRef idx="0">
+            <a:schemeClr val="accent1"/>
+          </a:fillRef>
+          <a:effectRef idx="0">
+            <a:schemeClr val="accent1"/>
+          </a:effectRef>
+          <a:fontRef idx="minor">
+            <a:schemeClr val="tx1"/>
+          </a:fontRef>
+        </p:style>
+      </p:cxnSp>
+      <p:cxnSp>
+        <p:nvCxnSpPr>
+          <p:cNvPr id="27" name="Straight Arrow Connector 26"/>
+          <p:cNvCxnSpPr/>
+          <p:nvPr/>
+        </p:nvCxnSpPr>
+        <p:spPr>
+          <a:xfrm flipH="1">
+            <a:off x="4583714" y="1673721"/>
+            <a:ext cx="1519119" cy="468052"/>
+          </a:xfrm>
+          <a:prstGeom prst="straightConnector1">
+            <a:avLst/>
+          </a:prstGeom>
+          <a:ln w="19050">
+            <a:solidFill>
+              <a:srgbClr val="FF0000"/>
+            </a:solidFill>
+            <a:tailEnd type="arrow"/>
+          </a:ln>
+        </p:spPr>
+        <p:style>
+          <a:lnRef idx="1">
+            <a:schemeClr val="accent1"/>
+          </a:lnRef>
+          <a:fillRef idx="0">
+            <a:schemeClr val="accent1"/>
+          </a:fillRef>
+          <a:effectRef idx="0">
+            <a:schemeClr val="accent1"/>
+          </a:effectRef>
+          <a:fontRef idx="minor">
+            <a:schemeClr val="tx1"/>
+          </a:fontRef>
+        </p:style>
+      </p:cxnSp>
+      <p:cxnSp>
+        <p:nvCxnSpPr>
+          <p:cNvPr id="29" name="Straight Arrow Connector 28"/>
+          <p:cNvCxnSpPr/>
+          <p:nvPr/>
+        </p:nvCxnSpPr>
+        <p:spPr>
+          <a:xfrm flipH="1">
+            <a:off x="4907443" y="1678657"/>
+            <a:ext cx="1195390" cy="468052"/>
+          </a:xfrm>
+          <a:prstGeom prst="straightConnector1">
+            <a:avLst/>
+          </a:prstGeom>
+          <a:ln w="19050">
+            <a:solidFill>
+              <a:srgbClr val="FF0000"/>
+            </a:solidFill>
+            <a:tailEnd type="arrow"/>
+          </a:ln>
+        </p:spPr>
+        <p:style>
+          <a:lnRef idx="1">
+            <a:schemeClr val="accent1"/>
+          </a:lnRef>
+          <a:fillRef idx="0">
+            <a:schemeClr val="accent1"/>
+          </a:fillRef>
+          <a:effectRef idx="0">
+            <a:schemeClr val="accent1"/>
+          </a:effectRef>
+          <a:fontRef idx="minor">
+            <a:schemeClr val="tx1"/>
+          </a:fontRef>
+        </p:style>
+      </p:cxnSp>
+      <p:grpSp>
+        <p:nvGrpSpPr>
+          <p:cNvPr id="32" name="Group 31"/>
+          <p:cNvGrpSpPr/>
+          <p:nvPr/>
+        </p:nvGrpSpPr>
+        <p:grpSpPr>
+          <a:xfrm>
+            <a:off x="5741778" y="2883150"/>
+            <a:ext cx="2160932" cy="556940"/>
+            <a:chOff x="682876" y="4965340"/>
+            <a:chExt cx="2160932" cy="556940"/>
+          </a:xfrm>
+        </p:grpSpPr>
+        <p:sp>
+          <p:nvSpPr>
+            <p:cNvPr id="33" name="TextBox 32"/>
+            <p:cNvSpPr txBox="1"/>
+            <p:nvPr/>
+          </p:nvSpPr>
+          <p:spPr bwMode="auto">
+            <a:xfrm>
+              <a:off x="1439652" y="4965340"/>
+              <a:ext cx="1332148" cy="156092"/>
+            </a:xfrm>
+            <a:prstGeom prst="rect">
+              <a:avLst/>
+            </a:prstGeom>
+            <a:noFill/>
+            <a:ln w="9525">
+              <a:noFill/>
+              <a:miter lim="800000"/>
+              <a:headEnd/>
+              <a:tailEnd/>
+            </a:ln>
+            <a:effectLst/>
+          </p:spPr>
+          <p:txBody>
+            <a:bodyPr wrap="square" lIns="0" tIns="0" rIns="0" bIns="0" rtlCol="0" anchor="ctr" anchorCtr="0">
+              <a:spAutoFit/>
+            </a:bodyPr>
+            <a:lstStyle/>
+            <a:p>
+              <a:pPr marR="0" defTabSz="914400" eaLnBrk="0" fontAlgn="auto" latinLnBrk="0" hangingPunct="0">
+                <a:spcBef>
+                  <a:spcPts val="0"/>
+                </a:spcBef>
+                <a:spcAft>
+                  <a:spcPts val="300"/>
+                </a:spcAft>
+                <a:buClr>
+                  <a:schemeClr val="accent1"/>
+                </a:buClr>
+                <a:buSzTx/>
+                <a:tabLst/>
+              </a:pPr>
+              <a:r>
+                <a:rPr lang="en-US" altLang="ko-KR" sz="1000" b="1" kern="0" dirty="0" smtClean="0">
+                  <a:latin typeface="Verdana" pitchFamily="34" charset="0"/>
+                  <a:ea typeface="Verdana" pitchFamily="34" charset="0"/>
+                  <a:cs typeface="Verdana" pitchFamily="34" charset="0"/>
+                </a:rPr>
+                <a:t>CRANK</a:t>
+              </a:r>
+            </a:p>
+          </p:txBody>
+        </p:sp>
+        <p:cxnSp>
+          <p:nvCxnSpPr>
+            <p:cNvPr id="34" name="Straight Connector 33"/>
+            <p:cNvCxnSpPr/>
+            <p:nvPr/>
+          </p:nvCxnSpPr>
+          <p:spPr>
+            <a:xfrm>
+              <a:off x="682876" y="5013176"/>
+              <a:ext cx="648764" cy="0"/>
+            </a:xfrm>
+            <a:prstGeom prst="line">
+              <a:avLst/>
+            </a:prstGeom>
+            <a:ln w="19050">
+              <a:solidFill>
+                <a:srgbClr val="FF0000"/>
+              </a:solidFill>
+              <a:tailEnd type="none"/>
+            </a:ln>
+          </p:spPr>
+          <p:style>
+            <a:lnRef idx="1">
+              <a:schemeClr val="accent1"/>
+            </a:lnRef>
+            <a:fillRef idx="0">
+              <a:schemeClr val="accent1"/>
+            </a:fillRef>
+            <a:effectRef idx="0">
+              <a:schemeClr val="accent1"/>
+            </a:effectRef>
+            <a:fontRef idx="minor">
+              <a:schemeClr val="tx1"/>
+            </a:fontRef>
+          </p:style>
+        </p:cxnSp>
+        <p:cxnSp>
+          <p:nvCxnSpPr>
+            <p:cNvPr id="35" name="Straight Connector 34"/>
+            <p:cNvCxnSpPr/>
+            <p:nvPr/>
+          </p:nvCxnSpPr>
+          <p:spPr>
+            <a:xfrm>
+              <a:off x="682876" y="5244912"/>
+              <a:ext cx="648764" cy="0"/>
+            </a:xfrm>
+            <a:prstGeom prst="line">
+              <a:avLst/>
+            </a:prstGeom>
+            <a:ln w="19050">
+              <a:solidFill>
+                <a:srgbClr val="FFC000"/>
+              </a:solidFill>
+              <a:tailEnd type="none"/>
+            </a:ln>
+          </p:spPr>
+          <p:style>
+            <a:lnRef idx="1">
+              <a:schemeClr val="accent1"/>
+            </a:lnRef>
+            <a:fillRef idx="0">
+              <a:schemeClr val="accent1"/>
+            </a:fillRef>
+            <a:effectRef idx="0">
+              <a:schemeClr val="accent1"/>
+            </a:effectRef>
+            <a:fontRef idx="minor">
+              <a:schemeClr val="tx1"/>
+            </a:fontRef>
+          </p:style>
+        </p:cxnSp>
+        <p:sp>
+          <p:nvSpPr>
+            <p:cNvPr id="36" name="TextBox 35"/>
+            <p:cNvSpPr txBox="1"/>
+            <p:nvPr/>
+          </p:nvSpPr>
+          <p:spPr bwMode="auto">
+            <a:xfrm>
+              <a:off x="1439652" y="5167968"/>
+              <a:ext cx="1404156" cy="153888"/>
+            </a:xfrm>
+            <a:prstGeom prst="rect">
+              <a:avLst/>
+            </a:prstGeom>
+            <a:noFill/>
+            <a:ln w="9525">
+              <a:noFill/>
+              <a:miter lim="800000"/>
+              <a:headEnd/>
+              <a:tailEnd/>
+            </a:ln>
+            <a:effectLst/>
+          </p:spPr>
+          <p:txBody>
+            <a:bodyPr wrap="square" lIns="0" tIns="0" rIns="0" bIns="0" rtlCol="0" anchor="ctr" anchorCtr="0">
+              <a:spAutoFit/>
+            </a:bodyPr>
+            <a:lstStyle/>
+            <a:p>
+              <a:pPr marR="0" defTabSz="914400" eaLnBrk="0" fontAlgn="auto" latinLnBrk="0" hangingPunct="0">
+                <a:spcBef>
+                  <a:spcPts val="0"/>
+                </a:spcBef>
+                <a:spcAft>
+                  <a:spcPts val="300"/>
+                </a:spcAft>
+                <a:buClr>
+                  <a:schemeClr val="accent1"/>
+                </a:buClr>
+                <a:buSzTx/>
+                <a:tabLst/>
+              </a:pPr>
+              <a:r>
+                <a:rPr lang="en-US" altLang="ko-KR" sz="1000" b="1" kern="0" dirty="0" smtClean="0">
+                  <a:latin typeface="Verdana" pitchFamily="34" charset="0"/>
+                  <a:ea typeface="Verdana" pitchFamily="34" charset="0"/>
+                  <a:cs typeface="Verdana" pitchFamily="34" charset="0"/>
+                </a:rPr>
+                <a:t>KNOCK_WINDOW</a:t>
+              </a:r>
+            </a:p>
+          </p:txBody>
+        </p:sp>
+        <p:sp>
+          <p:nvSpPr>
+            <p:cNvPr id="37" name="TextBox 36"/>
+            <p:cNvSpPr txBox="1"/>
+            <p:nvPr/>
+          </p:nvSpPr>
+          <p:spPr bwMode="auto">
+            <a:xfrm>
+              <a:off x="1439652" y="5368392"/>
+              <a:ext cx="1152128" cy="153888"/>
+            </a:xfrm>
+            <a:prstGeom prst="rect">
+              <a:avLst/>
+            </a:prstGeom>
+            <a:noFill/>
+            <a:ln w="9525">
+              <a:noFill/>
+              <a:miter lim="800000"/>
+              <a:headEnd/>
+              <a:tailEnd/>
+            </a:ln>
+            <a:effectLst/>
+          </p:spPr>
+          <p:txBody>
+            <a:bodyPr wrap="square" lIns="0" tIns="0" rIns="0" bIns="0" rtlCol="0" anchor="ctr" anchorCtr="0">
+              <a:spAutoFit/>
+            </a:bodyPr>
+            <a:lstStyle/>
+            <a:p>
+              <a:pPr marR="0" defTabSz="914400" eaLnBrk="0" fontAlgn="auto" latinLnBrk="0" hangingPunct="0">
+                <a:spcBef>
+                  <a:spcPts val="0"/>
+                </a:spcBef>
+                <a:spcAft>
+                  <a:spcPts val="300"/>
+                </a:spcAft>
+                <a:buClr>
+                  <a:schemeClr val="accent1"/>
+                </a:buClr>
+                <a:buSzTx/>
+                <a:tabLst/>
+              </a:pPr>
+              <a:r>
+                <a:rPr lang="en-US" altLang="ko-KR" sz="1000" b="1" kern="0" dirty="0" smtClean="0">
+                  <a:latin typeface="Verdana" pitchFamily="34" charset="0"/>
+                  <a:ea typeface="Verdana" pitchFamily="34" charset="0"/>
+                  <a:cs typeface="Verdana" pitchFamily="34" charset="0"/>
+                </a:rPr>
+                <a:t>DATA_IN</a:t>
+              </a:r>
+            </a:p>
+          </p:txBody>
+        </p:sp>
+        <p:cxnSp>
+          <p:nvCxnSpPr>
+            <p:cNvPr id="39" name="Straight Connector 38"/>
+            <p:cNvCxnSpPr/>
+            <p:nvPr/>
+          </p:nvCxnSpPr>
+          <p:spPr>
+            <a:xfrm>
+              <a:off x="682876" y="5445224"/>
+              <a:ext cx="648764" cy="0"/>
+            </a:xfrm>
+            <a:prstGeom prst="line">
+              <a:avLst/>
+            </a:prstGeom>
+            <a:ln w="19050">
+              <a:solidFill>
+                <a:schemeClr val="accent6"/>
+              </a:solidFill>
+              <a:tailEnd type="none"/>
+            </a:ln>
+          </p:spPr>
+          <p:style>
+            <a:lnRef idx="1">
+              <a:schemeClr val="accent1"/>
+            </a:lnRef>
+            <a:fillRef idx="0">
+              <a:schemeClr val="accent1"/>
+            </a:fillRef>
+            <a:effectRef idx="0">
+              <a:schemeClr val="accent1"/>
+            </a:effectRef>
+            <a:fontRef idx="minor">
+              <a:schemeClr val="tx1"/>
+            </a:fontRef>
+          </p:style>
+        </p:cxnSp>
+      </p:grpSp>
+      <p:sp>
+        <p:nvSpPr>
+          <p:cNvPr id="30" name="TextBox 29"/>
+          <p:cNvSpPr txBox="1"/>
+          <p:nvPr/>
+        </p:nvSpPr>
+        <p:spPr bwMode="auto">
+          <a:xfrm>
+            <a:off x="6012160" y="1535480"/>
+            <a:ext cx="3096412" cy="1084912"/>
+          </a:xfrm>
+          <a:prstGeom prst="rect">
+            <a:avLst/>
+          </a:prstGeom>
+          <a:noFill/>
+          <a:ln w="9525">
+            <a:noFill/>
+            <a:miter lim="800000"/>
+            <a:headEnd/>
+            <a:tailEnd/>
+          </a:ln>
+          <a:effectLst/>
+        </p:spPr>
+        <p:txBody>
+          <a:bodyPr wrap="square" lIns="0" tIns="0" rIns="0" bIns="0" rtlCol="0" anchor="ctr" anchorCtr="0">
+            <a:spAutoFit/>
+          </a:bodyPr>
+          <a:lstStyle/>
+          <a:p>
+            <a:pPr marR="0" defTabSz="914400" eaLnBrk="0" fontAlgn="auto" latinLnBrk="0" hangingPunct="0">
+              <a:spcBef>
+                <a:spcPts val="0"/>
+              </a:spcBef>
+              <a:spcAft>
+                <a:spcPts val="300"/>
+              </a:spcAft>
+              <a:buClr>
+                <a:schemeClr val="accent1"/>
+              </a:buClr>
+              <a:buSzTx/>
+              <a:tabLst/>
+            </a:pPr>
+            <a:r>
+              <a:rPr lang="en-US" altLang="ko-KR" sz="900" kern="0" dirty="0" smtClean="0">
+                <a:latin typeface="Verdana" pitchFamily="34" charset="0"/>
+                <a:ea typeface="Verdana" pitchFamily="34" charset="0"/>
+                <a:cs typeface="Verdana" pitchFamily="34" charset="0"/>
+              </a:rPr>
+              <a:t>If  user want to check  BUFFER NUM in ISR  to know what is filled with data, Return value is current working BUFFER NUM. So  user should  use</a:t>
+            </a:r>
+          </a:p>
+          <a:p>
+            <a:pPr marR="0" defTabSz="914400" eaLnBrk="0" fontAlgn="auto" latinLnBrk="0" hangingPunct="0">
+              <a:spcBef>
+                <a:spcPts val="0"/>
+              </a:spcBef>
+              <a:spcAft>
+                <a:spcPts val="300"/>
+              </a:spcAft>
+              <a:buClr>
+                <a:schemeClr val="accent1"/>
+              </a:buClr>
+              <a:buSzTx/>
+              <a:tabLst/>
+            </a:pPr>
+            <a:r>
+              <a:rPr lang="en-US" altLang="ko-KR" sz="900" kern="0" dirty="0" smtClean="0">
+                <a:latin typeface="Verdana" pitchFamily="34" charset="0"/>
+                <a:ea typeface="Verdana" pitchFamily="34" charset="0"/>
+                <a:cs typeface="Verdana" pitchFamily="34" charset="0"/>
+              </a:rPr>
+              <a:t>Opposite  NUM  BUFFER. </a:t>
+            </a:r>
+          </a:p>
+          <a:p>
+            <a:pPr marR="0" defTabSz="914400" eaLnBrk="0" fontAlgn="auto" latinLnBrk="0" hangingPunct="0">
+              <a:spcBef>
+                <a:spcPts val="0"/>
+              </a:spcBef>
+              <a:spcAft>
+                <a:spcPts val="300"/>
+              </a:spcAft>
+              <a:buClr>
+                <a:schemeClr val="accent1"/>
+              </a:buClr>
+              <a:buSzTx/>
+              <a:tabLst/>
+            </a:pPr>
+            <a:r>
+              <a:rPr lang="en-US" altLang="ko-KR" sz="900" kern="0" dirty="0" smtClean="0">
+                <a:latin typeface="Verdana" pitchFamily="34" charset="0"/>
+                <a:ea typeface="Verdana" pitchFamily="34" charset="0"/>
+                <a:cs typeface="Verdana" pitchFamily="34" charset="0"/>
+              </a:rPr>
+              <a:t>But  if DMA </a:t>
+            </a:r>
+            <a:r>
+              <a:rPr lang="en-US" altLang="ko-KR" sz="900" kern="0" dirty="0">
+                <a:latin typeface="Verdana" pitchFamily="34" charset="0"/>
+                <a:ea typeface="Verdana" pitchFamily="34" charset="0"/>
+                <a:cs typeface="Verdana" pitchFamily="34" charset="0"/>
+              </a:rPr>
+              <a:t> </a:t>
+            </a:r>
+            <a:r>
+              <a:rPr lang="en-US" altLang="ko-KR" sz="900" kern="0" dirty="0" smtClean="0">
+                <a:latin typeface="Verdana" pitchFamily="34" charset="0"/>
+                <a:ea typeface="Verdana" pitchFamily="34" charset="0"/>
+                <a:cs typeface="Verdana" pitchFamily="34" charset="0"/>
+              </a:rPr>
+              <a:t>is not working, User can use Buffer </a:t>
+            </a:r>
+            <a:r>
+              <a:rPr lang="en-US" altLang="ko-KR" sz="900" kern="0" dirty="0" err="1" smtClean="0">
+                <a:latin typeface="Verdana" pitchFamily="34" charset="0"/>
+                <a:ea typeface="Verdana" pitchFamily="34" charset="0"/>
+                <a:cs typeface="Verdana" pitchFamily="34" charset="0"/>
+              </a:rPr>
+              <a:t>num</a:t>
+            </a:r>
+            <a:r>
+              <a:rPr lang="en-US" altLang="ko-KR" sz="900" kern="0" dirty="0" smtClean="0">
+                <a:latin typeface="Verdana" pitchFamily="34" charset="0"/>
+                <a:ea typeface="Verdana" pitchFamily="34" charset="0"/>
+                <a:cs typeface="Verdana" pitchFamily="34" charset="0"/>
+              </a:rPr>
+              <a:t> directly.</a:t>
+            </a:r>
+          </a:p>
+          <a:p>
+            <a:pPr marR="0" defTabSz="914400" eaLnBrk="0" fontAlgn="auto" latinLnBrk="0" hangingPunct="0">
+              <a:spcBef>
+                <a:spcPts val="0"/>
+              </a:spcBef>
+              <a:spcAft>
+                <a:spcPts val="300"/>
+              </a:spcAft>
+              <a:buClr>
+                <a:schemeClr val="accent1"/>
+              </a:buClr>
+              <a:buSzTx/>
+              <a:tabLst/>
+            </a:pPr>
+            <a:endParaRPr lang="en-US" altLang="ko-KR" sz="900" kern="0" dirty="0" smtClean="0">
+              <a:latin typeface="Verdana" pitchFamily="34" charset="0"/>
+              <a:ea typeface="Verdana" pitchFamily="34" charset="0"/>
+              <a:cs typeface="Verdana" pitchFamily="34" charset="0"/>
+            </a:endParaRPr>
+          </a:p>
+        </p:txBody>
+      </p:sp>
+      <p:sp>
+        <p:nvSpPr>
+          <p:cNvPr id="38" name="Oval 37"/>
+          <p:cNvSpPr/>
+          <p:nvPr/>
+        </p:nvSpPr>
+        <p:spPr bwMode="auto">
+          <a:xfrm>
+            <a:off x="5010667" y="2132856"/>
+            <a:ext cx="126014" cy="504056"/>
+          </a:xfrm>
+          <a:prstGeom prst="ellipse">
+            <a:avLst/>
+          </a:prstGeom>
+          <a:noFill/>
+          <a:ln w="9525">
+            <a:solidFill>
+              <a:srgbClr val="7030A0"/>
+            </a:solidFill>
+            <a:miter lim="800000"/>
+            <a:headEnd/>
+            <a:tailEnd/>
+          </a:ln>
+        </p:spPr>
+        <p:txBody>
+          <a:bodyPr wrap="square" lIns="72000" tIns="72000" rIns="72000" bIns="72000" rtlCol="0" anchor="ctr"/>
+          <a:lstStyle/>
+          <a:p>
+            <a:pPr algn="ctr" eaLnBrk="0" hangingPunct="0"/>
+            <a:endParaRPr lang="ko-KR" altLang="en-US" sz="1600" dirty="0" smtClean="0">
+              <a:latin typeface="+mn-lt"/>
+              <a:ea typeface="Verdana" pitchFamily="34" charset="0"/>
+              <a:cs typeface="Verdana" pitchFamily="34" charset="0"/>
+            </a:endParaRPr>
+          </a:p>
+        </p:txBody>
+      </p:sp>
+      <p:cxnSp>
+        <p:nvCxnSpPr>
+          <p:cNvPr id="40" name="Straight Arrow Connector 39"/>
+          <p:cNvCxnSpPr>
+            <a:endCxn id="38" idx="0"/>
+          </p:cNvCxnSpPr>
+          <p:nvPr/>
+        </p:nvCxnSpPr>
+        <p:spPr>
+          <a:xfrm flipH="1">
+            <a:off x="5073674" y="1678657"/>
+            <a:ext cx="1064259" cy="454199"/>
+          </a:xfrm>
+          <a:prstGeom prst="straightConnector1">
+            <a:avLst/>
+          </a:prstGeom>
+          <a:ln w="19050">
+            <a:solidFill>
+              <a:srgbClr val="7030A0"/>
+            </a:solidFill>
+            <a:tailEnd type="arrow"/>
+          </a:ln>
+        </p:spPr>
+        <p:style>
+          <a:lnRef idx="1">
+            <a:schemeClr val="accent1"/>
+          </a:lnRef>
+          <a:fillRef idx="0">
+            <a:schemeClr val="accent1"/>
+          </a:fillRef>
+          <a:effectRef idx="0">
+            <a:schemeClr val="accent1"/>
+          </a:effectRef>
+          <a:fontRef idx="minor">
+            <a:schemeClr val="tx1"/>
+          </a:fontRef>
+        </p:style>
+      </p:cxnSp>
+    </p:spTree>
+    <p:extLst>
+      <p:ext uri="{BB962C8B-B14F-4D97-AF65-F5344CB8AC3E}">
+        <p14:creationId xmlns:p14="http://schemas.microsoft.com/office/powerpoint/2010/main" val="36549048"/>
+      </p:ext>
+    </p:extLst>
+  </p:cSld>
+  <p:clrMapOvr>
+    <a:masterClrMapping/>
+  </p:clrMapOvr>
+</p:sld>
+</file>
+
+<file path=ppt/slides/slide8.xml><?xml version="1.0" encoding="utf-8"?>
+<p:sld xmlns:a="http://schemas.openxmlformats.org/drawingml/2006/main" xmlns:r="http://schemas.openxmlformats.org/officeDocument/2006/relationships" xmlns:p="http://schemas.openxmlformats.org/presentationml/2006/main">
+  <p:cSld>
+    <p:spTree>
+      <p:nvGrpSpPr>
+        <p:cNvPr id="1" name=""/>
+        <p:cNvGrpSpPr/>
+        <p:nvPr/>
+      </p:nvGrpSpPr>
+      <p:grpSpPr>
+        <a:xfrm>
+          <a:off x="0" y="0"/>
+          <a:ext cx="0" cy="0"/>
+          <a:chOff x="0" y="0"/>
+          <a:chExt cx="0" cy="0"/>
+        </a:xfrm>
+      </p:grpSpPr>
+      <p:sp>
+        <p:nvSpPr>
+          <p:cNvPr id="6" name="Title 5"/>
+          <p:cNvSpPr>
+            <a:spLocks noGrp="1"/>
+          </p:cNvSpPr>
+          <p:nvPr>
+            <p:ph type="title"/>
+          </p:nvPr>
+        </p:nvSpPr>
+        <p:spPr/>
+        <p:txBody>
+          <a:bodyPr/>
+          <a:lstStyle/>
+          <a:p>
+            <a:r>
+              <a:rPr lang="en-US" altLang="ko-KR" dirty="0"/>
+              <a:t>SW Detail design </a:t>
+            </a:r>
+            <a:r>
+              <a:rPr lang="en-US" altLang="ko-KR" dirty="0" smtClean="0"/>
+              <a:t>concept-Data transfer </a:t>
+            </a:r>
+            <a:endParaRPr lang="en-US" dirty="0"/>
+          </a:p>
+        </p:txBody>
+      </p:sp>
+      <p:sp>
+        <p:nvSpPr>
+          <p:cNvPr id="3" name="Slide Number Placeholder 2"/>
+          <p:cNvSpPr>
+            <a:spLocks noGrp="1"/>
+          </p:cNvSpPr>
+          <p:nvPr>
+            <p:ph type="sldNum" sz="quarter" idx="14"/>
+          </p:nvPr>
+        </p:nvSpPr>
+        <p:spPr/>
+        <p:txBody>
+          <a:bodyPr/>
+          <a:lstStyle/>
+          <a:p>
+            <a:r>
+              <a:rPr lang="en-US" smtClean="0"/>
+              <a:t>Page </a:t>
+            </a:r>
+            <a:fld id="{C770E174-C44B-418F-89A4-426EF6EE2C67}" type="slidenum">
+              <a:rPr lang="en-US" smtClean="0"/>
+              <a:pPr/>
+              <a:t>8</a:t>
             </a:fld>
             <a:endParaRPr lang="en-US"/>
           </a:p>
@@ -14820,7 +16974,7 @@
 </p:sld>
 </file>
 
-<file path=ppt/slides/slide8.xml><?xml version="1.0" encoding="utf-8"?>
+<file path=ppt/slides/slide9.xml><?xml version="1.0" encoding="utf-8"?>
 <p:sld xmlns:a="http://schemas.openxmlformats.org/drawingml/2006/main" xmlns:r="http://schemas.openxmlformats.org/officeDocument/2006/relationships" xmlns:p="http://schemas.openxmlformats.org/presentationml/2006/main">
   <p:cSld>
     <p:spTree>
@@ -14886,7 +17040,7 @@
             <a:fld id="{C770E174-C44B-418F-89A4-426EF6EE2C67}" type="slidenum">
               <a:rPr lang="en-US" smtClean="0"/>
               <a:pPr/>
-              <a:t>8</a:t>
+              <a:t>9</a:t>
             </a:fld>
             <a:endParaRPr lang="en-US"/>
           </a:p>
@@ -15927,363 +18081,6 @@
     <p:extLst>
       <p:ext uri="{BB962C8B-B14F-4D97-AF65-F5344CB8AC3E}">
         <p14:creationId xmlns:p14="http://schemas.microsoft.com/office/powerpoint/2010/main" val="2281203009"/>
-      </p:ext>
-    </p:extLst>
-  </p:cSld>
-  <p:clrMapOvr>
-    <a:masterClrMapping/>
-  </p:clrMapOvr>
-</p:sld>
-</file>
-
-<file path=ppt/slides/slide9.xml><?xml version="1.0" encoding="utf-8"?>
-<p:sld xmlns:a="http://schemas.openxmlformats.org/drawingml/2006/main" xmlns:r="http://schemas.openxmlformats.org/officeDocument/2006/relationships" xmlns:p="http://schemas.openxmlformats.org/presentationml/2006/main">
-  <p:cSld>
-    <p:spTree>
-      <p:nvGrpSpPr>
-        <p:cNvPr id="1" name=""/>
-        <p:cNvGrpSpPr/>
-        <p:nvPr/>
-      </p:nvGrpSpPr>
-      <p:grpSpPr>
-        <a:xfrm>
-          <a:off x="0" y="0"/>
-          <a:ext cx="0" cy="0"/>
-          <a:chOff x="0" y="0"/>
-          <a:chExt cx="0" cy="0"/>
-        </a:xfrm>
-      </p:grpSpPr>
-      <p:sp>
-        <p:nvSpPr>
-          <p:cNvPr id="6" name="Title 5"/>
-          <p:cNvSpPr>
-            <a:spLocks noGrp="1"/>
-          </p:cNvSpPr>
-          <p:nvPr>
-            <p:ph type="title"/>
-          </p:nvPr>
-        </p:nvSpPr>
-        <p:spPr/>
-        <p:txBody>
-          <a:bodyPr/>
-          <a:lstStyle/>
-          <a:p>
-            <a:r>
-              <a:rPr lang="en-US" altLang="ko-KR" dirty="0"/>
-              <a:t>SW D</a:t>
-            </a:r>
-            <a:r>
-              <a:rPr lang="en-US" altLang="ko-KR" dirty="0" smtClean="0"/>
-              <a:t>etail design concept-Ignore data</a:t>
-            </a:r>
-            <a:endParaRPr lang="en-US" dirty="0"/>
-          </a:p>
-        </p:txBody>
-      </p:sp>
-      <p:sp>
-        <p:nvSpPr>
-          <p:cNvPr id="3" name="Slide Number Placeholder 2"/>
-          <p:cNvSpPr>
-            <a:spLocks noGrp="1"/>
-          </p:cNvSpPr>
-          <p:nvPr>
-            <p:ph type="sldNum" sz="quarter" idx="14"/>
-          </p:nvPr>
-        </p:nvSpPr>
-        <p:spPr/>
-        <p:txBody>
-          <a:bodyPr/>
-          <a:lstStyle/>
-          <a:p>
-            <a:r>
-              <a:rPr lang="en-US" smtClean="0"/>
-              <a:t>Page </a:t>
-            </a:r>
-            <a:fld id="{C770E174-C44B-418F-89A4-426EF6EE2C67}" type="slidenum">
-              <a:rPr lang="en-US" smtClean="0"/>
-              <a:pPr/>
-              <a:t>9</a:t>
-            </a:fld>
-            <a:endParaRPr lang="en-US"/>
-          </a:p>
-        </p:txBody>
-      </p:sp>
-      <p:sp>
-        <p:nvSpPr>
-          <p:cNvPr id="4" name="Date Placeholder 3"/>
-          <p:cNvSpPr>
-            <a:spLocks noGrp="1"/>
-          </p:cNvSpPr>
-          <p:nvPr>
-            <p:ph type="dt" sz="half" idx="15"/>
-          </p:nvPr>
-        </p:nvSpPr>
-        <p:spPr/>
-        <p:txBody>
-          <a:bodyPr/>
-          <a:lstStyle/>
-          <a:p>
-            <a:r>
-              <a:rPr lang="en-US" smtClean="0"/>
-              <a:t>set date</a:t>
-            </a:r>
-            <a:endParaRPr lang="en-US"/>
-          </a:p>
-        </p:txBody>
-      </p:sp>
-      <p:sp>
-        <p:nvSpPr>
-          <p:cNvPr id="5" name="Footer Placeholder 4"/>
-          <p:cNvSpPr>
-            <a:spLocks noGrp="1"/>
-          </p:cNvSpPr>
-          <p:nvPr>
-            <p:ph type="ftr" sz="quarter" idx="16"/>
-          </p:nvPr>
-        </p:nvSpPr>
-        <p:spPr/>
-        <p:txBody>
-          <a:bodyPr/>
-          <a:lstStyle/>
-          <a:p>
-            <a:r>
-              <a:rPr lang="en-US" smtClean="0"/>
-              <a:t>Copyright © Infineon Technologies AG 2013. All rights reserved.</a:t>
-            </a:r>
-            <a:endParaRPr lang="en-US"/>
-          </a:p>
-        </p:txBody>
-      </p:sp>
-      <p:pic>
-        <p:nvPicPr>
-          <p:cNvPr id="8194" name="Picture 2" descr="D:\개인용\Knock_check15.jpg"/>
-          <p:cNvPicPr>
-            <a:picLocks noChangeAspect="1" noChangeArrowheads="1"/>
-          </p:cNvPicPr>
-          <p:nvPr/>
-        </p:nvPicPr>
-        <p:blipFill rotWithShape="1">
-          <a:blip r:embed="rId2">
-            <a:extLst>
-              <a:ext uri="{28A0092B-C50C-407E-A947-70E740481C1C}">
-                <a14:useLocalDpi xmlns:a14="http://schemas.microsoft.com/office/drawing/2010/main" val="0"/>
-              </a:ext>
-            </a:extLst>
-          </a:blip>
-          <a:srcRect t="12107" r="18503" b="33627"/>
-          <a:stretch/>
-        </p:blipFill>
-        <p:spPr bwMode="auto">
-          <a:xfrm>
-            <a:off x="1723094" y="1268760"/>
-            <a:ext cx="5697812" cy="2371242"/>
-          </a:xfrm>
-          <a:prstGeom prst="rect">
-            <a:avLst/>
-          </a:prstGeom>
-          <a:noFill/>
-          <a:extLst>
-            <a:ext uri="{909E8E84-426E-40DD-AFC4-6F175D3DCCD1}">
-              <a14:hiddenFill xmlns:a14="http://schemas.microsoft.com/office/drawing/2010/main">
-                <a:solidFill>
-                  <a:srgbClr val="FFFFFF"/>
-                </a:solidFill>
-              </a14:hiddenFill>
-            </a:ext>
-          </a:extLst>
-        </p:spPr>
-      </p:pic>
-      <p:sp>
-        <p:nvSpPr>
-          <p:cNvPr id="30" name="Oval 29"/>
-          <p:cNvSpPr/>
-          <p:nvPr/>
-        </p:nvSpPr>
-        <p:spPr bwMode="auto">
-          <a:xfrm>
-            <a:off x="3779912" y="2132856"/>
-            <a:ext cx="216024" cy="864096"/>
-          </a:xfrm>
-          <a:prstGeom prst="ellipse">
-            <a:avLst/>
-          </a:prstGeom>
-          <a:noFill/>
-          <a:ln w="9525">
-            <a:solidFill>
-              <a:srgbClr val="FF0000"/>
-            </a:solidFill>
-            <a:miter lim="800000"/>
-            <a:headEnd/>
-            <a:tailEnd/>
-          </a:ln>
-        </p:spPr>
-        <p:txBody>
-          <a:bodyPr wrap="square" lIns="72000" tIns="72000" rIns="72000" bIns="72000" rtlCol="0" anchor="ctr"/>
-          <a:lstStyle/>
-          <a:p>
-            <a:pPr algn="ctr" eaLnBrk="0" hangingPunct="0"/>
-            <a:endParaRPr lang="ko-KR" altLang="en-US" sz="1600" dirty="0" smtClean="0">
-              <a:latin typeface="+mn-lt"/>
-              <a:ea typeface="Verdana" pitchFamily="34" charset="0"/>
-              <a:cs typeface="Verdana" pitchFamily="34" charset="0"/>
-            </a:endParaRPr>
-          </a:p>
-        </p:txBody>
-      </p:sp>
-      <p:cxnSp>
-        <p:nvCxnSpPr>
-          <p:cNvPr id="32" name="Straight Arrow Connector 31"/>
-          <p:cNvCxnSpPr>
-            <a:endCxn id="30" idx="2"/>
-          </p:cNvCxnSpPr>
-          <p:nvPr/>
-        </p:nvCxnSpPr>
-        <p:spPr>
-          <a:xfrm flipV="1">
-            <a:off x="3201901" y="2564904"/>
-            <a:ext cx="578011" cy="1224136"/>
-          </a:xfrm>
-          <a:prstGeom prst="straightConnector1">
-            <a:avLst/>
-          </a:prstGeom>
-          <a:ln w="19050">
-            <a:solidFill>
-              <a:srgbClr val="FF0000"/>
-            </a:solidFill>
-            <a:tailEnd type="arrow"/>
-          </a:ln>
-        </p:spPr>
-        <p:style>
-          <a:lnRef idx="1">
-            <a:schemeClr val="accent1"/>
-          </a:lnRef>
-          <a:fillRef idx="0">
-            <a:schemeClr val="accent1"/>
-          </a:fillRef>
-          <a:effectRef idx="0">
-            <a:schemeClr val="accent1"/>
-          </a:effectRef>
-          <a:fontRef idx="minor">
-            <a:schemeClr val="tx1"/>
-          </a:fontRef>
-        </p:style>
-      </p:cxnSp>
-      <p:pic>
-        <p:nvPicPr>
-          <p:cNvPr id="8195" name="Picture 3"/>
-          <p:cNvPicPr>
-            <a:picLocks noChangeAspect="1" noChangeArrowheads="1"/>
-          </p:cNvPicPr>
-          <p:nvPr/>
-        </p:nvPicPr>
-        <p:blipFill>
-          <a:blip r:embed="rId3">
-            <a:extLst>
-              <a:ext uri="{28A0092B-C50C-407E-A947-70E740481C1C}">
-                <a14:useLocalDpi xmlns:a14="http://schemas.microsoft.com/office/drawing/2010/main" val="0"/>
-              </a:ext>
-            </a:extLst>
-          </a:blip>
-          <a:srcRect/>
-          <a:stretch>
-            <a:fillRect/>
-          </a:stretch>
-        </p:blipFill>
-        <p:spPr bwMode="auto">
-          <a:xfrm>
-            <a:off x="1476629" y="4077072"/>
-            <a:ext cx="4822589" cy="977914"/>
-          </a:xfrm>
-          <a:prstGeom prst="rect">
-            <a:avLst/>
-          </a:prstGeom>
-          <a:noFill/>
-          <a:ln>
-            <a:noFill/>
-          </a:ln>
-          <a:extLst>
-            <a:ext uri="{909E8E84-426E-40DD-AFC4-6F175D3DCCD1}">
-              <a14:hiddenFill xmlns:a14="http://schemas.microsoft.com/office/drawing/2010/main">
-                <a:solidFill>
-                  <a:schemeClr val="accent1"/>
-                </a:solidFill>
-              </a14:hiddenFill>
-            </a:ext>
-            <a:ext uri="{91240B29-F687-4F45-9708-019B960494DF}">
-              <a14:hiddenLine xmlns:a14="http://schemas.microsoft.com/office/drawing/2010/main" w="9525">
-                <a:solidFill>
-                  <a:schemeClr val="tx1"/>
-                </a:solidFill>
-                <a:miter lim="800000"/>
-                <a:headEnd/>
-                <a:tailEnd/>
-              </a14:hiddenLine>
-            </a:ext>
-          </a:extLst>
-        </p:spPr>
-      </p:pic>
-      <p:sp>
-        <p:nvSpPr>
-          <p:cNvPr id="38" name="TextBox 37"/>
-          <p:cNvSpPr txBox="1"/>
-          <p:nvPr/>
-        </p:nvSpPr>
-        <p:spPr bwMode="auto">
-          <a:xfrm>
-            <a:off x="1689733" y="3789040"/>
-            <a:ext cx="3024336" cy="138499"/>
-          </a:xfrm>
-          <a:prstGeom prst="rect">
-            <a:avLst/>
-          </a:prstGeom>
-          <a:noFill/>
-          <a:ln w="9525">
-            <a:noFill/>
-            <a:miter lim="800000"/>
-            <a:headEnd/>
-            <a:tailEnd/>
-          </a:ln>
-          <a:effectLst/>
-        </p:spPr>
-        <p:txBody>
-          <a:bodyPr wrap="square" lIns="0" tIns="0" rIns="0" bIns="0" rtlCol="0" anchor="ctr" anchorCtr="0">
-            <a:spAutoFit/>
-          </a:bodyPr>
-          <a:lstStyle/>
-          <a:p>
-            <a:pPr marR="0" defTabSz="914400" eaLnBrk="0" fontAlgn="auto" latinLnBrk="0" hangingPunct="0">
-              <a:spcBef>
-                <a:spcPts val="0"/>
-              </a:spcBef>
-              <a:spcAft>
-                <a:spcPts val="300"/>
-              </a:spcAft>
-              <a:buClr>
-                <a:schemeClr val="accent1"/>
-              </a:buClr>
-              <a:buSzTx/>
-              <a:tabLst/>
-            </a:pPr>
-            <a:r>
-              <a:rPr lang="en-US" altLang="ko-KR" sz="900" kern="0" dirty="0" smtClean="0">
-                <a:latin typeface="Verdana" pitchFamily="34" charset="0"/>
-                <a:ea typeface="Verdana" pitchFamily="34" charset="0"/>
-                <a:cs typeface="Verdana" pitchFamily="34" charset="0"/>
-              </a:rPr>
-              <a:t>Considering Group Delay, 10 data is ignored.</a:t>
-            </a:r>
-            <a:endParaRPr lang="en-US" altLang="ko-KR" sz="900" kern="0" dirty="0">
-              <a:latin typeface="Verdana" pitchFamily="34" charset="0"/>
-              <a:ea typeface="Verdana" pitchFamily="34" charset="0"/>
-              <a:cs typeface="Verdana" pitchFamily="34" charset="0"/>
-            </a:endParaRPr>
-          </a:p>
-        </p:txBody>
-      </p:sp>
-    </p:spTree>
-    <p:extLst>
-      <p:ext uri="{BB962C8B-B14F-4D97-AF65-F5344CB8AC3E}">
-        <p14:creationId xmlns:p14="http://schemas.microsoft.com/office/powerpoint/2010/main" val="1348470548"/>
       </p:ext>
     </p:extLst>
   </p:cSld>

</xml_diff>

<commit_message>
2015/07/27 -Gain bug 수정 -Integration bug 수정
</commit_message>
<xml_diff>
--- a/Knock Detection Reference Code Specification.pptx
+++ b/Knock Detection Reference Code Specification.pptx
@@ -5,10 +5,10 @@
     <p:sldMasterId id="2147483715" r:id="rId1"/>
   </p:sldMasterIdLst>
   <p:notesMasterIdLst>
-    <p:notesMasterId r:id="rId25"/>
+    <p:notesMasterId r:id="rId30"/>
   </p:notesMasterIdLst>
   <p:handoutMasterIdLst>
-    <p:handoutMasterId r:id="rId26"/>
+    <p:handoutMasterId r:id="rId31"/>
   </p:handoutMasterIdLst>
   <p:sldIdLst>
     <p:sldId id="256" r:id="rId2"/>
@@ -33,12 +33,17 @@
     <p:sldId id="272" r:id="rId21"/>
     <p:sldId id="277" r:id="rId22"/>
     <p:sldId id="278" r:id="rId23"/>
-    <p:sldId id="258" r:id="rId24"/>
+    <p:sldId id="279" r:id="rId24"/>
+    <p:sldId id="280" r:id="rId25"/>
+    <p:sldId id="281" r:id="rId26"/>
+    <p:sldId id="282" r:id="rId27"/>
+    <p:sldId id="283" r:id="rId28"/>
+    <p:sldId id="258" r:id="rId29"/>
   </p:sldIdLst>
   <p:sldSz cx="9144000" cy="6858000" type="screen4x3"/>
   <p:notesSz cx="7099300" cy="10234613"/>
   <p:custDataLst>
-    <p:tags r:id="rId27"/>
+    <p:tags r:id="rId32"/>
   </p:custDataLst>
   <p:defaultTextStyle>
     <a:defPPr>
@@ -6707,7 +6712,7 @@
           <a:p>
             <a:r>
               <a:rPr lang="en-US" smtClean="0"/>
-              <a:t>07.07.2015</a:t>
+              <a:t>28.07.2015</a:t>
             </a:r>
             <a:endParaRPr lang="en-US" dirty="0" smtClean="0"/>
           </a:p>
@@ -12317,12 +12322,39 @@
       </p:grpSpPr>
       <p:sp>
         <p:nvSpPr>
+          <p:cNvPr id="6" name="Title 5"/>
+          <p:cNvSpPr>
+            <a:spLocks noGrp="1"/>
+          </p:cNvSpPr>
+          <p:nvPr>
+            <p:ph type="title"/>
+          </p:nvPr>
+        </p:nvSpPr>
+        <p:spPr/>
+        <p:txBody>
+          <a:bodyPr/>
+          <a:lstStyle/>
+          <a:p>
+            <a:r>
+              <a:rPr lang="en-US" altLang="ko-KR" dirty="0"/>
+              <a:t>Test </a:t>
+            </a:r>
+            <a:r>
+              <a:rPr lang="en-US" altLang="ko-KR" dirty="0" smtClean="0"/>
+              <a:t>Result-Execution time test</a:t>
+            </a:r>
+            <a:endParaRPr lang="en-US" dirty="0"/>
+          </a:p>
+        </p:txBody>
+      </p:sp>
+      <p:sp>
+        <p:nvSpPr>
           <p:cNvPr id="3" name="Slide Number Placeholder 2"/>
           <p:cNvSpPr>
             <a:spLocks noGrp="1"/>
           </p:cNvSpPr>
           <p:nvPr>
-            <p:ph type="sldNum" sz="quarter" idx="10"/>
+            <p:ph type="sldNum" sz="quarter" idx="14"/>
           </p:nvPr>
         </p:nvSpPr>
         <p:spPr/>
@@ -12338,6 +12370,2528 @@
               <a:rPr lang="en-US" smtClean="0"/>
               <a:pPr/>
               <a:t>23</a:t>
+            </a:fld>
+            <a:endParaRPr lang="en-US"/>
+          </a:p>
+        </p:txBody>
+      </p:sp>
+      <p:sp>
+        <p:nvSpPr>
+          <p:cNvPr id="4" name="Date Placeholder 3"/>
+          <p:cNvSpPr>
+            <a:spLocks noGrp="1"/>
+          </p:cNvSpPr>
+          <p:nvPr>
+            <p:ph type="dt" sz="half" idx="15"/>
+          </p:nvPr>
+        </p:nvSpPr>
+        <p:spPr/>
+        <p:txBody>
+          <a:bodyPr/>
+          <a:lstStyle/>
+          <a:p>
+            <a:r>
+              <a:rPr lang="en-US" smtClean="0"/>
+              <a:t>set date</a:t>
+            </a:r>
+            <a:endParaRPr lang="en-US"/>
+          </a:p>
+        </p:txBody>
+      </p:sp>
+      <p:sp>
+        <p:nvSpPr>
+          <p:cNvPr id="5" name="Footer Placeholder 4"/>
+          <p:cNvSpPr>
+            <a:spLocks noGrp="1"/>
+          </p:cNvSpPr>
+          <p:nvPr>
+            <p:ph type="ftr" sz="quarter" idx="16"/>
+          </p:nvPr>
+        </p:nvSpPr>
+        <p:spPr/>
+        <p:txBody>
+          <a:bodyPr/>
+          <a:lstStyle/>
+          <a:p>
+            <a:r>
+              <a:rPr lang="en-US" smtClean="0"/>
+              <a:t>Copyright © Infineon Technologies AG 2013. All rights reserved.</a:t>
+            </a:r>
+            <a:endParaRPr lang="en-US"/>
+          </a:p>
+        </p:txBody>
+      </p:sp>
+      <p:pic>
+        <p:nvPicPr>
+          <p:cNvPr id="1026" name="Picture 2"/>
+          <p:cNvPicPr>
+            <a:picLocks noChangeAspect="1" noChangeArrowheads="1"/>
+          </p:cNvPicPr>
+          <p:nvPr/>
+        </p:nvPicPr>
+        <p:blipFill>
+          <a:blip r:embed="rId2">
+            <a:extLst>
+              <a:ext uri="{28A0092B-C50C-407E-A947-70E740481C1C}">
+                <a14:useLocalDpi xmlns:a14="http://schemas.microsoft.com/office/drawing/2010/main" val="0"/>
+              </a:ext>
+            </a:extLst>
+          </a:blip>
+          <a:srcRect/>
+          <a:stretch>
+            <a:fillRect/>
+          </a:stretch>
+        </p:blipFill>
+        <p:spPr bwMode="auto">
+          <a:xfrm>
+            <a:off x="376514" y="1196752"/>
+            <a:ext cx="7073190" cy="4824536"/>
+          </a:xfrm>
+          <a:prstGeom prst="rect">
+            <a:avLst/>
+          </a:prstGeom>
+          <a:noFill/>
+          <a:ln>
+            <a:noFill/>
+          </a:ln>
+          <a:extLst>
+            <a:ext uri="{909E8E84-426E-40DD-AFC4-6F175D3DCCD1}">
+              <a14:hiddenFill xmlns:a14="http://schemas.microsoft.com/office/drawing/2010/main">
+                <a:solidFill>
+                  <a:schemeClr val="accent1"/>
+                </a:solidFill>
+              </a14:hiddenFill>
+            </a:ext>
+            <a:ext uri="{91240B29-F687-4F45-9708-019B960494DF}">
+              <a14:hiddenLine xmlns:a14="http://schemas.microsoft.com/office/drawing/2010/main" w="9525">
+                <a:solidFill>
+                  <a:schemeClr val="tx1"/>
+                </a:solidFill>
+                <a:miter lim="800000"/>
+                <a:headEnd/>
+                <a:tailEnd/>
+              </a14:hiddenLine>
+            </a:ext>
+          </a:extLst>
+        </p:spPr>
+      </p:pic>
+      <p:sp>
+        <p:nvSpPr>
+          <p:cNvPr id="14" name="TextBox 13"/>
+          <p:cNvSpPr txBox="1"/>
+          <p:nvPr/>
+        </p:nvSpPr>
+        <p:spPr bwMode="auto">
+          <a:xfrm>
+            <a:off x="2396902" y="1297335"/>
+            <a:ext cx="1573357" cy="138499"/>
+          </a:xfrm>
+          <a:prstGeom prst="rect">
+            <a:avLst/>
+          </a:prstGeom>
+          <a:noFill/>
+          <a:ln w="9525">
+            <a:noFill/>
+            <a:miter lim="800000"/>
+            <a:headEnd/>
+            <a:tailEnd/>
+          </a:ln>
+          <a:effectLst/>
+        </p:spPr>
+        <p:txBody>
+          <a:bodyPr wrap="square" lIns="0" tIns="0" rIns="0" bIns="0" rtlCol="0" anchor="ctr" anchorCtr="0">
+            <a:spAutoFit/>
+          </a:bodyPr>
+          <a:lstStyle/>
+          <a:p>
+            <a:pPr marR="0" defTabSz="914400" eaLnBrk="0" fontAlgn="auto" latinLnBrk="0" hangingPunct="0">
+              <a:spcBef>
+                <a:spcPts val="0"/>
+              </a:spcBef>
+              <a:spcAft>
+                <a:spcPts val="300"/>
+              </a:spcAft>
+              <a:buClr>
+                <a:schemeClr val="accent1"/>
+              </a:buClr>
+              <a:buSzTx/>
+              <a:tabLst/>
+            </a:pPr>
+            <a:r>
+              <a:rPr lang="en-US" altLang="ko-KR" sz="900" b="1" kern="0" dirty="0" smtClean="0">
+                <a:solidFill>
+                  <a:srgbClr val="FF0000"/>
+                </a:solidFill>
+                <a:latin typeface="Verdana" pitchFamily="34" charset="0"/>
+                <a:ea typeface="Verdana" pitchFamily="34" charset="0"/>
+                <a:cs typeface="Verdana" pitchFamily="34" charset="0"/>
+              </a:rPr>
+              <a:t>1ms OS Task  </a:t>
+            </a:r>
+            <a:r>
+              <a:rPr lang="ko-KR" altLang="en-US" sz="900" b="1" kern="0" dirty="0" smtClean="0">
+                <a:solidFill>
+                  <a:srgbClr val="FF0000"/>
+                </a:solidFill>
+                <a:latin typeface="Verdana" pitchFamily="34" charset="0"/>
+                <a:ea typeface="Verdana" pitchFamily="34" charset="0"/>
+                <a:cs typeface="Verdana" pitchFamily="34" charset="0"/>
+              </a:rPr>
+              <a:t>수행주기</a:t>
+            </a:r>
+            <a:endParaRPr lang="en-US" altLang="ko-KR" sz="900" b="1" kern="0" dirty="0">
+              <a:solidFill>
+                <a:srgbClr val="FF0000"/>
+              </a:solidFill>
+              <a:latin typeface="Verdana" pitchFamily="34" charset="0"/>
+              <a:ea typeface="Verdana" pitchFamily="34" charset="0"/>
+              <a:cs typeface="Verdana" pitchFamily="34" charset="0"/>
+            </a:endParaRPr>
+          </a:p>
+        </p:txBody>
+      </p:sp>
+      <p:sp>
+        <p:nvSpPr>
+          <p:cNvPr id="15" name="TextBox 14"/>
+          <p:cNvSpPr txBox="1"/>
+          <p:nvPr/>
+        </p:nvSpPr>
+        <p:spPr bwMode="auto">
+          <a:xfrm>
+            <a:off x="2413298" y="2636912"/>
+            <a:ext cx="1798662" cy="138499"/>
+          </a:xfrm>
+          <a:prstGeom prst="rect">
+            <a:avLst/>
+          </a:prstGeom>
+          <a:noFill/>
+          <a:ln w="9525">
+            <a:noFill/>
+            <a:miter lim="800000"/>
+            <a:headEnd/>
+            <a:tailEnd/>
+          </a:ln>
+          <a:effectLst/>
+        </p:spPr>
+        <p:txBody>
+          <a:bodyPr wrap="square" lIns="0" tIns="0" rIns="0" bIns="0" rtlCol="0" anchor="ctr" anchorCtr="0">
+            <a:spAutoFit/>
+          </a:bodyPr>
+          <a:lstStyle/>
+          <a:p>
+            <a:pPr marR="0" defTabSz="914400" eaLnBrk="0" fontAlgn="auto" latinLnBrk="0" hangingPunct="0">
+              <a:spcBef>
+                <a:spcPts val="0"/>
+              </a:spcBef>
+              <a:spcAft>
+                <a:spcPts val="300"/>
+              </a:spcAft>
+              <a:buClr>
+                <a:schemeClr val="accent1"/>
+              </a:buClr>
+              <a:buSzTx/>
+              <a:tabLst/>
+            </a:pPr>
+            <a:r>
+              <a:rPr lang="en-US" altLang="ko-KR" sz="900" b="1" kern="0" dirty="0" smtClean="0">
+                <a:solidFill>
+                  <a:srgbClr val="FF0000"/>
+                </a:solidFill>
+                <a:latin typeface="Verdana" pitchFamily="34" charset="0"/>
+                <a:ea typeface="Verdana" pitchFamily="34" charset="0"/>
+                <a:cs typeface="Verdana" pitchFamily="34" charset="0"/>
+              </a:rPr>
+              <a:t>128Data </a:t>
+            </a:r>
+            <a:r>
+              <a:rPr lang="ko-KR" altLang="en-US" sz="900" b="1" kern="0" dirty="0" smtClean="0">
+                <a:solidFill>
+                  <a:srgbClr val="FF0000"/>
+                </a:solidFill>
+                <a:latin typeface="Verdana" pitchFamily="34" charset="0"/>
+                <a:ea typeface="Verdana" pitchFamily="34" charset="0"/>
+                <a:cs typeface="Verdana" pitchFamily="34" charset="0"/>
+              </a:rPr>
+              <a:t>입력에 대한 </a:t>
+            </a:r>
+            <a:r>
+              <a:rPr lang="en-US" altLang="ko-KR" sz="900" b="1" kern="0" dirty="0" smtClean="0">
+                <a:solidFill>
+                  <a:srgbClr val="FF0000"/>
+                </a:solidFill>
+                <a:latin typeface="Verdana" pitchFamily="34" charset="0"/>
+                <a:ea typeface="Verdana" pitchFamily="34" charset="0"/>
+                <a:cs typeface="Verdana" pitchFamily="34" charset="0"/>
+              </a:rPr>
+              <a:t>FIR </a:t>
+            </a:r>
+            <a:r>
+              <a:rPr lang="ko-KR" altLang="en-US" sz="900" b="1" kern="0" dirty="0" smtClean="0">
+                <a:solidFill>
+                  <a:srgbClr val="FF0000"/>
+                </a:solidFill>
+                <a:latin typeface="Verdana" pitchFamily="34" charset="0"/>
+                <a:ea typeface="Verdana" pitchFamily="34" charset="0"/>
+                <a:cs typeface="Verdana" pitchFamily="34" charset="0"/>
+              </a:rPr>
+              <a:t>처리</a:t>
+            </a:r>
+            <a:endParaRPr lang="en-US" altLang="ko-KR" sz="900" b="1" kern="0" dirty="0">
+              <a:solidFill>
+                <a:srgbClr val="FF0000"/>
+              </a:solidFill>
+              <a:latin typeface="Verdana" pitchFamily="34" charset="0"/>
+              <a:ea typeface="Verdana" pitchFamily="34" charset="0"/>
+              <a:cs typeface="Verdana" pitchFamily="34" charset="0"/>
+            </a:endParaRPr>
+          </a:p>
+        </p:txBody>
+      </p:sp>
+      <p:sp>
+        <p:nvSpPr>
+          <p:cNvPr id="16" name="TextBox 15"/>
+          <p:cNvSpPr txBox="1"/>
+          <p:nvPr/>
+        </p:nvSpPr>
+        <p:spPr bwMode="auto">
+          <a:xfrm>
+            <a:off x="2573556" y="4005064"/>
+            <a:ext cx="2070451" cy="138499"/>
+          </a:xfrm>
+          <a:prstGeom prst="rect">
+            <a:avLst/>
+          </a:prstGeom>
+          <a:noFill/>
+          <a:ln w="9525">
+            <a:noFill/>
+            <a:miter lim="800000"/>
+            <a:headEnd/>
+            <a:tailEnd/>
+          </a:ln>
+          <a:effectLst/>
+        </p:spPr>
+        <p:txBody>
+          <a:bodyPr wrap="square" lIns="0" tIns="0" rIns="0" bIns="0" rtlCol="0" anchor="ctr" anchorCtr="0">
+            <a:spAutoFit/>
+          </a:bodyPr>
+          <a:lstStyle/>
+          <a:p>
+            <a:pPr marR="0" defTabSz="914400" eaLnBrk="0" fontAlgn="auto" latinLnBrk="0" hangingPunct="0">
+              <a:spcBef>
+                <a:spcPts val="0"/>
+              </a:spcBef>
+              <a:spcAft>
+                <a:spcPts val="300"/>
+              </a:spcAft>
+              <a:buClr>
+                <a:schemeClr val="accent1"/>
+              </a:buClr>
+              <a:buSzTx/>
+              <a:tabLst/>
+            </a:pPr>
+            <a:r>
+              <a:rPr lang="en-US" altLang="ko-KR" sz="900" b="1" kern="0" dirty="0" smtClean="0">
+                <a:solidFill>
+                  <a:srgbClr val="FF0000"/>
+                </a:solidFill>
+                <a:latin typeface="Verdana" pitchFamily="34" charset="0"/>
+                <a:ea typeface="Verdana" pitchFamily="34" charset="0"/>
+                <a:cs typeface="Verdana" pitchFamily="34" charset="0"/>
+              </a:rPr>
+              <a:t>31~40 Data </a:t>
+            </a:r>
+            <a:r>
+              <a:rPr lang="ko-KR" altLang="en-US" sz="900" b="1" kern="0" dirty="0" smtClean="0">
+                <a:solidFill>
+                  <a:srgbClr val="FF0000"/>
+                </a:solidFill>
+                <a:latin typeface="Verdana" pitchFamily="34" charset="0"/>
+                <a:ea typeface="Verdana" pitchFamily="34" charset="0"/>
+                <a:cs typeface="Verdana" pitchFamily="34" charset="0"/>
+              </a:rPr>
+              <a:t>입력에 대한 </a:t>
+            </a:r>
+            <a:r>
+              <a:rPr lang="en-US" altLang="ko-KR" sz="900" b="1" kern="0" dirty="0" smtClean="0">
+                <a:solidFill>
+                  <a:srgbClr val="FF0000"/>
+                </a:solidFill>
+                <a:latin typeface="Verdana" pitchFamily="34" charset="0"/>
+                <a:ea typeface="Verdana" pitchFamily="34" charset="0"/>
+                <a:cs typeface="Verdana" pitchFamily="34" charset="0"/>
+              </a:rPr>
+              <a:t>FIR </a:t>
+            </a:r>
+            <a:r>
+              <a:rPr lang="ko-KR" altLang="en-US" sz="900" b="1" kern="0" dirty="0" smtClean="0">
+                <a:solidFill>
+                  <a:srgbClr val="FF0000"/>
+                </a:solidFill>
+                <a:latin typeface="Verdana" pitchFamily="34" charset="0"/>
+                <a:ea typeface="Verdana" pitchFamily="34" charset="0"/>
+                <a:cs typeface="Verdana" pitchFamily="34" charset="0"/>
+              </a:rPr>
+              <a:t>처리</a:t>
+            </a:r>
+            <a:endParaRPr lang="en-US" altLang="ko-KR" sz="900" b="1" kern="0" dirty="0">
+              <a:solidFill>
+                <a:srgbClr val="FF0000"/>
+              </a:solidFill>
+              <a:latin typeface="Verdana" pitchFamily="34" charset="0"/>
+              <a:ea typeface="Verdana" pitchFamily="34" charset="0"/>
+              <a:cs typeface="Verdana" pitchFamily="34" charset="0"/>
+            </a:endParaRPr>
+          </a:p>
+        </p:txBody>
+      </p:sp>
+      <p:pic>
+        <p:nvPicPr>
+          <p:cNvPr id="9" name="Picture 12" descr="red pass.jpg (289×175)"/>
+          <p:cNvPicPr>
+            <a:picLocks noChangeAspect="1" noChangeArrowheads="1"/>
+          </p:cNvPicPr>
+          <p:nvPr/>
+        </p:nvPicPr>
+        <p:blipFill>
+          <a:blip r:embed="rId3">
+            <a:extLst>
+              <a:ext uri="{28A0092B-C50C-407E-A947-70E740481C1C}">
+                <a14:useLocalDpi xmlns:a14="http://schemas.microsoft.com/office/drawing/2010/main" val="0"/>
+              </a:ext>
+            </a:extLst>
+          </a:blip>
+          <a:srcRect/>
+          <a:stretch>
+            <a:fillRect/>
+          </a:stretch>
+        </p:blipFill>
+        <p:spPr bwMode="auto">
+          <a:xfrm>
+            <a:off x="7116667" y="924712"/>
+            <a:ext cx="1788192" cy="1082815"/>
+          </a:xfrm>
+          <a:prstGeom prst="rect">
+            <a:avLst/>
+          </a:prstGeom>
+          <a:noFill/>
+          <a:extLst>
+            <a:ext uri="{909E8E84-426E-40DD-AFC4-6F175D3DCCD1}">
+              <a14:hiddenFill xmlns:a14="http://schemas.microsoft.com/office/drawing/2010/main">
+                <a:solidFill>
+                  <a:srgbClr val="FFFFFF"/>
+                </a:solidFill>
+              </a14:hiddenFill>
+            </a:ext>
+          </a:extLst>
+        </p:spPr>
+      </p:pic>
+    </p:spTree>
+    <p:extLst>
+      <p:ext uri="{BB962C8B-B14F-4D97-AF65-F5344CB8AC3E}">
+        <p14:creationId xmlns:p14="http://schemas.microsoft.com/office/powerpoint/2010/main" val="855484931"/>
+      </p:ext>
+    </p:extLst>
+  </p:cSld>
+  <p:clrMapOvr>
+    <a:masterClrMapping/>
+  </p:clrMapOvr>
+</p:sld>
+</file>
+
+<file path=ppt/slides/slide24.xml><?xml version="1.0" encoding="utf-8"?>
+<p:sld xmlns:a="http://schemas.openxmlformats.org/drawingml/2006/main" xmlns:r="http://schemas.openxmlformats.org/officeDocument/2006/relationships" xmlns:p="http://schemas.openxmlformats.org/presentationml/2006/main">
+  <p:cSld>
+    <p:spTree>
+      <p:nvGrpSpPr>
+        <p:cNvPr id="1" name=""/>
+        <p:cNvGrpSpPr/>
+        <p:nvPr/>
+      </p:nvGrpSpPr>
+      <p:grpSpPr>
+        <a:xfrm>
+          <a:off x="0" y="0"/>
+          <a:ext cx="0" cy="0"/>
+          <a:chOff x="0" y="0"/>
+          <a:chExt cx="0" cy="0"/>
+        </a:xfrm>
+      </p:grpSpPr>
+      <p:sp>
+        <p:nvSpPr>
+          <p:cNvPr id="6" name="Title 5"/>
+          <p:cNvSpPr>
+            <a:spLocks noGrp="1"/>
+          </p:cNvSpPr>
+          <p:nvPr>
+            <p:ph type="title"/>
+          </p:nvPr>
+        </p:nvSpPr>
+        <p:spPr/>
+        <p:txBody>
+          <a:bodyPr/>
+          <a:lstStyle/>
+          <a:p>
+            <a:r>
+              <a:rPr lang="en-US" altLang="ko-KR" dirty="0"/>
+              <a:t>Test </a:t>
+            </a:r>
+            <a:r>
+              <a:rPr lang="en-US" altLang="ko-KR" dirty="0" smtClean="0"/>
+              <a:t>Result-Gain test</a:t>
+            </a:r>
+            <a:endParaRPr lang="en-US" dirty="0"/>
+          </a:p>
+        </p:txBody>
+      </p:sp>
+      <p:sp>
+        <p:nvSpPr>
+          <p:cNvPr id="3" name="Slide Number Placeholder 2"/>
+          <p:cNvSpPr>
+            <a:spLocks noGrp="1"/>
+          </p:cNvSpPr>
+          <p:nvPr>
+            <p:ph type="sldNum" sz="quarter" idx="14"/>
+          </p:nvPr>
+        </p:nvSpPr>
+        <p:spPr/>
+        <p:txBody>
+          <a:bodyPr/>
+          <a:lstStyle/>
+          <a:p>
+            <a:r>
+              <a:rPr lang="en-US" smtClean="0"/>
+              <a:t>Page </a:t>
+            </a:r>
+            <a:fld id="{C770E174-C44B-418F-89A4-426EF6EE2C67}" type="slidenum">
+              <a:rPr lang="en-US" smtClean="0"/>
+              <a:pPr/>
+              <a:t>24</a:t>
+            </a:fld>
+            <a:endParaRPr lang="en-US"/>
+          </a:p>
+        </p:txBody>
+      </p:sp>
+      <p:sp>
+        <p:nvSpPr>
+          <p:cNvPr id="4" name="Date Placeholder 3"/>
+          <p:cNvSpPr>
+            <a:spLocks noGrp="1"/>
+          </p:cNvSpPr>
+          <p:nvPr>
+            <p:ph type="dt" sz="half" idx="15"/>
+          </p:nvPr>
+        </p:nvSpPr>
+        <p:spPr/>
+        <p:txBody>
+          <a:bodyPr/>
+          <a:lstStyle/>
+          <a:p>
+            <a:r>
+              <a:rPr lang="en-US" smtClean="0"/>
+              <a:t>set date</a:t>
+            </a:r>
+            <a:endParaRPr lang="en-US"/>
+          </a:p>
+        </p:txBody>
+      </p:sp>
+      <p:sp>
+        <p:nvSpPr>
+          <p:cNvPr id="5" name="Footer Placeholder 4"/>
+          <p:cNvSpPr>
+            <a:spLocks noGrp="1"/>
+          </p:cNvSpPr>
+          <p:nvPr>
+            <p:ph type="ftr" sz="quarter" idx="16"/>
+          </p:nvPr>
+        </p:nvSpPr>
+        <p:spPr/>
+        <p:txBody>
+          <a:bodyPr/>
+          <a:lstStyle/>
+          <a:p>
+            <a:r>
+              <a:rPr lang="en-US" smtClean="0"/>
+              <a:t>Copyright © Infineon Technologies AG 2013. All rights reserved.</a:t>
+            </a:r>
+            <a:endParaRPr lang="en-US"/>
+          </a:p>
+        </p:txBody>
+      </p:sp>
+      <p:pic>
+        <p:nvPicPr>
+          <p:cNvPr id="9" name="Picture 12" descr="red pass.jpg (289×175)"/>
+          <p:cNvPicPr>
+            <a:picLocks noChangeAspect="1" noChangeArrowheads="1"/>
+          </p:cNvPicPr>
+          <p:nvPr/>
+        </p:nvPicPr>
+        <p:blipFill>
+          <a:blip r:embed="rId2">
+            <a:extLst>
+              <a:ext uri="{28A0092B-C50C-407E-A947-70E740481C1C}">
+                <a14:useLocalDpi xmlns:a14="http://schemas.microsoft.com/office/drawing/2010/main" val="0"/>
+              </a:ext>
+            </a:extLst>
+          </a:blip>
+          <a:srcRect/>
+          <a:stretch>
+            <a:fillRect/>
+          </a:stretch>
+        </p:blipFill>
+        <p:spPr bwMode="auto">
+          <a:xfrm>
+            <a:off x="7116667" y="924712"/>
+            <a:ext cx="1788192" cy="1082815"/>
+          </a:xfrm>
+          <a:prstGeom prst="rect">
+            <a:avLst/>
+          </a:prstGeom>
+          <a:noFill/>
+          <a:extLst>
+            <a:ext uri="{909E8E84-426E-40DD-AFC4-6F175D3DCCD1}">
+              <a14:hiddenFill xmlns:a14="http://schemas.microsoft.com/office/drawing/2010/main">
+                <a:solidFill>
+                  <a:srgbClr val="FFFFFF"/>
+                </a:solidFill>
+              </a14:hiddenFill>
+            </a:ext>
+          </a:extLst>
+        </p:spPr>
+      </p:pic>
+      <p:pic>
+        <p:nvPicPr>
+          <p:cNvPr id="2050" name="Picture 2"/>
+          <p:cNvPicPr>
+            <a:picLocks noChangeAspect="1" noChangeArrowheads="1"/>
+          </p:cNvPicPr>
+          <p:nvPr/>
+        </p:nvPicPr>
+        <p:blipFill>
+          <a:blip r:embed="rId3">
+            <a:extLst>
+              <a:ext uri="{28A0092B-C50C-407E-A947-70E740481C1C}">
+                <a14:useLocalDpi xmlns:a14="http://schemas.microsoft.com/office/drawing/2010/main" val="0"/>
+              </a:ext>
+            </a:extLst>
+          </a:blip>
+          <a:srcRect/>
+          <a:stretch>
+            <a:fillRect/>
+          </a:stretch>
+        </p:blipFill>
+        <p:spPr bwMode="auto">
+          <a:xfrm>
+            <a:off x="323528" y="1297335"/>
+            <a:ext cx="2290656" cy="1440000"/>
+          </a:xfrm>
+          <a:prstGeom prst="rect">
+            <a:avLst/>
+          </a:prstGeom>
+          <a:noFill/>
+          <a:ln>
+            <a:noFill/>
+          </a:ln>
+          <a:extLst>
+            <a:ext uri="{909E8E84-426E-40DD-AFC4-6F175D3DCCD1}">
+              <a14:hiddenFill xmlns:a14="http://schemas.microsoft.com/office/drawing/2010/main">
+                <a:solidFill>
+                  <a:schemeClr val="accent1"/>
+                </a:solidFill>
+              </a14:hiddenFill>
+            </a:ext>
+            <a:ext uri="{91240B29-F687-4F45-9708-019B960494DF}">
+              <a14:hiddenLine xmlns:a14="http://schemas.microsoft.com/office/drawing/2010/main" w="9525">
+                <a:solidFill>
+                  <a:schemeClr val="tx1"/>
+                </a:solidFill>
+                <a:miter lim="800000"/>
+                <a:headEnd/>
+                <a:tailEnd/>
+              </a14:hiddenLine>
+            </a:ext>
+          </a:extLst>
+        </p:spPr>
+      </p:pic>
+      <p:pic>
+        <p:nvPicPr>
+          <p:cNvPr id="2051" name="Picture 3"/>
+          <p:cNvPicPr>
+            <a:picLocks noChangeAspect="1" noChangeArrowheads="1"/>
+          </p:cNvPicPr>
+          <p:nvPr/>
+        </p:nvPicPr>
+        <p:blipFill>
+          <a:blip r:embed="rId4">
+            <a:extLst>
+              <a:ext uri="{28A0092B-C50C-407E-A947-70E740481C1C}">
+                <a14:useLocalDpi xmlns:a14="http://schemas.microsoft.com/office/drawing/2010/main" val="0"/>
+              </a:ext>
+            </a:extLst>
+          </a:blip>
+          <a:srcRect/>
+          <a:stretch>
+            <a:fillRect/>
+          </a:stretch>
+        </p:blipFill>
+        <p:spPr bwMode="auto">
+          <a:xfrm>
+            <a:off x="236388" y="1035800"/>
+            <a:ext cx="4619625" cy="219075"/>
+          </a:xfrm>
+          <a:prstGeom prst="rect">
+            <a:avLst/>
+          </a:prstGeom>
+          <a:noFill/>
+          <a:ln>
+            <a:noFill/>
+          </a:ln>
+          <a:extLst>
+            <a:ext uri="{909E8E84-426E-40DD-AFC4-6F175D3DCCD1}">
+              <a14:hiddenFill xmlns:a14="http://schemas.microsoft.com/office/drawing/2010/main">
+                <a:solidFill>
+                  <a:schemeClr val="accent1"/>
+                </a:solidFill>
+              </a14:hiddenFill>
+            </a:ext>
+            <a:ext uri="{91240B29-F687-4F45-9708-019B960494DF}">
+              <a14:hiddenLine xmlns:a14="http://schemas.microsoft.com/office/drawing/2010/main" w="9525">
+                <a:solidFill>
+                  <a:schemeClr val="tx1"/>
+                </a:solidFill>
+                <a:miter lim="800000"/>
+                <a:headEnd/>
+                <a:tailEnd/>
+              </a14:hiddenLine>
+            </a:ext>
+          </a:extLst>
+        </p:spPr>
+      </p:pic>
+      <p:pic>
+        <p:nvPicPr>
+          <p:cNvPr id="2052" name="Picture 4"/>
+          <p:cNvPicPr>
+            <a:picLocks noChangeAspect="1" noChangeArrowheads="1"/>
+          </p:cNvPicPr>
+          <p:nvPr/>
+        </p:nvPicPr>
+        <p:blipFill>
+          <a:blip r:embed="rId5">
+            <a:extLst>
+              <a:ext uri="{28A0092B-C50C-407E-A947-70E740481C1C}">
+                <a14:useLocalDpi xmlns:a14="http://schemas.microsoft.com/office/drawing/2010/main" val="0"/>
+              </a:ext>
+            </a:extLst>
+          </a:blip>
+          <a:srcRect/>
+          <a:stretch>
+            <a:fillRect/>
+          </a:stretch>
+        </p:blipFill>
+        <p:spPr bwMode="auto">
+          <a:xfrm>
+            <a:off x="2593596" y="1297335"/>
+            <a:ext cx="2290655" cy="1440000"/>
+          </a:xfrm>
+          <a:prstGeom prst="rect">
+            <a:avLst/>
+          </a:prstGeom>
+          <a:noFill/>
+          <a:ln>
+            <a:noFill/>
+          </a:ln>
+          <a:extLst>
+            <a:ext uri="{909E8E84-426E-40DD-AFC4-6F175D3DCCD1}">
+              <a14:hiddenFill xmlns:a14="http://schemas.microsoft.com/office/drawing/2010/main">
+                <a:solidFill>
+                  <a:schemeClr val="accent1"/>
+                </a:solidFill>
+              </a14:hiddenFill>
+            </a:ext>
+            <a:ext uri="{91240B29-F687-4F45-9708-019B960494DF}">
+              <a14:hiddenLine xmlns:a14="http://schemas.microsoft.com/office/drawing/2010/main" w="9525">
+                <a:solidFill>
+                  <a:schemeClr val="tx1"/>
+                </a:solidFill>
+                <a:miter lim="800000"/>
+                <a:headEnd/>
+                <a:tailEnd/>
+              </a14:hiddenLine>
+            </a:ext>
+          </a:extLst>
+        </p:spPr>
+      </p:pic>
+      <p:pic>
+        <p:nvPicPr>
+          <p:cNvPr id="2053" name="Picture 5"/>
+          <p:cNvPicPr>
+            <a:picLocks noChangeAspect="1" noChangeArrowheads="1"/>
+          </p:cNvPicPr>
+          <p:nvPr/>
+        </p:nvPicPr>
+        <p:blipFill>
+          <a:blip r:embed="rId6">
+            <a:extLst>
+              <a:ext uri="{28A0092B-C50C-407E-A947-70E740481C1C}">
+                <a14:useLocalDpi xmlns:a14="http://schemas.microsoft.com/office/drawing/2010/main" val="0"/>
+              </a:ext>
+            </a:extLst>
+          </a:blip>
+          <a:srcRect/>
+          <a:stretch>
+            <a:fillRect/>
+          </a:stretch>
+        </p:blipFill>
+        <p:spPr bwMode="auto">
+          <a:xfrm>
+            <a:off x="323528" y="2708920"/>
+            <a:ext cx="2290656" cy="1440000"/>
+          </a:xfrm>
+          <a:prstGeom prst="rect">
+            <a:avLst/>
+          </a:prstGeom>
+          <a:noFill/>
+          <a:ln>
+            <a:noFill/>
+          </a:ln>
+          <a:extLst>
+            <a:ext uri="{909E8E84-426E-40DD-AFC4-6F175D3DCCD1}">
+              <a14:hiddenFill xmlns:a14="http://schemas.microsoft.com/office/drawing/2010/main">
+                <a:solidFill>
+                  <a:schemeClr val="accent1"/>
+                </a:solidFill>
+              </a14:hiddenFill>
+            </a:ext>
+            <a:ext uri="{91240B29-F687-4F45-9708-019B960494DF}">
+              <a14:hiddenLine xmlns:a14="http://schemas.microsoft.com/office/drawing/2010/main" w="9525">
+                <a:solidFill>
+                  <a:schemeClr val="tx1"/>
+                </a:solidFill>
+                <a:miter lim="800000"/>
+                <a:headEnd/>
+                <a:tailEnd/>
+              </a14:hiddenLine>
+            </a:ext>
+          </a:extLst>
+        </p:spPr>
+      </p:pic>
+      <p:pic>
+        <p:nvPicPr>
+          <p:cNvPr id="2054" name="Picture 6"/>
+          <p:cNvPicPr>
+            <a:picLocks noChangeAspect="1" noChangeArrowheads="1"/>
+          </p:cNvPicPr>
+          <p:nvPr/>
+        </p:nvPicPr>
+        <p:blipFill>
+          <a:blip r:embed="rId7">
+            <a:extLst>
+              <a:ext uri="{28A0092B-C50C-407E-A947-70E740481C1C}">
+                <a14:useLocalDpi xmlns:a14="http://schemas.microsoft.com/office/drawing/2010/main" val="0"/>
+              </a:ext>
+            </a:extLst>
+          </a:blip>
+          <a:srcRect/>
+          <a:stretch>
+            <a:fillRect/>
+          </a:stretch>
+        </p:blipFill>
+        <p:spPr bwMode="auto">
+          <a:xfrm>
+            <a:off x="2593596" y="2708920"/>
+            <a:ext cx="2290656" cy="1440000"/>
+          </a:xfrm>
+          <a:prstGeom prst="rect">
+            <a:avLst/>
+          </a:prstGeom>
+          <a:noFill/>
+          <a:ln>
+            <a:noFill/>
+          </a:ln>
+          <a:extLst>
+            <a:ext uri="{909E8E84-426E-40DD-AFC4-6F175D3DCCD1}">
+              <a14:hiddenFill xmlns:a14="http://schemas.microsoft.com/office/drawing/2010/main">
+                <a:solidFill>
+                  <a:schemeClr val="accent1"/>
+                </a:solidFill>
+              </a14:hiddenFill>
+            </a:ext>
+            <a:ext uri="{91240B29-F687-4F45-9708-019B960494DF}">
+              <a14:hiddenLine xmlns:a14="http://schemas.microsoft.com/office/drawing/2010/main" w="9525">
+                <a:solidFill>
+                  <a:schemeClr val="tx1"/>
+                </a:solidFill>
+                <a:miter lim="800000"/>
+                <a:headEnd/>
+                <a:tailEnd/>
+              </a14:hiddenLine>
+            </a:ext>
+          </a:extLst>
+        </p:spPr>
+      </p:pic>
+      <p:pic>
+        <p:nvPicPr>
+          <p:cNvPr id="2055" name="Picture 7"/>
+          <p:cNvPicPr>
+            <a:picLocks noChangeAspect="1" noChangeArrowheads="1"/>
+          </p:cNvPicPr>
+          <p:nvPr/>
+        </p:nvPicPr>
+        <p:blipFill>
+          <a:blip r:embed="rId8">
+            <a:extLst>
+              <a:ext uri="{28A0092B-C50C-407E-A947-70E740481C1C}">
+                <a14:useLocalDpi xmlns:a14="http://schemas.microsoft.com/office/drawing/2010/main" val="0"/>
+              </a:ext>
+            </a:extLst>
+          </a:blip>
+          <a:srcRect/>
+          <a:stretch>
+            <a:fillRect/>
+          </a:stretch>
+        </p:blipFill>
+        <p:spPr bwMode="auto">
+          <a:xfrm>
+            <a:off x="251520" y="4941168"/>
+            <a:ext cx="5172075" cy="847725"/>
+          </a:xfrm>
+          <a:prstGeom prst="rect">
+            <a:avLst/>
+          </a:prstGeom>
+          <a:noFill/>
+          <a:ln>
+            <a:noFill/>
+          </a:ln>
+          <a:extLst>
+            <a:ext uri="{909E8E84-426E-40DD-AFC4-6F175D3DCCD1}">
+              <a14:hiddenFill xmlns:a14="http://schemas.microsoft.com/office/drawing/2010/main">
+                <a:solidFill>
+                  <a:schemeClr val="accent1"/>
+                </a:solidFill>
+              </a14:hiddenFill>
+            </a:ext>
+            <a:ext uri="{91240B29-F687-4F45-9708-019B960494DF}">
+              <a14:hiddenLine xmlns:a14="http://schemas.microsoft.com/office/drawing/2010/main" w="9525">
+                <a:solidFill>
+                  <a:schemeClr val="tx1"/>
+                </a:solidFill>
+                <a:miter lim="800000"/>
+                <a:headEnd/>
+                <a:tailEnd/>
+              </a14:hiddenLine>
+            </a:ext>
+          </a:extLst>
+        </p:spPr>
+      </p:pic>
+      <p:sp>
+        <p:nvSpPr>
+          <p:cNvPr id="19" name="TextBox 18"/>
+          <p:cNvSpPr txBox="1"/>
+          <p:nvPr/>
+        </p:nvSpPr>
+        <p:spPr bwMode="auto">
+          <a:xfrm>
+            <a:off x="345678" y="4390835"/>
+            <a:ext cx="7394674" cy="315471"/>
+          </a:xfrm>
+          <a:prstGeom prst="rect">
+            <a:avLst/>
+          </a:prstGeom>
+          <a:noFill/>
+          <a:ln w="9525">
+            <a:noFill/>
+            <a:miter lim="800000"/>
+            <a:headEnd/>
+            <a:tailEnd/>
+          </a:ln>
+          <a:effectLst/>
+        </p:spPr>
+        <p:txBody>
+          <a:bodyPr wrap="square" lIns="0" tIns="0" rIns="0" bIns="0" rtlCol="0" anchor="ctr" anchorCtr="0">
+            <a:spAutoFit/>
+          </a:bodyPr>
+          <a:lstStyle/>
+          <a:p>
+            <a:pPr eaLnBrk="0" fontAlgn="auto" hangingPunct="0">
+              <a:spcBef>
+                <a:spcPts val="0"/>
+              </a:spcBef>
+              <a:spcAft>
+                <a:spcPts val="300"/>
+              </a:spcAft>
+              <a:buClr>
+                <a:schemeClr val="accent1"/>
+              </a:buClr>
+            </a:pPr>
+            <a:r>
+              <a:rPr lang="en-US" altLang="ko-KR" sz="900" dirty="0" smtClean="0"/>
+              <a:t>INCFGP</a:t>
+            </a:r>
+            <a:r>
+              <a:rPr lang="en-US" altLang="ko-KR" sz="900" dirty="0"/>
+              <a:t>, INCFGN, GAINSEL, INSEL, INMODE, INMAC </a:t>
+            </a:r>
+            <a:r>
+              <a:rPr lang="ko-KR" altLang="ko-KR" sz="900" dirty="0"/>
+              <a:t>접근관리 비트인</a:t>
+            </a:r>
+            <a:r>
+              <a:rPr lang="en-US" altLang="ko-KR" sz="900" dirty="0"/>
+              <a:t>  INCWC</a:t>
+            </a:r>
+            <a:r>
+              <a:rPr lang="ko-KR" altLang="ko-KR" sz="900" dirty="0"/>
+              <a:t>가 </a:t>
+            </a:r>
+            <a:r>
+              <a:rPr lang="ko-KR" altLang="ko-KR" sz="900" dirty="0" smtClean="0"/>
+              <a:t>미반영</a:t>
+            </a:r>
+            <a:r>
+              <a:rPr lang="en-US" altLang="ko-KR" sz="900" dirty="0" smtClean="0"/>
+              <a:t> </a:t>
+            </a:r>
+            <a:r>
+              <a:rPr lang="ko-KR" altLang="en-US" sz="900" dirty="0" smtClean="0"/>
+              <a:t>되어 버그 발생</a:t>
+            </a:r>
+            <a:r>
+              <a:rPr lang="en-US" altLang="ko-KR" sz="900" dirty="0" smtClean="0"/>
+              <a:t>.</a:t>
+            </a:r>
+          </a:p>
+          <a:p>
+            <a:pPr eaLnBrk="0" fontAlgn="auto" hangingPunct="0">
+              <a:spcBef>
+                <a:spcPts val="0"/>
+              </a:spcBef>
+              <a:spcAft>
+                <a:spcPts val="300"/>
+              </a:spcAft>
+              <a:buClr>
+                <a:schemeClr val="accent1"/>
+              </a:buClr>
+            </a:pPr>
+            <a:r>
+              <a:rPr lang="ko-KR" altLang="en-US" sz="900" b="1" kern="0" dirty="0" smtClean="0">
+                <a:solidFill>
+                  <a:srgbClr val="FF0000"/>
+                </a:solidFill>
+                <a:latin typeface="Verdana" pitchFamily="34" charset="0"/>
+                <a:ea typeface="Verdana" pitchFamily="34" charset="0"/>
+                <a:cs typeface="Verdana" pitchFamily="34" charset="0"/>
+              </a:rPr>
+              <a:t>아래와 같이 </a:t>
+            </a:r>
+            <a:r>
+              <a:rPr lang="en-US" altLang="ko-KR" sz="900" b="1" kern="0" dirty="0" smtClean="0">
+                <a:solidFill>
+                  <a:srgbClr val="FF0000"/>
+                </a:solidFill>
+                <a:latin typeface="Verdana" pitchFamily="34" charset="0"/>
+                <a:ea typeface="Verdana" pitchFamily="34" charset="0"/>
+                <a:cs typeface="Verdana" pitchFamily="34" charset="0"/>
+              </a:rPr>
+              <a:t>SW </a:t>
+            </a:r>
+            <a:r>
+              <a:rPr lang="ko-KR" altLang="en-US" sz="900" b="1" kern="0" dirty="0" smtClean="0">
+                <a:solidFill>
+                  <a:srgbClr val="FF0000"/>
+                </a:solidFill>
+                <a:latin typeface="Verdana" pitchFamily="34" charset="0"/>
+                <a:ea typeface="Verdana" pitchFamily="34" charset="0"/>
+                <a:cs typeface="Verdana" pitchFamily="34" charset="0"/>
+              </a:rPr>
+              <a:t>업데이트</a:t>
+            </a:r>
+            <a:endParaRPr lang="en-US" altLang="ko-KR" sz="900" b="1" kern="0" dirty="0">
+              <a:solidFill>
+                <a:srgbClr val="FF0000"/>
+              </a:solidFill>
+              <a:latin typeface="Verdana" pitchFamily="34" charset="0"/>
+              <a:ea typeface="Verdana" pitchFamily="34" charset="0"/>
+              <a:cs typeface="Verdana" pitchFamily="34" charset="0"/>
+            </a:endParaRPr>
+          </a:p>
+        </p:txBody>
+      </p:sp>
+    </p:spTree>
+    <p:extLst>
+      <p:ext uri="{BB962C8B-B14F-4D97-AF65-F5344CB8AC3E}">
+        <p14:creationId xmlns:p14="http://schemas.microsoft.com/office/powerpoint/2010/main" val="2726340981"/>
+      </p:ext>
+    </p:extLst>
+  </p:cSld>
+  <p:clrMapOvr>
+    <a:masterClrMapping/>
+  </p:clrMapOvr>
+</p:sld>
+</file>
+
+<file path=ppt/slides/slide25.xml><?xml version="1.0" encoding="utf-8"?>
+<p:sld xmlns:a="http://schemas.openxmlformats.org/drawingml/2006/main" xmlns:r="http://schemas.openxmlformats.org/officeDocument/2006/relationships" xmlns:p="http://schemas.openxmlformats.org/presentationml/2006/main">
+  <p:cSld>
+    <p:spTree>
+      <p:nvGrpSpPr>
+        <p:cNvPr id="1" name=""/>
+        <p:cNvGrpSpPr/>
+        <p:nvPr/>
+      </p:nvGrpSpPr>
+      <p:grpSpPr>
+        <a:xfrm>
+          <a:off x="0" y="0"/>
+          <a:ext cx="0" cy="0"/>
+          <a:chOff x="0" y="0"/>
+          <a:chExt cx="0" cy="0"/>
+        </a:xfrm>
+      </p:grpSpPr>
+      <p:sp>
+        <p:nvSpPr>
+          <p:cNvPr id="6" name="Title 5"/>
+          <p:cNvSpPr>
+            <a:spLocks noGrp="1"/>
+          </p:cNvSpPr>
+          <p:nvPr>
+            <p:ph type="title"/>
+          </p:nvPr>
+        </p:nvSpPr>
+        <p:spPr/>
+        <p:txBody>
+          <a:bodyPr/>
+          <a:lstStyle/>
+          <a:p>
+            <a:r>
+              <a:rPr lang="en-US" altLang="ko-KR" dirty="0"/>
+              <a:t>Test </a:t>
+            </a:r>
+            <a:r>
+              <a:rPr lang="en-US" altLang="ko-KR" dirty="0" smtClean="0"/>
+              <a:t>Result-Frequency test</a:t>
+            </a:r>
+            <a:endParaRPr lang="en-US" dirty="0"/>
+          </a:p>
+        </p:txBody>
+      </p:sp>
+      <p:sp>
+        <p:nvSpPr>
+          <p:cNvPr id="3" name="Slide Number Placeholder 2"/>
+          <p:cNvSpPr>
+            <a:spLocks noGrp="1"/>
+          </p:cNvSpPr>
+          <p:nvPr>
+            <p:ph type="sldNum" sz="quarter" idx="14"/>
+          </p:nvPr>
+        </p:nvSpPr>
+        <p:spPr/>
+        <p:txBody>
+          <a:bodyPr/>
+          <a:lstStyle/>
+          <a:p>
+            <a:r>
+              <a:rPr lang="en-US" smtClean="0"/>
+              <a:t>Page </a:t>
+            </a:r>
+            <a:fld id="{C770E174-C44B-418F-89A4-426EF6EE2C67}" type="slidenum">
+              <a:rPr lang="en-US" smtClean="0"/>
+              <a:pPr/>
+              <a:t>25</a:t>
+            </a:fld>
+            <a:endParaRPr lang="en-US"/>
+          </a:p>
+        </p:txBody>
+      </p:sp>
+      <p:sp>
+        <p:nvSpPr>
+          <p:cNvPr id="4" name="Date Placeholder 3"/>
+          <p:cNvSpPr>
+            <a:spLocks noGrp="1"/>
+          </p:cNvSpPr>
+          <p:nvPr>
+            <p:ph type="dt" sz="half" idx="15"/>
+          </p:nvPr>
+        </p:nvSpPr>
+        <p:spPr/>
+        <p:txBody>
+          <a:bodyPr/>
+          <a:lstStyle/>
+          <a:p>
+            <a:r>
+              <a:rPr lang="en-US" smtClean="0"/>
+              <a:t>set date</a:t>
+            </a:r>
+            <a:endParaRPr lang="en-US"/>
+          </a:p>
+        </p:txBody>
+      </p:sp>
+      <p:sp>
+        <p:nvSpPr>
+          <p:cNvPr id="5" name="Footer Placeholder 4"/>
+          <p:cNvSpPr>
+            <a:spLocks noGrp="1"/>
+          </p:cNvSpPr>
+          <p:nvPr>
+            <p:ph type="ftr" sz="quarter" idx="16"/>
+          </p:nvPr>
+        </p:nvSpPr>
+        <p:spPr/>
+        <p:txBody>
+          <a:bodyPr/>
+          <a:lstStyle/>
+          <a:p>
+            <a:r>
+              <a:rPr lang="en-US" smtClean="0"/>
+              <a:t>Copyright © Infineon Technologies AG 2013. All rights reserved.</a:t>
+            </a:r>
+            <a:endParaRPr lang="en-US"/>
+          </a:p>
+        </p:txBody>
+      </p:sp>
+      <p:pic>
+        <p:nvPicPr>
+          <p:cNvPr id="3076" name="Picture 4"/>
+          <p:cNvPicPr>
+            <a:picLocks noChangeAspect="1" noChangeArrowheads="1"/>
+          </p:cNvPicPr>
+          <p:nvPr/>
+        </p:nvPicPr>
+        <p:blipFill>
+          <a:blip r:embed="rId2">
+            <a:extLst>
+              <a:ext uri="{28A0092B-C50C-407E-A947-70E740481C1C}">
+                <a14:useLocalDpi xmlns:a14="http://schemas.microsoft.com/office/drawing/2010/main" val="0"/>
+              </a:ext>
+            </a:extLst>
+          </a:blip>
+          <a:srcRect/>
+          <a:stretch>
+            <a:fillRect/>
+          </a:stretch>
+        </p:blipFill>
+        <p:spPr bwMode="auto">
+          <a:xfrm>
+            <a:off x="122384" y="1366051"/>
+            <a:ext cx="8935714" cy="2606810"/>
+          </a:xfrm>
+          <a:prstGeom prst="rect">
+            <a:avLst/>
+          </a:prstGeom>
+          <a:noFill/>
+          <a:ln>
+            <a:noFill/>
+          </a:ln>
+          <a:extLst>
+            <a:ext uri="{909E8E84-426E-40DD-AFC4-6F175D3DCCD1}">
+              <a14:hiddenFill xmlns:a14="http://schemas.microsoft.com/office/drawing/2010/main">
+                <a:solidFill>
+                  <a:schemeClr val="accent1"/>
+                </a:solidFill>
+              </a14:hiddenFill>
+            </a:ext>
+            <a:ext uri="{91240B29-F687-4F45-9708-019B960494DF}">
+              <a14:hiddenLine xmlns:a14="http://schemas.microsoft.com/office/drawing/2010/main" w="9525">
+                <a:solidFill>
+                  <a:schemeClr val="tx1"/>
+                </a:solidFill>
+                <a:miter lim="800000"/>
+                <a:headEnd/>
+                <a:tailEnd/>
+              </a14:hiddenLine>
+            </a:ext>
+          </a:extLst>
+        </p:spPr>
+      </p:pic>
+      <p:pic>
+        <p:nvPicPr>
+          <p:cNvPr id="3079" name="Picture 7"/>
+          <p:cNvPicPr>
+            <a:picLocks noChangeAspect="1" noChangeArrowheads="1"/>
+          </p:cNvPicPr>
+          <p:nvPr/>
+        </p:nvPicPr>
+        <p:blipFill>
+          <a:blip r:embed="rId3">
+            <a:extLst>
+              <a:ext uri="{28A0092B-C50C-407E-A947-70E740481C1C}">
+                <a14:useLocalDpi xmlns:a14="http://schemas.microsoft.com/office/drawing/2010/main" val="0"/>
+              </a:ext>
+            </a:extLst>
+          </a:blip>
+          <a:srcRect/>
+          <a:stretch>
+            <a:fillRect/>
+          </a:stretch>
+        </p:blipFill>
+        <p:spPr bwMode="auto">
+          <a:xfrm>
+            <a:off x="122384" y="3933336"/>
+            <a:ext cx="4467857" cy="2520000"/>
+          </a:xfrm>
+          <a:prstGeom prst="rect">
+            <a:avLst/>
+          </a:prstGeom>
+          <a:noFill/>
+          <a:ln>
+            <a:noFill/>
+          </a:ln>
+          <a:extLst>
+            <a:ext uri="{909E8E84-426E-40DD-AFC4-6F175D3DCCD1}">
+              <a14:hiddenFill xmlns:a14="http://schemas.microsoft.com/office/drawing/2010/main">
+                <a:solidFill>
+                  <a:schemeClr val="accent1"/>
+                </a:solidFill>
+              </a14:hiddenFill>
+            </a:ext>
+            <a:ext uri="{91240B29-F687-4F45-9708-019B960494DF}">
+              <a14:hiddenLine xmlns:a14="http://schemas.microsoft.com/office/drawing/2010/main" w="9525">
+                <a:solidFill>
+                  <a:schemeClr val="tx1"/>
+                </a:solidFill>
+                <a:miter lim="800000"/>
+                <a:headEnd/>
+                <a:tailEnd/>
+              </a14:hiddenLine>
+            </a:ext>
+          </a:extLst>
+        </p:spPr>
+      </p:pic>
+      <p:sp>
+        <p:nvSpPr>
+          <p:cNvPr id="23" name="TextBox 22"/>
+          <p:cNvSpPr txBox="1"/>
+          <p:nvPr/>
+        </p:nvSpPr>
+        <p:spPr bwMode="auto">
+          <a:xfrm>
+            <a:off x="1043608" y="4947082"/>
+            <a:ext cx="2016224" cy="138499"/>
+          </a:xfrm>
+          <a:prstGeom prst="rect">
+            <a:avLst/>
+          </a:prstGeom>
+          <a:noFill/>
+          <a:ln w="9525">
+            <a:noFill/>
+            <a:miter lim="800000"/>
+            <a:headEnd/>
+            <a:tailEnd/>
+          </a:ln>
+          <a:effectLst/>
+        </p:spPr>
+        <p:txBody>
+          <a:bodyPr wrap="square" lIns="0" tIns="0" rIns="0" bIns="0" rtlCol="0" anchor="ctr" anchorCtr="0">
+            <a:spAutoFit/>
+          </a:bodyPr>
+          <a:lstStyle/>
+          <a:p>
+            <a:pPr eaLnBrk="0" fontAlgn="auto" hangingPunct="0">
+              <a:spcBef>
+                <a:spcPts val="0"/>
+              </a:spcBef>
+              <a:spcAft>
+                <a:spcPts val="300"/>
+              </a:spcAft>
+              <a:buClr>
+                <a:schemeClr val="accent1"/>
+              </a:buClr>
+            </a:pPr>
+            <a:r>
+              <a:rPr lang="en-US" altLang="ko-KR" sz="900" dirty="0" smtClean="0"/>
+              <a:t>.</a:t>
+            </a:r>
+            <a:r>
+              <a:rPr lang="en-US" altLang="ko-KR" sz="900" b="1" kern="0" dirty="0" smtClean="0">
+                <a:solidFill>
+                  <a:srgbClr val="FF0000"/>
+                </a:solidFill>
+                <a:latin typeface="Verdana" pitchFamily="34" charset="0"/>
+                <a:ea typeface="Verdana" pitchFamily="34" charset="0"/>
+                <a:cs typeface="Verdana" pitchFamily="34" charset="0"/>
+              </a:rPr>
+              <a:t>60~100Khz sweep for 30s</a:t>
+            </a:r>
+            <a:endParaRPr lang="en-US" altLang="ko-KR" sz="900" b="1" kern="0" dirty="0">
+              <a:solidFill>
+                <a:srgbClr val="FF0000"/>
+              </a:solidFill>
+              <a:latin typeface="Verdana" pitchFamily="34" charset="0"/>
+              <a:ea typeface="Verdana" pitchFamily="34" charset="0"/>
+              <a:cs typeface="Verdana" pitchFamily="34" charset="0"/>
+            </a:endParaRPr>
+          </a:p>
+        </p:txBody>
+      </p:sp>
+      <p:pic>
+        <p:nvPicPr>
+          <p:cNvPr id="3080" name="Picture 8"/>
+          <p:cNvPicPr>
+            <a:picLocks noChangeAspect="1" noChangeArrowheads="1"/>
+          </p:cNvPicPr>
+          <p:nvPr/>
+        </p:nvPicPr>
+        <p:blipFill>
+          <a:blip r:embed="rId4">
+            <a:extLst>
+              <a:ext uri="{28A0092B-C50C-407E-A947-70E740481C1C}">
+                <a14:useLocalDpi xmlns:a14="http://schemas.microsoft.com/office/drawing/2010/main" val="0"/>
+              </a:ext>
+            </a:extLst>
+          </a:blip>
+          <a:srcRect/>
+          <a:stretch>
+            <a:fillRect/>
+          </a:stretch>
+        </p:blipFill>
+        <p:spPr bwMode="auto">
+          <a:xfrm>
+            <a:off x="4590241" y="3933336"/>
+            <a:ext cx="4467857" cy="2520000"/>
+          </a:xfrm>
+          <a:prstGeom prst="rect">
+            <a:avLst/>
+          </a:prstGeom>
+          <a:noFill/>
+          <a:ln>
+            <a:noFill/>
+          </a:ln>
+          <a:extLst>
+            <a:ext uri="{909E8E84-426E-40DD-AFC4-6F175D3DCCD1}">
+              <a14:hiddenFill xmlns:a14="http://schemas.microsoft.com/office/drawing/2010/main">
+                <a:solidFill>
+                  <a:schemeClr val="accent1"/>
+                </a:solidFill>
+              </a14:hiddenFill>
+            </a:ext>
+            <a:ext uri="{91240B29-F687-4F45-9708-019B960494DF}">
+              <a14:hiddenLine xmlns:a14="http://schemas.microsoft.com/office/drawing/2010/main" w="9525">
+                <a:solidFill>
+                  <a:schemeClr val="tx1"/>
+                </a:solidFill>
+                <a:miter lim="800000"/>
+                <a:headEnd/>
+                <a:tailEnd/>
+              </a14:hiddenLine>
+            </a:ext>
+          </a:extLst>
+        </p:spPr>
+      </p:pic>
+      <p:pic>
+        <p:nvPicPr>
+          <p:cNvPr id="25" name="Picture 12" descr="red pass.jpg (289×175)"/>
+          <p:cNvPicPr>
+            <a:picLocks noChangeAspect="1" noChangeArrowheads="1"/>
+          </p:cNvPicPr>
+          <p:nvPr/>
+        </p:nvPicPr>
+        <p:blipFill>
+          <a:blip r:embed="rId5">
+            <a:extLst>
+              <a:ext uri="{28A0092B-C50C-407E-A947-70E740481C1C}">
+                <a14:useLocalDpi xmlns:a14="http://schemas.microsoft.com/office/drawing/2010/main" val="0"/>
+              </a:ext>
+            </a:extLst>
+          </a:blip>
+          <a:srcRect/>
+          <a:stretch>
+            <a:fillRect/>
+          </a:stretch>
+        </p:blipFill>
+        <p:spPr bwMode="auto">
+          <a:xfrm>
+            <a:off x="7479175" y="908720"/>
+            <a:ext cx="1664825" cy="1008112"/>
+          </a:xfrm>
+          <a:prstGeom prst="rect">
+            <a:avLst/>
+          </a:prstGeom>
+          <a:noFill/>
+          <a:extLst>
+            <a:ext uri="{909E8E84-426E-40DD-AFC4-6F175D3DCCD1}">
+              <a14:hiddenFill xmlns:a14="http://schemas.microsoft.com/office/drawing/2010/main">
+                <a:solidFill>
+                  <a:srgbClr val="FFFFFF"/>
+                </a:solidFill>
+              </a14:hiddenFill>
+            </a:ext>
+          </a:extLst>
+        </p:spPr>
+      </p:pic>
+      <p:sp>
+        <p:nvSpPr>
+          <p:cNvPr id="26" name="TextBox 25"/>
+          <p:cNvSpPr txBox="1"/>
+          <p:nvPr/>
+        </p:nvSpPr>
+        <p:spPr bwMode="auto">
+          <a:xfrm>
+            <a:off x="5490353" y="2718605"/>
+            <a:ext cx="2016224" cy="138499"/>
+          </a:xfrm>
+          <a:prstGeom prst="rect">
+            <a:avLst/>
+          </a:prstGeom>
+          <a:noFill/>
+          <a:ln w="9525">
+            <a:noFill/>
+            <a:miter lim="800000"/>
+            <a:headEnd/>
+            <a:tailEnd/>
+          </a:ln>
+          <a:effectLst/>
+        </p:spPr>
+        <p:txBody>
+          <a:bodyPr wrap="square" lIns="0" tIns="0" rIns="0" bIns="0" rtlCol="0" anchor="ctr" anchorCtr="0">
+            <a:spAutoFit/>
+          </a:bodyPr>
+          <a:lstStyle/>
+          <a:p>
+            <a:pPr eaLnBrk="0" fontAlgn="auto" hangingPunct="0">
+              <a:spcBef>
+                <a:spcPts val="0"/>
+              </a:spcBef>
+              <a:spcAft>
+                <a:spcPts val="300"/>
+              </a:spcAft>
+              <a:buClr>
+                <a:schemeClr val="accent1"/>
+              </a:buClr>
+            </a:pPr>
+            <a:r>
+              <a:rPr lang="en-US" altLang="ko-KR" sz="900" dirty="0" smtClean="0"/>
+              <a:t>.</a:t>
+            </a:r>
+            <a:r>
+              <a:rPr lang="en-US" altLang="ko-KR" sz="900" b="1" kern="0" dirty="0" smtClean="0">
+                <a:solidFill>
+                  <a:srgbClr val="FF0000"/>
+                </a:solidFill>
+                <a:latin typeface="Verdana" pitchFamily="34" charset="0"/>
+                <a:ea typeface="Verdana" pitchFamily="34" charset="0"/>
+                <a:cs typeface="Verdana" pitchFamily="34" charset="0"/>
+              </a:rPr>
+              <a:t>0~140Khz sweep for 50s</a:t>
+            </a:r>
+            <a:endParaRPr lang="en-US" altLang="ko-KR" sz="900" b="1" kern="0" dirty="0">
+              <a:solidFill>
+                <a:srgbClr val="FF0000"/>
+              </a:solidFill>
+              <a:latin typeface="Verdana" pitchFamily="34" charset="0"/>
+              <a:ea typeface="Verdana" pitchFamily="34" charset="0"/>
+              <a:cs typeface="Verdana" pitchFamily="34" charset="0"/>
+            </a:endParaRPr>
+          </a:p>
+        </p:txBody>
+      </p:sp>
+      <p:sp>
+        <p:nvSpPr>
+          <p:cNvPr id="27" name="TextBox 26"/>
+          <p:cNvSpPr txBox="1"/>
+          <p:nvPr/>
+        </p:nvSpPr>
+        <p:spPr bwMode="auto">
+          <a:xfrm>
+            <a:off x="6012160" y="5124086"/>
+            <a:ext cx="2016224" cy="138499"/>
+          </a:xfrm>
+          <a:prstGeom prst="rect">
+            <a:avLst/>
+          </a:prstGeom>
+          <a:noFill/>
+          <a:ln w="9525">
+            <a:noFill/>
+            <a:miter lim="800000"/>
+            <a:headEnd/>
+            <a:tailEnd/>
+          </a:ln>
+          <a:effectLst/>
+        </p:spPr>
+        <p:txBody>
+          <a:bodyPr wrap="square" lIns="0" tIns="0" rIns="0" bIns="0" rtlCol="0" anchor="ctr" anchorCtr="0">
+            <a:spAutoFit/>
+          </a:bodyPr>
+          <a:lstStyle/>
+          <a:p>
+            <a:pPr eaLnBrk="0" fontAlgn="auto" hangingPunct="0">
+              <a:spcBef>
+                <a:spcPts val="0"/>
+              </a:spcBef>
+              <a:spcAft>
+                <a:spcPts val="300"/>
+              </a:spcAft>
+              <a:buClr>
+                <a:schemeClr val="accent1"/>
+              </a:buClr>
+            </a:pPr>
+            <a:r>
+              <a:rPr lang="en-US" altLang="ko-KR" sz="900" dirty="0" smtClean="0"/>
+              <a:t>.</a:t>
+            </a:r>
+            <a:r>
+              <a:rPr lang="en-US" altLang="ko-KR" sz="900" b="1" kern="0" dirty="0" smtClean="0">
+                <a:solidFill>
+                  <a:srgbClr val="FF0000"/>
+                </a:solidFill>
+                <a:latin typeface="Verdana" pitchFamily="34" charset="0"/>
+                <a:ea typeface="Verdana" pitchFamily="34" charset="0"/>
+                <a:cs typeface="Verdana" pitchFamily="34" charset="0"/>
+              </a:rPr>
+              <a:t>40~140Khz sweep for 30s</a:t>
+            </a:r>
+            <a:endParaRPr lang="en-US" altLang="ko-KR" sz="900" b="1" kern="0" dirty="0">
+              <a:solidFill>
+                <a:srgbClr val="FF0000"/>
+              </a:solidFill>
+              <a:latin typeface="Verdana" pitchFamily="34" charset="0"/>
+              <a:ea typeface="Verdana" pitchFamily="34" charset="0"/>
+              <a:cs typeface="Verdana" pitchFamily="34" charset="0"/>
+            </a:endParaRPr>
+          </a:p>
+        </p:txBody>
+      </p:sp>
+      <p:sp>
+        <p:nvSpPr>
+          <p:cNvPr id="13" name="TextBox 12"/>
+          <p:cNvSpPr txBox="1"/>
+          <p:nvPr/>
+        </p:nvSpPr>
+        <p:spPr bwMode="auto">
+          <a:xfrm>
+            <a:off x="899592" y="1945011"/>
+            <a:ext cx="2016224" cy="138499"/>
+          </a:xfrm>
+          <a:prstGeom prst="rect">
+            <a:avLst/>
+          </a:prstGeom>
+          <a:noFill/>
+          <a:ln w="9525">
+            <a:noFill/>
+            <a:miter lim="800000"/>
+            <a:headEnd/>
+            <a:tailEnd/>
+          </a:ln>
+          <a:effectLst/>
+        </p:spPr>
+        <p:txBody>
+          <a:bodyPr wrap="square" lIns="0" tIns="0" rIns="0" bIns="0" rtlCol="0" anchor="ctr" anchorCtr="0">
+            <a:spAutoFit/>
+          </a:bodyPr>
+          <a:lstStyle/>
+          <a:p>
+            <a:pPr eaLnBrk="0" fontAlgn="auto" hangingPunct="0">
+              <a:spcBef>
+                <a:spcPts val="0"/>
+              </a:spcBef>
+              <a:spcAft>
+                <a:spcPts val="300"/>
+              </a:spcAft>
+              <a:buClr>
+                <a:schemeClr val="accent1"/>
+              </a:buClr>
+            </a:pPr>
+            <a:r>
+              <a:rPr lang="en-US" altLang="ko-KR" sz="900" b="1" kern="0" dirty="0" smtClean="0">
+                <a:solidFill>
+                  <a:srgbClr val="FF0000"/>
+                </a:solidFill>
+                <a:latin typeface="Verdana" pitchFamily="34" charset="0"/>
+                <a:ea typeface="Verdana" pitchFamily="34" charset="0"/>
+                <a:cs typeface="Verdana" pitchFamily="34" charset="0"/>
+              </a:rPr>
+              <a:t>DMA data</a:t>
+            </a:r>
+            <a:endParaRPr lang="en-US" altLang="ko-KR" sz="900" b="1" kern="0" dirty="0">
+              <a:solidFill>
+                <a:srgbClr val="FF0000"/>
+              </a:solidFill>
+              <a:latin typeface="Verdana" pitchFamily="34" charset="0"/>
+              <a:ea typeface="Verdana" pitchFamily="34" charset="0"/>
+              <a:cs typeface="Verdana" pitchFamily="34" charset="0"/>
+            </a:endParaRPr>
+          </a:p>
+        </p:txBody>
+      </p:sp>
+      <p:sp>
+        <p:nvSpPr>
+          <p:cNvPr id="14" name="TextBox 13"/>
+          <p:cNvSpPr txBox="1"/>
+          <p:nvPr/>
+        </p:nvSpPr>
+        <p:spPr bwMode="auto">
+          <a:xfrm>
+            <a:off x="899592" y="3140968"/>
+            <a:ext cx="2016224" cy="138499"/>
+          </a:xfrm>
+          <a:prstGeom prst="rect">
+            <a:avLst/>
+          </a:prstGeom>
+          <a:noFill/>
+          <a:ln w="9525">
+            <a:noFill/>
+            <a:miter lim="800000"/>
+            <a:headEnd/>
+            <a:tailEnd/>
+          </a:ln>
+          <a:effectLst/>
+        </p:spPr>
+        <p:txBody>
+          <a:bodyPr wrap="square" lIns="0" tIns="0" rIns="0" bIns="0" rtlCol="0" anchor="ctr" anchorCtr="0">
+            <a:spAutoFit/>
+          </a:bodyPr>
+          <a:lstStyle/>
+          <a:p>
+            <a:pPr eaLnBrk="0" fontAlgn="auto" hangingPunct="0">
+              <a:spcBef>
+                <a:spcPts val="0"/>
+              </a:spcBef>
+              <a:spcAft>
+                <a:spcPts val="300"/>
+              </a:spcAft>
+              <a:buClr>
+                <a:schemeClr val="accent1"/>
+              </a:buClr>
+            </a:pPr>
+            <a:r>
+              <a:rPr lang="en-US" altLang="ko-KR" sz="900" b="1" kern="0" dirty="0" smtClean="0">
+                <a:solidFill>
+                  <a:srgbClr val="FF0000"/>
+                </a:solidFill>
+                <a:latin typeface="Verdana" pitchFamily="34" charset="0"/>
+                <a:ea typeface="Verdana" pitchFamily="34" charset="0"/>
+                <a:cs typeface="Verdana" pitchFamily="34" charset="0"/>
+              </a:rPr>
+              <a:t>After </a:t>
+            </a:r>
+            <a:r>
+              <a:rPr lang="en-US" altLang="ko-KR" sz="900" b="1" kern="0" dirty="0" err="1" smtClean="0">
+                <a:solidFill>
+                  <a:srgbClr val="FF0000"/>
+                </a:solidFill>
+                <a:latin typeface="Verdana" pitchFamily="34" charset="0"/>
+                <a:ea typeface="Verdana" pitchFamily="34" charset="0"/>
+                <a:cs typeface="Verdana" pitchFamily="34" charset="0"/>
+              </a:rPr>
+              <a:t>Filterdata</a:t>
+            </a:r>
+            <a:endParaRPr lang="en-US" altLang="ko-KR" sz="900" b="1" kern="0" dirty="0">
+              <a:solidFill>
+                <a:srgbClr val="FF0000"/>
+              </a:solidFill>
+              <a:latin typeface="Verdana" pitchFamily="34" charset="0"/>
+              <a:ea typeface="Verdana" pitchFamily="34" charset="0"/>
+              <a:cs typeface="Verdana" pitchFamily="34" charset="0"/>
+            </a:endParaRPr>
+          </a:p>
+        </p:txBody>
+      </p:sp>
+    </p:spTree>
+    <p:extLst>
+      <p:ext uri="{BB962C8B-B14F-4D97-AF65-F5344CB8AC3E}">
+        <p14:creationId xmlns:p14="http://schemas.microsoft.com/office/powerpoint/2010/main" val="1946763017"/>
+      </p:ext>
+    </p:extLst>
+  </p:cSld>
+  <p:clrMapOvr>
+    <a:masterClrMapping/>
+  </p:clrMapOvr>
+</p:sld>
+</file>
+
+<file path=ppt/slides/slide26.xml><?xml version="1.0" encoding="utf-8"?>
+<p:sld xmlns:a="http://schemas.openxmlformats.org/drawingml/2006/main" xmlns:r="http://schemas.openxmlformats.org/officeDocument/2006/relationships" xmlns:p="http://schemas.openxmlformats.org/presentationml/2006/main">
+  <p:cSld>
+    <p:spTree>
+      <p:nvGrpSpPr>
+        <p:cNvPr id="1" name=""/>
+        <p:cNvGrpSpPr/>
+        <p:nvPr/>
+      </p:nvGrpSpPr>
+      <p:grpSpPr>
+        <a:xfrm>
+          <a:off x="0" y="0"/>
+          <a:ext cx="0" cy="0"/>
+          <a:chOff x="0" y="0"/>
+          <a:chExt cx="0" cy="0"/>
+        </a:xfrm>
+      </p:grpSpPr>
+      <p:sp>
+        <p:nvSpPr>
+          <p:cNvPr id="6" name="Title 5"/>
+          <p:cNvSpPr>
+            <a:spLocks noGrp="1"/>
+          </p:cNvSpPr>
+          <p:nvPr>
+            <p:ph type="title"/>
+          </p:nvPr>
+        </p:nvSpPr>
+        <p:spPr/>
+        <p:txBody>
+          <a:bodyPr/>
+          <a:lstStyle/>
+          <a:p>
+            <a:r>
+              <a:rPr lang="en-US" altLang="ko-KR" dirty="0"/>
+              <a:t>Test Result-Frequency test</a:t>
+            </a:r>
+            <a:endParaRPr lang="en-US" dirty="0"/>
+          </a:p>
+        </p:txBody>
+      </p:sp>
+      <p:sp>
+        <p:nvSpPr>
+          <p:cNvPr id="3" name="Slide Number Placeholder 2"/>
+          <p:cNvSpPr>
+            <a:spLocks noGrp="1"/>
+          </p:cNvSpPr>
+          <p:nvPr>
+            <p:ph type="sldNum" sz="quarter" idx="14"/>
+          </p:nvPr>
+        </p:nvSpPr>
+        <p:spPr/>
+        <p:txBody>
+          <a:bodyPr/>
+          <a:lstStyle/>
+          <a:p>
+            <a:r>
+              <a:rPr lang="en-US" smtClean="0"/>
+              <a:t>Page </a:t>
+            </a:r>
+            <a:fld id="{C770E174-C44B-418F-89A4-426EF6EE2C67}" type="slidenum">
+              <a:rPr lang="en-US" smtClean="0"/>
+              <a:pPr/>
+              <a:t>26</a:t>
+            </a:fld>
+            <a:endParaRPr lang="en-US"/>
+          </a:p>
+        </p:txBody>
+      </p:sp>
+      <p:sp>
+        <p:nvSpPr>
+          <p:cNvPr id="4" name="Date Placeholder 3"/>
+          <p:cNvSpPr>
+            <a:spLocks noGrp="1"/>
+          </p:cNvSpPr>
+          <p:nvPr>
+            <p:ph type="dt" sz="half" idx="15"/>
+          </p:nvPr>
+        </p:nvSpPr>
+        <p:spPr/>
+        <p:txBody>
+          <a:bodyPr/>
+          <a:lstStyle/>
+          <a:p>
+            <a:r>
+              <a:rPr lang="en-US" smtClean="0"/>
+              <a:t>set date</a:t>
+            </a:r>
+            <a:endParaRPr lang="en-US"/>
+          </a:p>
+        </p:txBody>
+      </p:sp>
+      <p:sp>
+        <p:nvSpPr>
+          <p:cNvPr id="5" name="Footer Placeholder 4"/>
+          <p:cNvSpPr>
+            <a:spLocks noGrp="1"/>
+          </p:cNvSpPr>
+          <p:nvPr>
+            <p:ph type="ftr" sz="quarter" idx="16"/>
+          </p:nvPr>
+        </p:nvSpPr>
+        <p:spPr/>
+        <p:txBody>
+          <a:bodyPr/>
+          <a:lstStyle/>
+          <a:p>
+            <a:r>
+              <a:rPr lang="en-US" smtClean="0"/>
+              <a:t>Copyright © Infineon Technologies AG 2013. All rights reserved.</a:t>
+            </a:r>
+            <a:endParaRPr lang="en-US"/>
+          </a:p>
+        </p:txBody>
+      </p:sp>
+      <p:pic>
+        <p:nvPicPr>
+          <p:cNvPr id="25" name="Picture 12" descr="red pass.jpg (289×175)"/>
+          <p:cNvPicPr>
+            <a:picLocks noChangeAspect="1" noChangeArrowheads="1"/>
+          </p:cNvPicPr>
+          <p:nvPr/>
+        </p:nvPicPr>
+        <p:blipFill>
+          <a:blip r:embed="rId2">
+            <a:extLst>
+              <a:ext uri="{28A0092B-C50C-407E-A947-70E740481C1C}">
+                <a14:useLocalDpi xmlns:a14="http://schemas.microsoft.com/office/drawing/2010/main" val="0"/>
+              </a:ext>
+            </a:extLst>
+          </a:blip>
+          <a:srcRect/>
+          <a:stretch>
+            <a:fillRect/>
+          </a:stretch>
+        </p:blipFill>
+        <p:spPr bwMode="auto">
+          <a:xfrm>
+            <a:off x="7479175" y="908720"/>
+            <a:ext cx="1664825" cy="1008112"/>
+          </a:xfrm>
+          <a:prstGeom prst="rect">
+            <a:avLst/>
+          </a:prstGeom>
+          <a:noFill/>
+          <a:extLst>
+            <a:ext uri="{909E8E84-426E-40DD-AFC4-6F175D3DCCD1}">
+              <a14:hiddenFill xmlns:a14="http://schemas.microsoft.com/office/drawing/2010/main">
+                <a:solidFill>
+                  <a:srgbClr val="FFFFFF"/>
+                </a:solidFill>
+              </a14:hiddenFill>
+            </a:ext>
+          </a:extLst>
+        </p:spPr>
+      </p:pic>
+      <p:pic>
+        <p:nvPicPr>
+          <p:cNvPr id="4099" name="Picture 3"/>
+          <p:cNvPicPr>
+            <a:picLocks noChangeAspect="1" noChangeArrowheads="1"/>
+          </p:cNvPicPr>
+          <p:nvPr/>
+        </p:nvPicPr>
+        <p:blipFill>
+          <a:blip r:embed="rId3">
+            <a:extLst>
+              <a:ext uri="{28A0092B-C50C-407E-A947-70E740481C1C}">
+                <a14:useLocalDpi xmlns:a14="http://schemas.microsoft.com/office/drawing/2010/main" val="0"/>
+              </a:ext>
+            </a:extLst>
+          </a:blip>
+          <a:srcRect/>
+          <a:stretch>
+            <a:fillRect/>
+          </a:stretch>
+        </p:blipFill>
+        <p:spPr bwMode="auto">
+          <a:xfrm>
+            <a:off x="400397" y="1052736"/>
+            <a:ext cx="6619875" cy="3733800"/>
+          </a:xfrm>
+          <a:prstGeom prst="rect">
+            <a:avLst/>
+          </a:prstGeom>
+          <a:noFill/>
+          <a:ln>
+            <a:noFill/>
+          </a:ln>
+          <a:extLst>
+            <a:ext uri="{909E8E84-426E-40DD-AFC4-6F175D3DCCD1}">
+              <a14:hiddenFill xmlns:a14="http://schemas.microsoft.com/office/drawing/2010/main">
+                <a:solidFill>
+                  <a:schemeClr val="accent1"/>
+                </a:solidFill>
+              </a14:hiddenFill>
+            </a:ext>
+            <a:ext uri="{91240B29-F687-4F45-9708-019B960494DF}">
+              <a14:hiddenLine xmlns:a14="http://schemas.microsoft.com/office/drawing/2010/main" w="9525">
+                <a:solidFill>
+                  <a:schemeClr val="tx1"/>
+                </a:solidFill>
+                <a:miter lim="800000"/>
+                <a:headEnd/>
+                <a:tailEnd/>
+              </a14:hiddenLine>
+            </a:ext>
+          </a:extLst>
+        </p:spPr>
+      </p:pic>
+      <p:sp>
+        <p:nvSpPr>
+          <p:cNvPr id="16" name="TextBox 15"/>
+          <p:cNvSpPr txBox="1"/>
+          <p:nvPr/>
+        </p:nvSpPr>
+        <p:spPr bwMode="auto">
+          <a:xfrm>
+            <a:off x="2702222" y="3933056"/>
+            <a:ext cx="2016224" cy="138499"/>
+          </a:xfrm>
+          <a:prstGeom prst="rect">
+            <a:avLst/>
+          </a:prstGeom>
+          <a:noFill/>
+          <a:ln w="9525">
+            <a:noFill/>
+            <a:miter lim="800000"/>
+            <a:headEnd/>
+            <a:tailEnd/>
+          </a:ln>
+          <a:effectLst/>
+        </p:spPr>
+        <p:txBody>
+          <a:bodyPr wrap="square" lIns="0" tIns="0" rIns="0" bIns="0" rtlCol="0" anchor="ctr" anchorCtr="0">
+            <a:spAutoFit/>
+          </a:bodyPr>
+          <a:lstStyle/>
+          <a:p>
+            <a:pPr eaLnBrk="0" fontAlgn="auto" hangingPunct="0">
+              <a:spcBef>
+                <a:spcPts val="0"/>
+              </a:spcBef>
+              <a:spcAft>
+                <a:spcPts val="300"/>
+              </a:spcAft>
+              <a:buClr>
+                <a:schemeClr val="accent1"/>
+              </a:buClr>
+            </a:pPr>
+            <a:r>
+              <a:rPr lang="en-US" altLang="ko-KR" sz="900" dirty="0" smtClean="0"/>
+              <a:t>.</a:t>
+            </a:r>
+            <a:r>
+              <a:rPr lang="en-US" altLang="ko-KR" sz="900" b="1" kern="0" dirty="0" smtClean="0">
+                <a:solidFill>
+                  <a:srgbClr val="FF0000"/>
+                </a:solidFill>
+                <a:latin typeface="Verdana" pitchFamily="34" charset="0"/>
+                <a:ea typeface="Verdana" pitchFamily="34" charset="0"/>
+                <a:cs typeface="Verdana" pitchFamily="34" charset="0"/>
+              </a:rPr>
+              <a:t>10~200Khz sweep for 30s</a:t>
+            </a:r>
+            <a:endParaRPr lang="en-US" altLang="ko-KR" sz="900" b="1" kern="0" dirty="0">
+              <a:solidFill>
+                <a:srgbClr val="FF0000"/>
+              </a:solidFill>
+              <a:latin typeface="Verdana" pitchFamily="34" charset="0"/>
+              <a:ea typeface="Verdana" pitchFamily="34" charset="0"/>
+              <a:cs typeface="Verdana" pitchFamily="34" charset="0"/>
+            </a:endParaRPr>
+          </a:p>
+        </p:txBody>
+      </p:sp>
+    </p:spTree>
+    <p:extLst>
+      <p:ext uri="{BB962C8B-B14F-4D97-AF65-F5344CB8AC3E}">
+        <p14:creationId xmlns:p14="http://schemas.microsoft.com/office/powerpoint/2010/main" val="209304227"/>
+      </p:ext>
+    </p:extLst>
+  </p:cSld>
+  <p:clrMapOvr>
+    <a:masterClrMapping/>
+  </p:clrMapOvr>
+</p:sld>
+</file>
+
+<file path=ppt/slides/slide27.xml><?xml version="1.0" encoding="utf-8"?>
+<p:sld xmlns:a="http://schemas.openxmlformats.org/drawingml/2006/main" xmlns:r="http://schemas.openxmlformats.org/officeDocument/2006/relationships" xmlns:p="http://schemas.openxmlformats.org/presentationml/2006/main">
+  <p:cSld>
+    <p:spTree>
+      <p:nvGrpSpPr>
+        <p:cNvPr id="1" name=""/>
+        <p:cNvGrpSpPr/>
+        <p:nvPr/>
+      </p:nvGrpSpPr>
+      <p:grpSpPr>
+        <a:xfrm>
+          <a:off x="0" y="0"/>
+          <a:ext cx="0" cy="0"/>
+          <a:chOff x="0" y="0"/>
+          <a:chExt cx="0" cy="0"/>
+        </a:xfrm>
+      </p:grpSpPr>
+      <p:sp>
+        <p:nvSpPr>
+          <p:cNvPr id="6" name="Title 5"/>
+          <p:cNvSpPr>
+            <a:spLocks noGrp="1"/>
+          </p:cNvSpPr>
+          <p:nvPr>
+            <p:ph type="title"/>
+          </p:nvPr>
+        </p:nvSpPr>
+        <p:spPr/>
+        <p:txBody>
+          <a:bodyPr/>
+          <a:lstStyle/>
+          <a:p>
+            <a:r>
+              <a:rPr lang="en-US" altLang="ko-KR" dirty="0"/>
+              <a:t>Test Result-Frequency test</a:t>
+            </a:r>
+            <a:endParaRPr lang="en-US" dirty="0"/>
+          </a:p>
+        </p:txBody>
+      </p:sp>
+      <p:sp>
+        <p:nvSpPr>
+          <p:cNvPr id="3" name="Slide Number Placeholder 2"/>
+          <p:cNvSpPr>
+            <a:spLocks noGrp="1"/>
+          </p:cNvSpPr>
+          <p:nvPr>
+            <p:ph type="sldNum" sz="quarter" idx="14"/>
+          </p:nvPr>
+        </p:nvSpPr>
+        <p:spPr/>
+        <p:txBody>
+          <a:bodyPr/>
+          <a:lstStyle/>
+          <a:p>
+            <a:r>
+              <a:rPr lang="en-US" smtClean="0"/>
+              <a:t>Page </a:t>
+            </a:r>
+            <a:fld id="{C770E174-C44B-418F-89A4-426EF6EE2C67}" type="slidenum">
+              <a:rPr lang="en-US" smtClean="0"/>
+              <a:pPr/>
+              <a:t>27</a:t>
+            </a:fld>
+            <a:endParaRPr lang="en-US"/>
+          </a:p>
+        </p:txBody>
+      </p:sp>
+      <p:sp>
+        <p:nvSpPr>
+          <p:cNvPr id="4" name="Date Placeholder 3"/>
+          <p:cNvSpPr>
+            <a:spLocks noGrp="1"/>
+          </p:cNvSpPr>
+          <p:nvPr>
+            <p:ph type="dt" sz="half" idx="15"/>
+          </p:nvPr>
+        </p:nvSpPr>
+        <p:spPr/>
+        <p:txBody>
+          <a:bodyPr/>
+          <a:lstStyle/>
+          <a:p>
+            <a:r>
+              <a:rPr lang="en-US" smtClean="0"/>
+              <a:t>set date</a:t>
+            </a:r>
+            <a:endParaRPr lang="en-US"/>
+          </a:p>
+        </p:txBody>
+      </p:sp>
+      <p:sp>
+        <p:nvSpPr>
+          <p:cNvPr id="5" name="Footer Placeholder 4"/>
+          <p:cNvSpPr>
+            <a:spLocks noGrp="1"/>
+          </p:cNvSpPr>
+          <p:nvPr>
+            <p:ph type="ftr" sz="quarter" idx="16"/>
+          </p:nvPr>
+        </p:nvSpPr>
+        <p:spPr/>
+        <p:txBody>
+          <a:bodyPr/>
+          <a:lstStyle/>
+          <a:p>
+            <a:r>
+              <a:rPr lang="en-US" smtClean="0"/>
+              <a:t>Copyright © Infineon Technologies AG 2013. All rights reserved.</a:t>
+            </a:r>
+            <a:endParaRPr lang="en-US"/>
+          </a:p>
+        </p:txBody>
+      </p:sp>
+      <p:pic>
+        <p:nvPicPr>
+          <p:cNvPr id="25" name="Picture 12" descr="red pass.jpg (289×175)"/>
+          <p:cNvPicPr>
+            <a:picLocks noChangeAspect="1" noChangeArrowheads="1"/>
+          </p:cNvPicPr>
+          <p:nvPr/>
+        </p:nvPicPr>
+        <p:blipFill>
+          <a:blip r:embed="rId2">
+            <a:extLst>
+              <a:ext uri="{28A0092B-C50C-407E-A947-70E740481C1C}">
+                <a14:useLocalDpi xmlns:a14="http://schemas.microsoft.com/office/drawing/2010/main" val="0"/>
+              </a:ext>
+            </a:extLst>
+          </a:blip>
+          <a:srcRect/>
+          <a:stretch>
+            <a:fillRect/>
+          </a:stretch>
+        </p:blipFill>
+        <p:spPr bwMode="auto">
+          <a:xfrm>
+            <a:off x="7479175" y="908720"/>
+            <a:ext cx="1664825" cy="1008112"/>
+          </a:xfrm>
+          <a:prstGeom prst="rect">
+            <a:avLst/>
+          </a:prstGeom>
+          <a:noFill/>
+          <a:extLst>
+            <a:ext uri="{909E8E84-426E-40DD-AFC4-6F175D3DCCD1}">
+              <a14:hiddenFill xmlns:a14="http://schemas.microsoft.com/office/drawing/2010/main">
+                <a:solidFill>
+                  <a:srgbClr val="FFFFFF"/>
+                </a:solidFill>
+              </a14:hiddenFill>
+            </a:ext>
+          </a:extLst>
+        </p:spPr>
+      </p:pic>
+      <p:pic>
+        <p:nvPicPr>
+          <p:cNvPr id="4100" name="Picture 4"/>
+          <p:cNvPicPr>
+            <a:picLocks noChangeAspect="1" noChangeArrowheads="1"/>
+          </p:cNvPicPr>
+          <p:nvPr/>
+        </p:nvPicPr>
+        <p:blipFill>
+          <a:blip r:embed="rId3">
+            <a:extLst>
+              <a:ext uri="{28A0092B-C50C-407E-A947-70E740481C1C}">
+                <a14:useLocalDpi xmlns:a14="http://schemas.microsoft.com/office/drawing/2010/main" val="0"/>
+              </a:ext>
+            </a:extLst>
+          </a:blip>
+          <a:srcRect/>
+          <a:stretch>
+            <a:fillRect/>
+          </a:stretch>
+        </p:blipFill>
+        <p:spPr bwMode="auto">
+          <a:xfrm>
+            <a:off x="224928" y="1196752"/>
+            <a:ext cx="6619875" cy="3733800"/>
+          </a:xfrm>
+          <a:prstGeom prst="rect">
+            <a:avLst/>
+          </a:prstGeom>
+          <a:noFill/>
+          <a:ln>
+            <a:noFill/>
+          </a:ln>
+          <a:extLst>
+            <a:ext uri="{909E8E84-426E-40DD-AFC4-6F175D3DCCD1}">
+              <a14:hiddenFill xmlns:a14="http://schemas.microsoft.com/office/drawing/2010/main">
+                <a:solidFill>
+                  <a:schemeClr val="accent1"/>
+                </a:solidFill>
+              </a14:hiddenFill>
+            </a:ext>
+            <a:ext uri="{91240B29-F687-4F45-9708-019B960494DF}">
+              <a14:hiddenLine xmlns:a14="http://schemas.microsoft.com/office/drawing/2010/main" w="9525">
+                <a:solidFill>
+                  <a:schemeClr val="tx1"/>
+                </a:solidFill>
+                <a:miter lim="800000"/>
+                <a:headEnd/>
+                <a:tailEnd/>
+              </a14:hiddenLine>
+            </a:ext>
+          </a:extLst>
+        </p:spPr>
+      </p:pic>
+      <p:pic>
+        <p:nvPicPr>
+          <p:cNvPr id="5122" name="Picture 2" descr="image005"/>
+          <p:cNvPicPr>
+            <a:picLocks noChangeAspect="1" noChangeArrowheads="1"/>
+          </p:cNvPicPr>
+          <p:nvPr/>
+        </p:nvPicPr>
+        <p:blipFill>
+          <a:blip r:embed="rId4">
+            <a:extLst>
+              <a:ext uri="{28A0092B-C50C-407E-A947-70E740481C1C}">
+                <a14:useLocalDpi xmlns:a14="http://schemas.microsoft.com/office/drawing/2010/main" val="0"/>
+              </a:ext>
+            </a:extLst>
+          </a:blip>
+          <a:srcRect/>
+          <a:stretch>
+            <a:fillRect/>
+          </a:stretch>
+        </p:blipFill>
+        <p:spPr bwMode="auto">
+          <a:xfrm>
+            <a:off x="251519" y="3717030"/>
+            <a:ext cx="6593283" cy="1644017"/>
+          </a:xfrm>
+          <a:prstGeom prst="rect">
+            <a:avLst/>
+          </a:prstGeom>
+          <a:noFill/>
+          <a:ln>
+            <a:noFill/>
+          </a:ln>
+          <a:extLst>
+            <a:ext uri="{909E8E84-426E-40DD-AFC4-6F175D3DCCD1}">
+              <a14:hiddenFill xmlns:a14="http://schemas.microsoft.com/office/drawing/2010/main">
+                <a:solidFill>
+                  <a:srgbClr val="FFFFFF"/>
+                </a:solidFill>
+              </a14:hiddenFill>
+            </a:ext>
+            <a:ext uri="{91240B29-F687-4F45-9708-019B960494DF}">
+              <a14:hiddenLine xmlns:a14="http://schemas.microsoft.com/office/drawing/2010/main" w="9525">
+                <a:solidFill>
+                  <a:srgbClr val="000000"/>
+                </a:solidFill>
+                <a:miter lim="800000"/>
+                <a:headEnd/>
+                <a:tailEnd/>
+              </a14:hiddenLine>
+            </a:ext>
+          </a:extLst>
+        </p:spPr>
+      </p:pic>
+      <p:sp>
+        <p:nvSpPr>
+          <p:cNvPr id="2" name="Rectangle 1"/>
+          <p:cNvSpPr/>
+          <p:nvPr/>
+        </p:nvSpPr>
+        <p:spPr bwMode="auto">
+          <a:xfrm>
+            <a:off x="2555776" y="2852936"/>
+            <a:ext cx="1152128" cy="288032"/>
+          </a:xfrm>
+          <a:prstGeom prst="rect">
+            <a:avLst/>
+          </a:prstGeom>
+          <a:noFill/>
+          <a:ln w="38100">
+            <a:solidFill>
+              <a:srgbClr val="FF0000"/>
+            </a:solidFill>
+            <a:miter lim="800000"/>
+            <a:headEnd/>
+            <a:tailEnd/>
+          </a:ln>
+        </p:spPr>
+        <p:txBody>
+          <a:bodyPr wrap="square" lIns="72000" tIns="72000" rIns="72000" bIns="72000" rtlCol="0" anchor="ctr"/>
+          <a:lstStyle/>
+          <a:p>
+            <a:pPr algn="ctr" eaLnBrk="0" hangingPunct="0"/>
+            <a:endParaRPr lang="ko-KR" altLang="en-US" sz="1600" dirty="0" smtClean="0">
+              <a:latin typeface="+mn-lt"/>
+              <a:ea typeface="Verdana" pitchFamily="34" charset="0"/>
+              <a:cs typeface="Verdana" pitchFamily="34" charset="0"/>
+            </a:endParaRPr>
+          </a:p>
+        </p:txBody>
+      </p:sp>
+      <p:cxnSp>
+        <p:nvCxnSpPr>
+          <p:cNvPr id="8" name="Straight Arrow Connector 7"/>
+          <p:cNvCxnSpPr/>
+          <p:nvPr/>
+        </p:nvCxnSpPr>
+        <p:spPr>
+          <a:xfrm flipH="1" flipV="1">
+            <a:off x="3707904" y="3140968"/>
+            <a:ext cx="1584176" cy="180020"/>
+          </a:xfrm>
+          <a:prstGeom prst="straightConnector1">
+            <a:avLst/>
+          </a:prstGeom>
+          <a:ln w="19050">
+            <a:solidFill>
+              <a:srgbClr val="FF0000"/>
+            </a:solidFill>
+            <a:tailEnd type="arrow"/>
+          </a:ln>
+        </p:spPr>
+        <p:style>
+          <a:lnRef idx="1">
+            <a:schemeClr val="accent1"/>
+          </a:lnRef>
+          <a:fillRef idx="0">
+            <a:schemeClr val="accent1"/>
+          </a:fillRef>
+          <a:effectRef idx="0">
+            <a:schemeClr val="accent1"/>
+          </a:effectRef>
+          <a:fontRef idx="minor">
+            <a:schemeClr val="tx1"/>
+          </a:fontRef>
+        </p:style>
+      </p:cxnSp>
+      <p:sp>
+        <p:nvSpPr>
+          <p:cNvPr id="14" name="TextBox 13"/>
+          <p:cNvSpPr txBox="1"/>
+          <p:nvPr/>
+        </p:nvSpPr>
+        <p:spPr bwMode="auto">
+          <a:xfrm>
+            <a:off x="5292080" y="3140968"/>
+            <a:ext cx="2016224" cy="415498"/>
+          </a:xfrm>
+          <a:prstGeom prst="rect">
+            <a:avLst/>
+          </a:prstGeom>
+          <a:noFill/>
+          <a:ln w="9525">
+            <a:noFill/>
+            <a:miter lim="800000"/>
+            <a:headEnd/>
+            <a:tailEnd/>
+          </a:ln>
+          <a:effectLst/>
+        </p:spPr>
+        <p:txBody>
+          <a:bodyPr wrap="square" lIns="0" tIns="0" rIns="0" bIns="0" rtlCol="0" anchor="ctr" anchorCtr="0">
+            <a:spAutoFit/>
+          </a:bodyPr>
+          <a:lstStyle/>
+          <a:p>
+            <a:pPr eaLnBrk="0" fontAlgn="auto" hangingPunct="0">
+              <a:spcBef>
+                <a:spcPts val="0"/>
+              </a:spcBef>
+              <a:spcAft>
+                <a:spcPts val="300"/>
+              </a:spcAft>
+              <a:buClr>
+                <a:schemeClr val="accent1"/>
+              </a:buClr>
+            </a:pPr>
+            <a:r>
+              <a:rPr lang="en-US" altLang="ko-KR" sz="900" dirty="0" smtClean="0"/>
+              <a:t>.</a:t>
+            </a:r>
+            <a:r>
+              <a:rPr lang="en-US" altLang="ko-KR" sz="900" b="1" kern="0" dirty="0" smtClean="0">
+                <a:solidFill>
+                  <a:srgbClr val="FF0000"/>
+                </a:solidFill>
+                <a:latin typeface="Verdana" pitchFamily="34" charset="0"/>
+                <a:ea typeface="Verdana" pitchFamily="34" charset="0"/>
+                <a:cs typeface="Verdana" pitchFamily="34" charset="0"/>
+              </a:rPr>
+              <a:t>104Khz </a:t>
+            </a:r>
+            <a:r>
+              <a:rPr lang="ko-KR" altLang="en-US" sz="900" b="1" kern="0" dirty="0" smtClean="0">
+                <a:solidFill>
+                  <a:srgbClr val="FF0000"/>
+                </a:solidFill>
+                <a:latin typeface="Verdana" pitchFamily="34" charset="0"/>
+                <a:ea typeface="Verdana" pitchFamily="34" charset="0"/>
+                <a:cs typeface="Verdana" pitchFamily="34" charset="0"/>
+              </a:rPr>
+              <a:t>에서  </a:t>
+            </a:r>
+            <a:r>
+              <a:rPr lang="en-US" altLang="ko-KR" sz="900" b="1" kern="0" dirty="0" smtClean="0">
+                <a:solidFill>
+                  <a:srgbClr val="FF0000"/>
+                </a:solidFill>
+                <a:latin typeface="Verdana" pitchFamily="34" charset="0"/>
+                <a:ea typeface="Verdana" pitchFamily="34" charset="0"/>
+                <a:cs typeface="Verdana" pitchFamily="34" charset="0"/>
+              </a:rPr>
+              <a:t>Integration </a:t>
+            </a:r>
+            <a:r>
+              <a:rPr lang="ko-KR" altLang="en-US" sz="900" b="1" kern="0" dirty="0" smtClean="0">
+                <a:solidFill>
+                  <a:srgbClr val="FF0000"/>
+                </a:solidFill>
+                <a:latin typeface="Verdana" pitchFamily="34" charset="0"/>
+                <a:ea typeface="Verdana" pitchFamily="34" charset="0"/>
+                <a:cs typeface="Verdana" pitchFamily="34" charset="0"/>
+              </a:rPr>
+              <a:t>값이  급격하게 변화면서  </a:t>
+            </a:r>
+            <a:r>
+              <a:rPr lang="en-US" altLang="ko-KR" sz="900" b="1" kern="0" dirty="0" smtClean="0">
+                <a:solidFill>
+                  <a:srgbClr val="FF0000"/>
+                </a:solidFill>
+                <a:latin typeface="Verdana" pitchFamily="34" charset="0"/>
+                <a:ea typeface="Verdana" pitchFamily="34" charset="0"/>
+                <a:cs typeface="Verdana" pitchFamily="34" charset="0"/>
+              </a:rPr>
+              <a:t>1KHz </a:t>
+            </a:r>
+            <a:r>
+              <a:rPr lang="ko-KR" altLang="en-US" sz="900" b="1" kern="0" dirty="0" smtClean="0">
+                <a:solidFill>
+                  <a:srgbClr val="FF0000"/>
+                </a:solidFill>
+                <a:latin typeface="Verdana" pitchFamily="34" charset="0"/>
+                <a:ea typeface="Verdana" pitchFamily="34" charset="0"/>
+                <a:cs typeface="Verdana" pitchFamily="34" charset="0"/>
+              </a:rPr>
+              <a:t>단위로 값이 급격하게 변하기 시작</a:t>
+            </a:r>
+            <a:endParaRPr lang="en-US" altLang="ko-KR" sz="900" b="1" kern="0" dirty="0">
+              <a:solidFill>
+                <a:srgbClr val="FF0000"/>
+              </a:solidFill>
+              <a:latin typeface="Verdana" pitchFamily="34" charset="0"/>
+              <a:ea typeface="Verdana" pitchFamily="34" charset="0"/>
+              <a:cs typeface="Verdana" pitchFamily="34" charset="0"/>
+            </a:endParaRPr>
+          </a:p>
+        </p:txBody>
+      </p:sp>
+    </p:spTree>
+    <p:extLst>
+      <p:ext uri="{BB962C8B-B14F-4D97-AF65-F5344CB8AC3E}">
+        <p14:creationId xmlns:p14="http://schemas.microsoft.com/office/powerpoint/2010/main" val="1424521113"/>
+      </p:ext>
+    </p:extLst>
+  </p:cSld>
+  <p:clrMapOvr>
+    <a:masterClrMapping/>
+  </p:clrMapOvr>
+</p:sld>
+</file>
+
+<file path=ppt/slides/slide28.xml><?xml version="1.0" encoding="utf-8"?>
+<p:sld xmlns:a="http://schemas.openxmlformats.org/drawingml/2006/main" xmlns:r="http://schemas.openxmlformats.org/officeDocument/2006/relationships" xmlns:p="http://schemas.openxmlformats.org/presentationml/2006/main">
+  <p:cSld>
+    <p:spTree>
+      <p:nvGrpSpPr>
+        <p:cNvPr id="1" name=""/>
+        <p:cNvGrpSpPr/>
+        <p:nvPr/>
+      </p:nvGrpSpPr>
+      <p:grpSpPr>
+        <a:xfrm>
+          <a:off x="0" y="0"/>
+          <a:ext cx="0" cy="0"/>
+          <a:chOff x="0" y="0"/>
+          <a:chExt cx="0" cy="0"/>
+        </a:xfrm>
+      </p:grpSpPr>
+      <p:sp>
+        <p:nvSpPr>
+          <p:cNvPr id="3" name="Slide Number Placeholder 2"/>
+          <p:cNvSpPr>
+            <a:spLocks noGrp="1"/>
+          </p:cNvSpPr>
+          <p:nvPr>
+            <p:ph type="sldNum" sz="quarter" idx="10"/>
+          </p:nvPr>
+        </p:nvSpPr>
+        <p:spPr/>
+        <p:txBody>
+          <a:bodyPr/>
+          <a:lstStyle/>
+          <a:p>
+            <a:r>
+              <a:rPr lang="en-US" smtClean="0"/>
+              <a:t>Page </a:t>
+            </a:r>
+            <a:fld id="{C770E174-C44B-418F-89A4-426EF6EE2C67}" type="slidenum">
+              <a:rPr lang="en-US" smtClean="0"/>
+              <a:pPr/>
+              <a:t>28</a:t>
             </a:fld>
             <a:endParaRPr lang="en-US"/>
           </a:p>

</xml_diff>

<commit_message>
Re write the code for appnote AP32348.
</commit_message>
<xml_diff>
--- a/Knock Detection Reference Code Specification.pptx
+++ b/Knock Detection Reference Code Specification.pptx
@@ -5,10 +5,10 @@
     <p:sldMasterId id="2147483715" r:id="rId1"/>
   </p:sldMasterIdLst>
   <p:notesMasterIdLst>
-    <p:notesMasterId r:id="rId30"/>
+    <p:notesMasterId r:id="rId31"/>
   </p:notesMasterIdLst>
   <p:handoutMasterIdLst>
-    <p:handoutMasterId r:id="rId31"/>
+    <p:handoutMasterId r:id="rId32"/>
   </p:handoutMasterIdLst>
   <p:sldIdLst>
     <p:sldId id="256" r:id="rId2"/>
@@ -38,12 +38,13 @@
     <p:sldId id="281" r:id="rId26"/>
     <p:sldId id="282" r:id="rId27"/>
     <p:sldId id="283" r:id="rId28"/>
-    <p:sldId id="258" r:id="rId29"/>
+    <p:sldId id="284" r:id="rId29"/>
+    <p:sldId id="258" r:id="rId30"/>
   </p:sldIdLst>
   <p:sldSz cx="9144000" cy="6858000" type="screen4x3"/>
   <p:notesSz cx="7099300" cy="10234613"/>
   <p:custDataLst>
-    <p:tags r:id="rId32"/>
+    <p:tags r:id="rId33"/>
   </p:custDataLst>
   <p:defaultTextStyle>
     <a:defPPr>
@@ -14871,6 +14872,232 @@
       </p:grpSpPr>
       <p:sp>
         <p:nvSpPr>
+          <p:cNvPr id="2" name="Title 1"/>
+          <p:cNvSpPr>
+            <a:spLocks noGrp="1"/>
+          </p:cNvSpPr>
+          <p:nvPr>
+            <p:ph type="title"/>
+          </p:nvPr>
+        </p:nvSpPr>
+        <p:spPr/>
+        <p:txBody>
+          <a:bodyPr/>
+          <a:lstStyle/>
+          <a:p>
+            <a:endParaRPr lang="ko-KR" altLang="en-US"/>
+          </a:p>
+        </p:txBody>
+      </p:sp>
+      <p:sp>
+        <p:nvSpPr>
+          <p:cNvPr id="4" name="Slide Number Placeholder 3"/>
+          <p:cNvSpPr>
+            <a:spLocks noGrp="1"/>
+          </p:cNvSpPr>
+          <p:nvPr>
+            <p:ph type="sldNum" sz="quarter" idx="14"/>
+          </p:nvPr>
+        </p:nvSpPr>
+        <p:spPr/>
+        <p:txBody>
+          <a:bodyPr/>
+          <a:lstStyle/>
+          <a:p>
+            <a:r>
+              <a:rPr lang="en-US" smtClean="0"/>
+              <a:t>Page </a:t>
+            </a:r>
+            <a:fld id="{89D06DFF-97DA-42D8-94A6-87C53C3F38B2}" type="slidenum">
+              <a:rPr lang="en-US" smtClean="0"/>
+              <a:pPr/>
+              <a:t>28</a:t>
+            </a:fld>
+            <a:endParaRPr lang="en-US"/>
+          </a:p>
+        </p:txBody>
+      </p:sp>
+      <p:sp>
+        <p:nvSpPr>
+          <p:cNvPr id="5" name="Date Placeholder 4"/>
+          <p:cNvSpPr>
+            <a:spLocks noGrp="1"/>
+          </p:cNvSpPr>
+          <p:nvPr>
+            <p:ph type="dt" sz="half" idx="15"/>
+          </p:nvPr>
+        </p:nvSpPr>
+        <p:spPr/>
+        <p:txBody>
+          <a:bodyPr/>
+          <a:lstStyle/>
+          <a:p>
+            <a:r>
+              <a:rPr lang="en-US" smtClean="0"/>
+              <a:t>set date</a:t>
+            </a:r>
+            <a:endParaRPr lang="en-US"/>
+          </a:p>
+        </p:txBody>
+      </p:sp>
+      <p:sp>
+        <p:nvSpPr>
+          <p:cNvPr id="6" name="Footer Placeholder 5"/>
+          <p:cNvSpPr>
+            <a:spLocks noGrp="1"/>
+          </p:cNvSpPr>
+          <p:nvPr>
+            <p:ph type="ftr" sz="quarter" idx="16"/>
+          </p:nvPr>
+        </p:nvSpPr>
+        <p:spPr/>
+        <p:txBody>
+          <a:bodyPr/>
+          <a:lstStyle/>
+          <a:p>
+            <a:r>
+              <a:rPr lang="en-US" smtClean="0"/>
+              <a:t>Copyright © Infineon Technologies AG 2013. All rights reserved.</a:t>
+            </a:r>
+            <a:endParaRPr lang="en-US"/>
+          </a:p>
+        </p:txBody>
+      </p:sp>
+      <p:pic>
+        <p:nvPicPr>
+          <p:cNvPr id="7" name="Content Placeholder 6" descr="C:\Users\nuchimow\AppData\Local\Temp\SNAGHTML65ec12d.PNG"/>
+          <p:cNvPicPr>
+            <a:picLocks noGrp="1"/>
+          </p:cNvPicPr>
+          <p:nvPr>
+            <p:ph idx="4294967295"/>
+          </p:nvPr>
+        </p:nvPicPr>
+        <p:blipFill>
+          <a:blip r:embed="rId2" cstate="print">
+            <a:extLst>
+              <a:ext uri="{28A0092B-C50C-407E-A947-70E740481C1C}">
+                <a14:useLocalDpi xmlns:a14="http://schemas.microsoft.com/office/drawing/2010/main" val="0"/>
+              </a:ext>
+            </a:extLst>
+          </a:blip>
+          <a:srcRect/>
+          <a:stretch>
+            <a:fillRect/>
+          </a:stretch>
+        </p:blipFill>
+        <p:spPr bwMode="auto">
+          <a:xfrm>
+            <a:off x="250825" y="1349030"/>
+            <a:ext cx="8642350" cy="5023540"/>
+          </a:xfrm>
+          <a:prstGeom prst="rect">
+            <a:avLst/>
+          </a:prstGeom>
+          <a:noFill/>
+          <a:ln>
+            <a:noFill/>
+          </a:ln>
+        </p:spPr>
+      </p:pic>
+      <p:sp>
+        <p:nvSpPr>
+          <p:cNvPr id="8" name="TextBox 7"/>
+          <p:cNvSpPr txBox="1"/>
+          <p:nvPr/>
+        </p:nvSpPr>
+        <p:spPr bwMode="auto">
+          <a:xfrm>
+            <a:off x="444297" y="2564904"/>
+            <a:ext cx="2016224" cy="138499"/>
+          </a:xfrm>
+          <a:prstGeom prst="rect">
+            <a:avLst/>
+          </a:prstGeom>
+          <a:noFill/>
+          <a:ln w="9525">
+            <a:noFill/>
+            <a:miter lim="800000"/>
+            <a:headEnd/>
+            <a:tailEnd/>
+          </a:ln>
+          <a:effectLst/>
+        </p:spPr>
+        <p:txBody>
+          <a:bodyPr wrap="square" lIns="0" tIns="0" rIns="0" bIns="0" rtlCol="0" anchor="ctr" anchorCtr="0">
+            <a:spAutoFit/>
+          </a:bodyPr>
+          <a:lstStyle/>
+          <a:p>
+            <a:pPr eaLnBrk="0" fontAlgn="auto" hangingPunct="0">
+              <a:spcBef>
+                <a:spcPts val="0"/>
+              </a:spcBef>
+              <a:spcAft>
+                <a:spcPts val="300"/>
+              </a:spcAft>
+              <a:buClr>
+                <a:schemeClr val="accent1"/>
+              </a:buClr>
+            </a:pPr>
+            <a:r>
+              <a:rPr lang="en-US" altLang="ko-KR" sz="900" dirty="0" smtClean="0"/>
+              <a:t>.</a:t>
+            </a:r>
+            <a:r>
+              <a:rPr lang="en-US" altLang="ko-KR" sz="900" b="1" kern="0" dirty="0" smtClean="0">
+                <a:solidFill>
+                  <a:srgbClr val="FF0000"/>
+                </a:solidFill>
+                <a:latin typeface="Verdana" pitchFamily="34" charset="0"/>
+                <a:ea typeface="Verdana" pitchFamily="34" charset="0"/>
+                <a:cs typeface="Verdana" pitchFamily="34" charset="0"/>
+              </a:rPr>
+              <a:t>10~200Khz sweep for 30s</a:t>
+            </a:r>
+            <a:endParaRPr lang="en-US" altLang="ko-KR" sz="900" b="1" kern="0" dirty="0">
+              <a:solidFill>
+                <a:srgbClr val="FF0000"/>
+              </a:solidFill>
+              <a:latin typeface="Verdana" pitchFamily="34" charset="0"/>
+              <a:ea typeface="Verdana" pitchFamily="34" charset="0"/>
+              <a:cs typeface="Verdana" pitchFamily="34" charset="0"/>
+            </a:endParaRPr>
+          </a:p>
+        </p:txBody>
+      </p:sp>
+    </p:spTree>
+    <p:extLst>
+      <p:ext uri="{BB962C8B-B14F-4D97-AF65-F5344CB8AC3E}">
+        <p14:creationId xmlns:p14="http://schemas.microsoft.com/office/powerpoint/2010/main" val="3673735946"/>
+      </p:ext>
+    </p:extLst>
+  </p:cSld>
+  <p:clrMapOvr>
+    <a:masterClrMapping/>
+  </p:clrMapOvr>
+</p:sld>
+</file>
+
+<file path=ppt/slides/slide29.xml><?xml version="1.0" encoding="utf-8"?>
+<p:sld xmlns:a="http://schemas.openxmlformats.org/drawingml/2006/main" xmlns:r="http://schemas.openxmlformats.org/officeDocument/2006/relationships" xmlns:p="http://schemas.openxmlformats.org/presentationml/2006/main">
+  <p:cSld>
+    <p:spTree>
+      <p:nvGrpSpPr>
+        <p:cNvPr id="1" name=""/>
+        <p:cNvGrpSpPr/>
+        <p:nvPr/>
+      </p:nvGrpSpPr>
+      <p:grpSpPr>
+        <a:xfrm>
+          <a:off x="0" y="0"/>
+          <a:ext cx="0" cy="0"/>
+          <a:chOff x="0" y="0"/>
+          <a:chExt cx="0" cy="0"/>
+        </a:xfrm>
+      </p:grpSpPr>
+      <p:sp>
+        <p:nvSpPr>
           <p:cNvPr id="3" name="Slide Number Placeholder 2"/>
           <p:cNvSpPr>
             <a:spLocks noGrp="1"/>
@@ -14891,7 +15118,7 @@
             <a:fld id="{C770E174-C44B-418F-89A4-426EF6EE2C67}" type="slidenum">
               <a:rPr lang="en-US" smtClean="0"/>
               <a:pPr/>
-              <a:t>28</a:t>
+              <a:t>29</a:t>
             </a:fld>
             <a:endParaRPr lang="en-US"/>
           </a:p>

</xml_diff>